<commit_message>
Add project tracker to repo
Update powerpoint screenshots, add time tracker excel file to repo and update create datasets file accordingly
</commit_message>
<xml_diff>
--- a/RLadies timetrackR Presentation v2.pptx
+++ b/RLadies timetrackR Presentation v2.pptx
@@ -5,10 +5,10 @@
     <p:sldMasterId id="2147483648" r:id="rId4"/>
   </p:sldMasterIdLst>
   <p:notesMasterIdLst>
-    <p:notesMasterId r:id="rId38"/>
+    <p:notesMasterId r:id="rId39"/>
   </p:notesMasterIdLst>
   <p:handoutMasterIdLst>
-    <p:handoutMasterId r:id="rId39"/>
+    <p:handoutMasterId r:id="rId40"/>
   </p:handoutMasterIdLst>
   <p:sldIdLst>
     <p:sldId id="256" r:id="rId5"/>
@@ -18,32 +18,33 @@
     <p:sldId id="290" r:id="rId9"/>
     <p:sldId id="303" r:id="rId10"/>
     <p:sldId id="267" r:id="rId11"/>
-    <p:sldId id="260" r:id="rId12"/>
-    <p:sldId id="287" r:id="rId13"/>
-    <p:sldId id="278" r:id="rId14"/>
-    <p:sldId id="279" r:id="rId15"/>
-    <p:sldId id="291" r:id="rId16"/>
-    <p:sldId id="259" r:id="rId17"/>
-    <p:sldId id="296" r:id="rId18"/>
-    <p:sldId id="299" r:id="rId19"/>
-    <p:sldId id="300" r:id="rId20"/>
-    <p:sldId id="266" r:id="rId21"/>
-    <p:sldId id="286" r:id="rId22"/>
-    <p:sldId id="274" r:id="rId23"/>
-    <p:sldId id="292" r:id="rId24"/>
-    <p:sldId id="293" r:id="rId25"/>
-    <p:sldId id="284" r:id="rId26"/>
-    <p:sldId id="285" r:id="rId27"/>
-    <p:sldId id="302" r:id="rId28"/>
-    <p:sldId id="289" r:id="rId29"/>
-    <p:sldId id="294" r:id="rId30"/>
-    <p:sldId id="288" r:id="rId31"/>
-    <p:sldId id="295" r:id="rId32"/>
-    <p:sldId id="301" r:id="rId33"/>
-    <p:sldId id="262" r:id="rId34"/>
-    <p:sldId id="280" r:id="rId35"/>
-    <p:sldId id="263" r:id="rId36"/>
-    <p:sldId id="273" r:id="rId37"/>
+    <p:sldId id="306" r:id="rId12"/>
+    <p:sldId id="260" r:id="rId13"/>
+    <p:sldId id="287" r:id="rId14"/>
+    <p:sldId id="278" r:id="rId15"/>
+    <p:sldId id="279" r:id="rId16"/>
+    <p:sldId id="291" r:id="rId17"/>
+    <p:sldId id="259" r:id="rId18"/>
+    <p:sldId id="296" r:id="rId19"/>
+    <p:sldId id="299" r:id="rId20"/>
+    <p:sldId id="300" r:id="rId21"/>
+    <p:sldId id="266" r:id="rId22"/>
+    <p:sldId id="286" r:id="rId23"/>
+    <p:sldId id="274" r:id="rId24"/>
+    <p:sldId id="292" r:id="rId25"/>
+    <p:sldId id="293" r:id="rId26"/>
+    <p:sldId id="284" r:id="rId27"/>
+    <p:sldId id="285" r:id="rId28"/>
+    <p:sldId id="302" r:id="rId29"/>
+    <p:sldId id="289" r:id="rId30"/>
+    <p:sldId id="294" r:id="rId31"/>
+    <p:sldId id="288" r:id="rId32"/>
+    <p:sldId id="295" r:id="rId33"/>
+    <p:sldId id="301" r:id="rId34"/>
+    <p:sldId id="262" r:id="rId35"/>
+    <p:sldId id="280" r:id="rId36"/>
+    <p:sldId id="263" r:id="rId37"/>
+    <p:sldId id="273" r:id="rId38"/>
   </p:sldIdLst>
   <p:sldSz cx="9144000" cy="6858000" type="screen4x3"/>
   <p:notesSz cx="6858000" cy="9144000"/>
@@ -5903,10 +5904,7 @@
           <a:bodyPr/>
           <a:lstStyle/>
           <a:p>
-            <a:r>
-              <a:rPr lang="en-US" dirty="0"/>
-              <a:t>Brief note that a lot of what I’m going to talk about has to do with the structure of my job, which is primarily project based across multiple investigators. While that specific scenario won’t hold for everyone here, the general concepts are applicable. </a:t>
-            </a:r>
+            <a:endParaRPr lang="en-US" dirty="0"/>
           </a:p>
         </p:txBody>
       </p:sp>
@@ -6031,6 +6029,197 @@
     <p:extLst>
       <p:ext uri="{BB962C8B-B14F-4D97-AF65-F5344CB8AC3E}">
         <p14:creationId xmlns:p14="http://schemas.microsoft.com/office/powerpoint/2010/main" val="44535701"/>
+      </p:ext>
+    </p:extLst>
+  </p:cSld>
+  <p:clrMapOvr>
+    <a:masterClrMapping/>
+  </p:clrMapOvr>
+</p:notes>
+</file>
+
+<file path=ppt/notesSlides/notesSlide3.xml><?xml version="1.0" encoding="utf-8"?>
+<p:notes xmlns:a="http://schemas.openxmlformats.org/drawingml/2006/main" xmlns:r="http://schemas.openxmlformats.org/officeDocument/2006/relationships" xmlns:p="http://schemas.openxmlformats.org/presentationml/2006/main">
+  <p:cSld>
+    <p:spTree>
+      <p:nvGrpSpPr>
+        <p:cNvPr id="1" name=""/>
+        <p:cNvGrpSpPr/>
+        <p:nvPr/>
+      </p:nvGrpSpPr>
+      <p:grpSpPr>
+        <a:xfrm>
+          <a:off x="0" y="0"/>
+          <a:ext cx="0" cy="0"/>
+          <a:chOff x="0" y="0"/>
+          <a:chExt cx="0" cy="0"/>
+        </a:xfrm>
+      </p:grpSpPr>
+      <p:sp>
+        <p:nvSpPr>
+          <p:cNvPr id="2" name="Slide Image Placeholder 1"/>
+          <p:cNvSpPr>
+            <a:spLocks noGrp="1" noRot="1" noChangeAspect="1"/>
+          </p:cNvSpPr>
+          <p:nvPr>
+            <p:ph type="sldImg"/>
+          </p:nvPr>
+        </p:nvSpPr>
+        <p:spPr/>
+      </p:sp>
+      <p:sp>
+        <p:nvSpPr>
+          <p:cNvPr id="3" name="Notes Placeholder 2"/>
+          <p:cNvSpPr>
+            <a:spLocks noGrp="1"/>
+          </p:cNvSpPr>
+          <p:nvPr>
+            <p:ph type="body" idx="1"/>
+          </p:nvPr>
+        </p:nvSpPr>
+        <p:spPr/>
+        <p:txBody>
+          <a:bodyPr/>
+          <a:lstStyle/>
+          <a:p>
+            <a:pPr marL="0" marR="0" lvl="0" indent="0" algn="l" defTabSz="914400" rtl="0" eaLnBrk="1" fontAlgn="auto" latinLnBrk="0" hangingPunct="1">
+              <a:lnSpc>
+                <a:spcPct val="100000"/>
+              </a:lnSpc>
+              <a:spcBef>
+                <a:spcPts val="0"/>
+              </a:spcBef>
+              <a:spcAft>
+                <a:spcPts val="0"/>
+              </a:spcAft>
+              <a:buClrTx/>
+              <a:buSzTx/>
+              <a:buFontTx/>
+              <a:buNone/>
+              <a:tabLst/>
+              <a:defRPr/>
+            </a:pPr>
+            <a:r>
+              <a:rPr lang="en-US" dirty="0"/>
+              <a:t>Brief note that a lot of what I’m going to talk about has to do with the structure of my job, which is primarily project based across multiple investigators. While that specific scenario won’t hold for everyone here, the general concepts are applicable. </a:t>
+            </a:r>
+          </a:p>
+        </p:txBody>
+      </p:sp>
+      <p:sp>
+        <p:nvSpPr>
+          <p:cNvPr id="4" name="Slide Number Placeholder 3"/>
+          <p:cNvSpPr>
+            <a:spLocks noGrp="1"/>
+          </p:cNvSpPr>
+          <p:nvPr>
+            <p:ph type="sldNum" sz="quarter" idx="5"/>
+          </p:nvPr>
+        </p:nvSpPr>
+        <p:spPr/>
+        <p:txBody>
+          <a:bodyPr/>
+          <a:lstStyle/>
+          <a:p>
+            <a:fld id="{9C5C8B17-D1C9-48DD-A1B1-EDA1E362804A}" type="slidenum">
+              <a:rPr lang="en-US" smtClean="0"/>
+              <a:t>5</a:t>
+            </a:fld>
+            <a:endParaRPr lang="en-US"/>
+          </a:p>
+        </p:txBody>
+      </p:sp>
+    </p:spTree>
+    <p:extLst>
+      <p:ext uri="{BB962C8B-B14F-4D97-AF65-F5344CB8AC3E}">
+        <p14:creationId xmlns:p14="http://schemas.microsoft.com/office/powerpoint/2010/main" val="746084871"/>
+      </p:ext>
+    </p:extLst>
+  </p:cSld>
+  <p:clrMapOvr>
+    <a:masterClrMapping/>
+  </p:clrMapOvr>
+</p:notes>
+</file>
+
+<file path=ppt/notesSlides/notesSlide4.xml><?xml version="1.0" encoding="utf-8"?>
+<p:notes xmlns:a="http://schemas.openxmlformats.org/drawingml/2006/main" xmlns:r="http://schemas.openxmlformats.org/officeDocument/2006/relationships" xmlns:p="http://schemas.openxmlformats.org/presentationml/2006/main">
+  <p:cSld>
+    <p:spTree>
+      <p:nvGrpSpPr>
+        <p:cNvPr id="1" name=""/>
+        <p:cNvGrpSpPr/>
+        <p:nvPr/>
+      </p:nvGrpSpPr>
+      <p:grpSpPr>
+        <a:xfrm>
+          <a:off x="0" y="0"/>
+          <a:ext cx="0" cy="0"/>
+          <a:chOff x="0" y="0"/>
+          <a:chExt cx="0" cy="0"/>
+        </a:xfrm>
+      </p:grpSpPr>
+      <p:sp>
+        <p:nvSpPr>
+          <p:cNvPr id="2" name="Slide Image Placeholder 1"/>
+          <p:cNvSpPr>
+            <a:spLocks noGrp="1" noRot="1" noChangeAspect="1"/>
+          </p:cNvSpPr>
+          <p:nvPr>
+            <p:ph type="sldImg"/>
+          </p:nvPr>
+        </p:nvSpPr>
+        <p:spPr/>
+      </p:sp>
+      <p:sp>
+        <p:nvSpPr>
+          <p:cNvPr id="3" name="Notes Placeholder 2"/>
+          <p:cNvSpPr>
+            <a:spLocks noGrp="1"/>
+          </p:cNvSpPr>
+          <p:nvPr>
+            <p:ph type="body" idx="1"/>
+          </p:nvPr>
+        </p:nvSpPr>
+        <p:spPr/>
+        <p:txBody>
+          <a:bodyPr/>
+          <a:lstStyle/>
+          <a:p>
+            <a:r>
+              <a:rPr lang="en-US" dirty="0"/>
+              <a:t>For discussion: Do others do this? If so, how? In conjunction with management or separately? </a:t>
+            </a:r>
+          </a:p>
+        </p:txBody>
+      </p:sp>
+      <p:sp>
+        <p:nvSpPr>
+          <p:cNvPr id="4" name="Slide Number Placeholder 3"/>
+          <p:cNvSpPr>
+            <a:spLocks noGrp="1"/>
+          </p:cNvSpPr>
+          <p:nvPr>
+            <p:ph type="sldNum" sz="quarter" idx="5"/>
+          </p:nvPr>
+        </p:nvSpPr>
+        <p:spPr/>
+        <p:txBody>
+          <a:bodyPr/>
+          <a:lstStyle/>
+          <a:p>
+            <a:fld id="{9C5C8B17-D1C9-48DD-A1B1-EDA1E362804A}" type="slidenum">
+              <a:rPr lang="en-US" smtClean="0"/>
+              <a:t>33</a:t>
+            </a:fld>
+            <a:endParaRPr lang="en-US"/>
+          </a:p>
+        </p:txBody>
+      </p:sp>
+    </p:spTree>
+    <p:extLst>
+      <p:ext uri="{BB962C8B-B14F-4D97-AF65-F5344CB8AC3E}">
+        <p14:creationId xmlns:p14="http://schemas.microsoft.com/office/powerpoint/2010/main" val="3374403230"/>
       </p:ext>
     </p:extLst>
   </p:cSld>
@@ -8356,17 +8545,17 @@
           </a:ln>
           <a:extLst>
             <a:ext uri="{FAA26D3D-D897-4be2-8F04-BA451C77F1D7}">
-              <ma14:placeholderFlag xmlns="" xmlns:ma14="http://schemas.microsoft.com/office/mac/drawingml/2011/main" val="1"/>
+              <ma14:placeholderFlag xmlns:ma14="http://schemas.microsoft.com/office/mac/drawingml/2011/main" xmlns="" val="1"/>
             </a:ext>
             <a:ext uri="{909E8E84-426E-40dd-AFC4-6F175D3DCCD1}">
-              <a14:hiddenFill xmlns="" xmlns:a14="http://schemas.microsoft.com/office/drawing/2010/main">
+              <a14:hiddenFill xmlns:a14="http://schemas.microsoft.com/office/drawing/2010/main" xmlns="">
                 <a:solidFill>
                   <a:srgbClr val="FFFFFF"/>
                 </a:solidFill>
               </a14:hiddenFill>
             </a:ext>
             <a:ext uri="{91240B29-F687-4f45-9708-019B960494DF}">
-              <a14:hiddenLine xmlns="" xmlns:a14="http://schemas.microsoft.com/office/drawing/2010/main" w="9525">
+              <a14:hiddenLine xmlns:a14="http://schemas.microsoft.com/office/drawing/2010/main" xmlns="" w="9525">
                 <a:solidFill>
                   <a:srgbClr val="000000"/>
                 </a:solidFill>
@@ -8418,17 +8607,17 @@
           </a:ln>
           <a:extLst>
             <a:ext uri="{FAA26D3D-D897-4be2-8F04-BA451C77F1D7}">
-              <ma14:placeholderFlag xmlns="" xmlns:ma14="http://schemas.microsoft.com/office/mac/drawingml/2011/main" val="1"/>
+              <ma14:placeholderFlag xmlns:ma14="http://schemas.microsoft.com/office/mac/drawingml/2011/main" xmlns="" val="1"/>
             </a:ext>
             <a:ext uri="{909E8E84-426E-40dd-AFC4-6F175D3DCCD1}">
-              <a14:hiddenFill xmlns="" xmlns:a14="http://schemas.microsoft.com/office/drawing/2010/main">
+              <a14:hiddenFill xmlns:a14="http://schemas.microsoft.com/office/drawing/2010/main" xmlns="">
                 <a:solidFill>
                   <a:srgbClr val="FFFFFF"/>
                 </a:solidFill>
               </a14:hiddenFill>
             </a:ext>
             <a:ext uri="{91240B29-F687-4f45-9708-019B960494DF}">
-              <a14:hiddenLine xmlns="" xmlns:a14="http://schemas.microsoft.com/office/drawing/2010/main" w="9525">
+              <a14:hiddenLine xmlns:a14="http://schemas.microsoft.com/office/drawing/2010/main" xmlns="" w="9525">
                 <a:solidFill>
                   <a:srgbClr val="000000"/>
                 </a:solidFill>
@@ -9489,6 +9678,214 @@
           <p:cNvPr id="2" name="Title 1">
             <a:extLst>
               <a:ext uri="{FF2B5EF4-FFF2-40B4-BE49-F238E27FC236}">
+                <a16:creationId xmlns:a16="http://schemas.microsoft.com/office/drawing/2014/main" id="{BA53C0A9-0EA2-4E78-9222-7A630E1B2D0E}"/>
+              </a:ext>
+            </a:extLst>
+          </p:cNvPr>
+          <p:cNvSpPr>
+            <a:spLocks noGrp="1"/>
+          </p:cNvSpPr>
+          <p:nvPr>
+            <p:ph type="title"/>
+          </p:nvPr>
+        </p:nvSpPr>
+        <p:spPr/>
+        <p:txBody>
+          <a:bodyPr/>
+          <a:lstStyle/>
+          <a:p>
+            <a:r>
+              <a:rPr lang="en-US" dirty="0"/>
+              <a:t>Time tracking metrics: </a:t>
+            </a:r>
+            <a:r>
+              <a:rPr lang="en-US" dirty="0">
+                <a:solidFill>
+                  <a:schemeClr val="accent1"/>
+                </a:solidFill>
+              </a:rPr>
+              <a:t>Percent effort</a:t>
+            </a:r>
+          </a:p>
+        </p:txBody>
+      </p:sp>
+      <p:sp>
+        <p:nvSpPr>
+          <p:cNvPr id="3" name="Content Placeholder 2">
+            <a:extLst>
+              <a:ext uri="{FF2B5EF4-FFF2-40B4-BE49-F238E27FC236}">
+                <a16:creationId xmlns:a16="http://schemas.microsoft.com/office/drawing/2014/main" id="{04B5CE58-6E6A-4022-ABB6-093BE19552FA}"/>
+              </a:ext>
+            </a:extLst>
+          </p:cNvPr>
+          <p:cNvSpPr>
+            <a:spLocks noGrp="1"/>
+          </p:cNvSpPr>
+          <p:nvPr>
+            <p:ph idx="1"/>
+          </p:nvPr>
+        </p:nvSpPr>
+        <p:spPr/>
+        <p:txBody>
+          <a:bodyPr/>
+          <a:lstStyle/>
+          <a:p>
+            <a:r>
+              <a:rPr lang="en-US" sz="2000" dirty="0">
+                <a:solidFill>
+                  <a:schemeClr val="accent2"/>
+                </a:solidFill>
+              </a:rPr>
+              <a:t>Allocated vs expended effort</a:t>
+            </a:r>
+          </a:p>
+          <a:p>
+            <a:pPr lvl="1"/>
+            <a:r>
+              <a:rPr lang="en-US" sz="1600" dirty="0"/>
+              <a:t>Did an investigator ask for “quick help” on a project that is now taking up 30 hours a week?</a:t>
+            </a:r>
+          </a:p>
+          <a:p>
+            <a:r>
+              <a:rPr lang="en-US" sz="2000" dirty="0">
+                <a:solidFill>
+                  <a:schemeClr val="accent2"/>
+                </a:solidFill>
+              </a:rPr>
+              <a:t>Task management</a:t>
+            </a:r>
+          </a:p>
+          <a:p>
+            <a:pPr lvl="1"/>
+            <a:r>
+              <a:rPr lang="en-US" sz="1600" dirty="0"/>
+              <a:t>As a statistician, what percentage of time is spent in meetings vs doing analyses? Does this need to be rebalanced?</a:t>
+            </a:r>
+          </a:p>
+          <a:p>
+            <a:pPr lvl="1"/>
+            <a:r>
+              <a:rPr lang="en-US" sz="1600" dirty="0"/>
+              <a:t>Are the right projects/tasks being prioritized?</a:t>
+            </a:r>
+          </a:p>
+          <a:p>
+            <a:r>
+              <a:rPr lang="en-US" sz="2000" dirty="0">
+                <a:solidFill>
+                  <a:schemeClr val="accent2"/>
+                </a:solidFill>
+              </a:rPr>
+              <a:t>Comparing time invested to products generated</a:t>
+            </a:r>
+          </a:p>
+          <a:p>
+            <a:pPr lvl="1"/>
+            <a:r>
+              <a:rPr lang="en-US" sz="1600" dirty="0"/>
+              <a:t>Did an abstract take as long as a full analysis for a manuscript?</a:t>
+            </a:r>
+          </a:p>
+          <a:p>
+            <a:pPr lvl="1"/>
+            <a:r>
+              <a:rPr lang="en-US" sz="1600" dirty="0"/>
+              <a:t>For a time-intensive project, was the result multiple manuscripts? </a:t>
+            </a:r>
+          </a:p>
+          <a:p>
+            <a:r>
+              <a:rPr lang="en-US" sz="2000" dirty="0">
+                <a:solidFill>
+                  <a:schemeClr val="accent2"/>
+                </a:solidFill>
+              </a:rPr>
+              <a:t>Protecting your time</a:t>
+            </a:r>
+          </a:p>
+          <a:p>
+            <a:pPr lvl="1"/>
+            <a:r>
+              <a:rPr lang="en-US" sz="1600" dirty="0"/>
+              <a:t>What percentage of my time am I spending on professional development? Is this more or less than I want it to be?</a:t>
+            </a:r>
+          </a:p>
+          <a:p>
+            <a:pPr lvl="1"/>
+            <a:r>
+              <a:rPr lang="en-US" sz="1600" dirty="0"/>
+              <a:t>What percentage of my time am I spending on departmental activities (seminars, interviews, etc.) or other non-project work? Am I appropriately accounting for that when estimating how long it will take me to complete a project?</a:t>
+            </a:r>
+            <a:endParaRPr lang="en-US" sz="2400" dirty="0"/>
+          </a:p>
+        </p:txBody>
+      </p:sp>
+      <p:sp>
+        <p:nvSpPr>
+          <p:cNvPr id="5" name="Slide Number Placeholder 4">
+            <a:extLst>
+              <a:ext uri="{FF2B5EF4-FFF2-40B4-BE49-F238E27FC236}">
+                <a16:creationId xmlns:a16="http://schemas.microsoft.com/office/drawing/2014/main" id="{F724A194-CC38-4681-8833-1F894452ECE4}"/>
+              </a:ext>
+            </a:extLst>
+          </p:cNvPr>
+          <p:cNvSpPr>
+            <a:spLocks noGrp="1"/>
+          </p:cNvSpPr>
+          <p:nvPr>
+            <p:ph type="sldNum" sz="quarter" idx="4"/>
+          </p:nvPr>
+        </p:nvSpPr>
+        <p:spPr/>
+        <p:txBody>
+          <a:bodyPr/>
+          <a:lstStyle/>
+          <a:p>
+            <a:fld id="{1C3486A8-E8FB-4965-B61C-9B9FA7DC7BEE}" type="slidenum">
+              <a:rPr lang="en-US" smtClean="0"/>
+              <a:pPr/>
+              <a:t>10</a:t>
+            </a:fld>
+            <a:endParaRPr lang="en-US"/>
+          </a:p>
+        </p:txBody>
+      </p:sp>
+    </p:spTree>
+    <p:extLst>
+      <p:ext uri="{BB962C8B-B14F-4D97-AF65-F5344CB8AC3E}">
+        <p14:creationId xmlns:p14="http://schemas.microsoft.com/office/powerpoint/2010/main" val="1977642660"/>
+      </p:ext>
+    </p:extLst>
+  </p:cSld>
+  <p:clrMapOvr>
+    <a:masterClrMapping/>
+  </p:clrMapOvr>
+</p:sld>
+</file>
+
+<file path=ppt/slides/slide11.xml><?xml version="1.0" encoding="utf-8"?>
+<p:sld xmlns:a="http://schemas.openxmlformats.org/drawingml/2006/main" xmlns:r="http://schemas.openxmlformats.org/officeDocument/2006/relationships" xmlns:p="http://schemas.openxmlformats.org/presentationml/2006/main">
+  <p:cSld>
+    <p:spTree>
+      <p:nvGrpSpPr>
+        <p:cNvPr id="1" name=""/>
+        <p:cNvGrpSpPr/>
+        <p:nvPr/>
+      </p:nvGrpSpPr>
+      <p:grpSpPr>
+        <a:xfrm>
+          <a:off x="0" y="0"/>
+          <a:ext cx="0" cy="0"/>
+          <a:chOff x="0" y="0"/>
+          <a:chExt cx="0" cy="0"/>
+        </a:xfrm>
+      </p:grpSpPr>
+      <p:sp>
+        <p:nvSpPr>
+          <p:cNvPr id="2" name="Title 1">
+            <a:extLst>
+              <a:ext uri="{FF2B5EF4-FFF2-40B4-BE49-F238E27FC236}">
                 <a16:creationId xmlns:a16="http://schemas.microsoft.com/office/drawing/2014/main" id="{C41C5319-249F-4F8B-AD76-A1ED4DBBA85D}"/>
               </a:ext>
             </a:extLst>
@@ -9599,7 +9996,7 @@
             <a:fld id="{1C3486A8-E8FB-4965-B61C-9B9FA7DC7BEE}" type="slidenum">
               <a:rPr lang="en-US" smtClean="0"/>
               <a:pPr/>
-              <a:t>10</a:t>
+              <a:t>11</a:t>
             </a:fld>
             <a:endParaRPr lang="en-US"/>
           </a:p>
@@ -9618,7 +10015,7 @@
 </p:sld>
 </file>
 
-<file path=ppt/slides/slide11.xml><?xml version="1.0" encoding="utf-8"?>
+<file path=ppt/slides/slide12.xml><?xml version="1.0" encoding="utf-8"?>
 <p:sld xmlns:a="http://schemas.openxmlformats.org/drawingml/2006/main" xmlns:r="http://schemas.openxmlformats.org/officeDocument/2006/relationships" xmlns:p="http://schemas.openxmlformats.org/presentationml/2006/main">
   <p:cSld>
     <p:spTree>
@@ -9796,7 +10193,7 @@
             <a:fld id="{1C3486A8-E8FB-4965-B61C-9B9FA7DC7BEE}" type="slidenum">
               <a:rPr lang="en-US" smtClean="0"/>
               <a:pPr/>
-              <a:t>11</a:t>
+              <a:t>12</a:t>
             </a:fld>
             <a:endParaRPr lang="en-US"/>
           </a:p>
@@ -9815,7 +10212,7 @@
 </p:sld>
 </file>
 
-<file path=ppt/slides/slide12.xml><?xml version="1.0" encoding="utf-8"?>
+<file path=ppt/slides/slide13.xml><?xml version="1.0" encoding="utf-8"?>
 <p:sld xmlns:a="http://schemas.openxmlformats.org/drawingml/2006/main" xmlns:r="http://schemas.openxmlformats.org/officeDocument/2006/relationships" xmlns:p="http://schemas.openxmlformats.org/presentationml/2006/main">
   <p:cSld>
     <p:spTree>
@@ -9935,7 +10332,7 @@
             <a:fld id="{1C3486A8-E8FB-4965-B61C-9B9FA7DC7BEE}" type="slidenum">
               <a:rPr lang="en-US" smtClean="0"/>
               <a:pPr/>
-              <a:t>12</a:t>
+              <a:t>13</a:t>
             </a:fld>
             <a:endParaRPr lang="en-US"/>
           </a:p>
@@ -9954,7 +10351,7 @@
 </p:sld>
 </file>
 
-<file path=ppt/slides/slide13.xml><?xml version="1.0" encoding="utf-8"?>
+<file path=ppt/slides/slide14.xml><?xml version="1.0" encoding="utf-8"?>
 <p:sld xmlns:a="http://schemas.openxmlformats.org/drawingml/2006/main" xmlns:r="http://schemas.openxmlformats.org/officeDocument/2006/relationships" xmlns:p="http://schemas.openxmlformats.org/presentationml/2006/main">
   <p:cSld>
     <p:spTree>
@@ -10035,7 +10432,7 @@
             <a:fld id="{1C3486A8-E8FB-4965-B61C-9B9FA7DC7BEE}" type="slidenum">
               <a:rPr lang="en-US" smtClean="0"/>
               <a:pPr/>
-              <a:t>13</a:t>
+              <a:t>14</a:t>
             </a:fld>
             <a:endParaRPr lang="en-US"/>
           </a:p>
@@ -10054,8 +10451,8 @@
 </p:sld>
 </file>
 
-<file path=ppt/slides/slide14.xml><?xml version="1.0" encoding="utf-8"?>
-<p:sld xmlns:a="http://schemas.openxmlformats.org/drawingml/2006/main" xmlns:r="http://schemas.openxmlformats.org/officeDocument/2006/relationships" xmlns:p="http://schemas.openxmlformats.org/presentationml/2006/main">
+<file path=ppt/slides/slide15.xml><?xml version="1.0" encoding="utf-8"?>
+<p:sld xmlns:a="http://schemas.openxmlformats.org/drawingml/2006/main" xmlns:r="http://schemas.openxmlformats.org/officeDocument/2006/relationships" xmlns:p="http://schemas.openxmlformats.org/presentationml/2006/main" show="0">
   <p:cSld>
     <p:spTree>
       <p:nvGrpSpPr>
@@ -10125,7 +10522,7 @@
             <a:fld id="{1C3486A8-E8FB-4965-B61C-9B9FA7DC7BEE}" type="slidenum">
               <a:rPr lang="en-US" smtClean="0"/>
               <a:pPr/>
-              <a:t>14</a:t>
+              <a:t>15</a:t>
             </a:fld>
             <a:endParaRPr lang="en-US"/>
           </a:p>
@@ -10144,8 +10541,8 @@
 </p:sld>
 </file>
 
-<file path=ppt/slides/slide15.xml><?xml version="1.0" encoding="utf-8"?>
-<p:sld xmlns:a="http://schemas.openxmlformats.org/drawingml/2006/main" xmlns:r="http://schemas.openxmlformats.org/officeDocument/2006/relationships" xmlns:p="http://schemas.openxmlformats.org/presentationml/2006/main">
+<file path=ppt/slides/slide16.xml><?xml version="1.0" encoding="utf-8"?>
+<p:sld xmlns:a="http://schemas.openxmlformats.org/drawingml/2006/main" xmlns:r="http://schemas.openxmlformats.org/officeDocument/2006/relationships" xmlns:p="http://schemas.openxmlformats.org/presentationml/2006/main" show="0">
   <p:cSld>
     <p:spTree>
       <p:nvGrpSpPr>
@@ -10204,8 +10601,8 @@
 </p:sld>
 </file>
 
-<file path=ppt/slides/slide16.xml><?xml version="1.0" encoding="utf-8"?>
-<p:sld xmlns:a="http://schemas.openxmlformats.org/drawingml/2006/main" xmlns:r="http://schemas.openxmlformats.org/officeDocument/2006/relationships" xmlns:p="http://schemas.openxmlformats.org/presentationml/2006/main">
+<file path=ppt/slides/slide17.xml><?xml version="1.0" encoding="utf-8"?>
+<p:sld xmlns:a="http://schemas.openxmlformats.org/drawingml/2006/main" xmlns:r="http://schemas.openxmlformats.org/officeDocument/2006/relationships" xmlns:p="http://schemas.openxmlformats.org/presentationml/2006/main" show="0">
   <p:cSld>
     <p:spTree>
       <p:nvGrpSpPr>
@@ -10264,7 +10661,7 @@
 </p:sld>
 </file>
 
-<file path=ppt/slides/slide17.xml><?xml version="1.0" encoding="utf-8"?>
+<file path=ppt/slides/slide18.xml><?xml version="1.0" encoding="utf-8"?>
 <p:sld xmlns:a="http://schemas.openxmlformats.org/drawingml/2006/main" xmlns:r="http://schemas.openxmlformats.org/officeDocument/2006/relationships" xmlns:p="http://schemas.openxmlformats.org/presentationml/2006/main">
   <p:cSld>
     <p:spTree>
@@ -10405,7 +10802,7 @@
             <a:fld id="{1C3486A8-E8FB-4965-B61C-9B9FA7DC7BEE}" type="slidenum">
               <a:rPr lang="en-US" smtClean="0"/>
               <a:pPr/>
-              <a:t>17</a:t>
+              <a:t>18</a:t>
             </a:fld>
             <a:endParaRPr lang="en-US"/>
           </a:p>
@@ -10424,7 +10821,7 @@
 </p:sld>
 </file>
 
-<file path=ppt/slides/slide18.xml><?xml version="1.0" encoding="utf-8"?>
+<file path=ppt/slides/slide19.xml><?xml version="1.0" encoding="utf-8"?>
 <p:sld xmlns:a="http://schemas.openxmlformats.org/drawingml/2006/main" xmlns:r="http://schemas.openxmlformats.org/officeDocument/2006/relationships" xmlns:p="http://schemas.openxmlformats.org/presentationml/2006/main">
   <p:cSld>
     <p:spTree>
@@ -10619,7 +11016,7 @@
             <a:fld id="{1C3486A8-E8FB-4965-B61C-9B9FA7DC7BEE}" type="slidenum">
               <a:rPr lang="en-US" smtClean="0"/>
               <a:pPr/>
-              <a:t>18</a:t>
+              <a:t>19</a:t>
             </a:fld>
             <a:endParaRPr lang="en-US"/>
           </a:p>
@@ -10629,143 +11026,6 @@
     <p:extLst>
       <p:ext uri="{BB962C8B-B14F-4D97-AF65-F5344CB8AC3E}">
         <p14:creationId xmlns:p14="http://schemas.microsoft.com/office/powerpoint/2010/main" val="1345334658"/>
-      </p:ext>
-    </p:extLst>
-  </p:cSld>
-  <p:clrMapOvr>
-    <a:masterClrMapping/>
-  </p:clrMapOvr>
-</p:sld>
-</file>
-
-<file path=ppt/slides/slide19.xml><?xml version="1.0" encoding="utf-8"?>
-<p:sld xmlns:a="http://schemas.openxmlformats.org/drawingml/2006/main" xmlns:r="http://schemas.openxmlformats.org/officeDocument/2006/relationships" xmlns:p="http://schemas.openxmlformats.org/presentationml/2006/main">
-  <p:cSld>
-    <p:spTree>
-      <p:nvGrpSpPr>
-        <p:cNvPr id="1" name=""/>
-        <p:cNvGrpSpPr/>
-        <p:nvPr/>
-      </p:nvGrpSpPr>
-      <p:grpSpPr>
-        <a:xfrm>
-          <a:off x="0" y="0"/>
-          <a:ext cx="0" cy="0"/>
-          <a:chOff x="0" y="0"/>
-          <a:chExt cx="0" cy="0"/>
-        </a:xfrm>
-      </p:grpSpPr>
-      <p:sp>
-        <p:nvSpPr>
-          <p:cNvPr id="2" name="Title 1">
-            <a:extLst>
-              <a:ext uri="{FF2B5EF4-FFF2-40B4-BE49-F238E27FC236}">
-                <a16:creationId xmlns:a16="http://schemas.microsoft.com/office/drawing/2014/main" id="{66C5FB7E-AA55-4632-9059-CCAD4F92CBDB}"/>
-              </a:ext>
-            </a:extLst>
-          </p:cNvPr>
-          <p:cNvSpPr>
-            <a:spLocks noGrp="1"/>
-          </p:cNvSpPr>
-          <p:nvPr>
-            <p:ph type="title"/>
-          </p:nvPr>
-        </p:nvSpPr>
-        <p:spPr/>
-        <p:txBody>
-          <a:bodyPr/>
-          <a:lstStyle/>
-          <a:p>
-            <a:r>
-              <a:rPr lang="en-US" dirty="0"/>
-              <a:t>Workflow: Initial Setup</a:t>
-            </a:r>
-          </a:p>
-        </p:txBody>
-      </p:sp>
-      <p:sp>
-        <p:nvSpPr>
-          <p:cNvPr id="3" name="Content Placeholder 2">
-            <a:extLst>
-              <a:ext uri="{FF2B5EF4-FFF2-40B4-BE49-F238E27FC236}">
-                <a16:creationId xmlns:a16="http://schemas.microsoft.com/office/drawing/2014/main" id="{4BB3C2CE-16FB-48DF-A561-01920B9984E5}"/>
-              </a:ext>
-            </a:extLst>
-          </p:cNvPr>
-          <p:cNvSpPr>
-            <a:spLocks noGrp="1"/>
-          </p:cNvSpPr>
-          <p:nvPr>
-            <p:ph idx="1"/>
-          </p:nvPr>
-        </p:nvSpPr>
-        <p:spPr/>
-        <p:txBody>
-          <a:bodyPr/>
-          <a:lstStyle/>
-          <a:p>
-            <a:r>
-              <a:rPr lang="en-US" sz="2800" dirty="0"/>
-              <a:t>Fork the GitHub repo</a:t>
-            </a:r>
-          </a:p>
-          <a:p>
-            <a:pPr lvl="1"/>
-            <a:r>
-              <a:rPr lang="en-US" sz="2400" dirty="0"/>
-              <a:t>Includes a template time tracker and template project tracker tab</a:t>
-            </a:r>
-          </a:p>
-          <a:p>
-            <a:pPr lvl="1"/>
-            <a:r>
-              <a:rPr lang="en-US" sz="2400" dirty="0"/>
-              <a:t>Time tracker is where you log your hours</a:t>
-            </a:r>
-          </a:p>
-          <a:p>
-            <a:pPr lvl="1"/>
-            <a:r>
-              <a:rPr lang="en-US" sz="2400" dirty="0"/>
-              <a:t>Project tracker summarizes information like principal investigator (PI), deliverable, status, etc. </a:t>
-            </a:r>
-          </a:p>
-        </p:txBody>
-      </p:sp>
-      <p:sp>
-        <p:nvSpPr>
-          <p:cNvPr id="5" name="Slide Number Placeholder 4">
-            <a:extLst>
-              <a:ext uri="{FF2B5EF4-FFF2-40B4-BE49-F238E27FC236}">
-                <a16:creationId xmlns:a16="http://schemas.microsoft.com/office/drawing/2014/main" id="{B9CDBA7F-368A-422F-9298-95BFF8C25998}"/>
-              </a:ext>
-            </a:extLst>
-          </p:cNvPr>
-          <p:cNvSpPr>
-            <a:spLocks noGrp="1"/>
-          </p:cNvSpPr>
-          <p:nvPr>
-            <p:ph type="sldNum" sz="quarter" idx="4"/>
-          </p:nvPr>
-        </p:nvSpPr>
-        <p:spPr/>
-        <p:txBody>
-          <a:bodyPr/>
-          <a:lstStyle/>
-          <a:p>
-            <a:fld id="{1C3486A8-E8FB-4965-B61C-9B9FA7DC7BEE}" type="slidenum">
-              <a:rPr lang="en-US" smtClean="0"/>
-              <a:pPr/>
-              <a:t>19</a:t>
-            </a:fld>
-            <a:endParaRPr lang="en-US"/>
-          </a:p>
-        </p:txBody>
-      </p:sp>
-    </p:spTree>
-    <p:extLst>
-      <p:ext uri="{BB962C8B-B14F-4D97-AF65-F5344CB8AC3E}">
-        <p14:creationId xmlns:p14="http://schemas.microsoft.com/office/powerpoint/2010/main" val="2504891058"/>
       </p:ext>
     </p:extLst>
   </p:cSld>
@@ -11041,6 +11301,143 @@
           <p:cNvPr id="2" name="Title 1">
             <a:extLst>
               <a:ext uri="{FF2B5EF4-FFF2-40B4-BE49-F238E27FC236}">
+                <a16:creationId xmlns:a16="http://schemas.microsoft.com/office/drawing/2014/main" id="{66C5FB7E-AA55-4632-9059-CCAD4F92CBDB}"/>
+              </a:ext>
+            </a:extLst>
+          </p:cNvPr>
+          <p:cNvSpPr>
+            <a:spLocks noGrp="1"/>
+          </p:cNvSpPr>
+          <p:nvPr>
+            <p:ph type="title"/>
+          </p:nvPr>
+        </p:nvSpPr>
+        <p:spPr/>
+        <p:txBody>
+          <a:bodyPr/>
+          <a:lstStyle/>
+          <a:p>
+            <a:r>
+              <a:rPr lang="en-US" dirty="0"/>
+              <a:t>Workflow: Initial Setup</a:t>
+            </a:r>
+          </a:p>
+        </p:txBody>
+      </p:sp>
+      <p:sp>
+        <p:nvSpPr>
+          <p:cNvPr id="3" name="Content Placeholder 2">
+            <a:extLst>
+              <a:ext uri="{FF2B5EF4-FFF2-40B4-BE49-F238E27FC236}">
+                <a16:creationId xmlns:a16="http://schemas.microsoft.com/office/drawing/2014/main" id="{4BB3C2CE-16FB-48DF-A561-01920B9984E5}"/>
+              </a:ext>
+            </a:extLst>
+          </p:cNvPr>
+          <p:cNvSpPr>
+            <a:spLocks noGrp="1"/>
+          </p:cNvSpPr>
+          <p:nvPr>
+            <p:ph idx="1"/>
+          </p:nvPr>
+        </p:nvSpPr>
+        <p:spPr/>
+        <p:txBody>
+          <a:bodyPr/>
+          <a:lstStyle/>
+          <a:p>
+            <a:r>
+              <a:rPr lang="en-US" sz="2800" dirty="0"/>
+              <a:t>Fork the GitHub repo</a:t>
+            </a:r>
+          </a:p>
+          <a:p>
+            <a:pPr lvl="1"/>
+            <a:r>
+              <a:rPr lang="en-US" sz="2400" dirty="0"/>
+              <a:t>Includes a template time tracker and template project tracker tab</a:t>
+            </a:r>
+          </a:p>
+          <a:p>
+            <a:pPr lvl="1"/>
+            <a:r>
+              <a:rPr lang="en-US" sz="2400" dirty="0"/>
+              <a:t>Time tracker is where you log your hours</a:t>
+            </a:r>
+          </a:p>
+          <a:p>
+            <a:pPr lvl="1"/>
+            <a:r>
+              <a:rPr lang="en-US" sz="2400" dirty="0"/>
+              <a:t>Project tracker summarizes information like principal investigator (PI), deliverable, status, etc. </a:t>
+            </a:r>
+          </a:p>
+        </p:txBody>
+      </p:sp>
+      <p:sp>
+        <p:nvSpPr>
+          <p:cNvPr id="5" name="Slide Number Placeholder 4">
+            <a:extLst>
+              <a:ext uri="{FF2B5EF4-FFF2-40B4-BE49-F238E27FC236}">
+                <a16:creationId xmlns:a16="http://schemas.microsoft.com/office/drawing/2014/main" id="{B9CDBA7F-368A-422F-9298-95BFF8C25998}"/>
+              </a:ext>
+            </a:extLst>
+          </p:cNvPr>
+          <p:cNvSpPr>
+            <a:spLocks noGrp="1"/>
+          </p:cNvSpPr>
+          <p:nvPr>
+            <p:ph type="sldNum" sz="quarter" idx="4"/>
+          </p:nvPr>
+        </p:nvSpPr>
+        <p:spPr/>
+        <p:txBody>
+          <a:bodyPr/>
+          <a:lstStyle/>
+          <a:p>
+            <a:fld id="{1C3486A8-E8FB-4965-B61C-9B9FA7DC7BEE}" type="slidenum">
+              <a:rPr lang="en-US" smtClean="0"/>
+              <a:pPr/>
+              <a:t>20</a:t>
+            </a:fld>
+            <a:endParaRPr lang="en-US"/>
+          </a:p>
+        </p:txBody>
+      </p:sp>
+    </p:spTree>
+    <p:extLst>
+      <p:ext uri="{BB962C8B-B14F-4D97-AF65-F5344CB8AC3E}">
+        <p14:creationId xmlns:p14="http://schemas.microsoft.com/office/powerpoint/2010/main" val="2504891058"/>
+      </p:ext>
+    </p:extLst>
+  </p:cSld>
+  <p:clrMapOvr>
+    <a:masterClrMapping/>
+  </p:clrMapOvr>
+</p:sld>
+</file>
+
+<file path=ppt/slides/slide21.xml><?xml version="1.0" encoding="utf-8"?>
+<p:sld xmlns:a="http://schemas.openxmlformats.org/drawingml/2006/main" xmlns:r="http://schemas.openxmlformats.org/officeDocument/2006/relationships" xmlns:p="http://schemas.openxmlformats.org/presentationml/2006/main">
+  <p:cSld>
+    <p:spTree>
+      <p:nvGrpSpPr>
+        <p:cNvPr id="1" name=""/>
+        <p:cNvGrpSpPr/>
+        <p:nvPr/>
+      </p:nvGrpSpPr>
+      <p:grpSpPr>
+        <a:xfrm>
+          <a:off x="0" y="0"/>
+          <a:ext cx="0" cy="0"/>
+          <a:chOff x="0" y="0"/>
+          <a:chExt cx="0" cy="0"/>
+        </a:xfrm>
+      </p:grpSpPr>
+      <p:sp>
+        <p:nvSpPr>
+          <p:cNvPr id="2" name="Title 1">
+            <a:extLst>
+              <a:ext uri="{FF2B5EF4-FFF2-40B4-BE49-F238E27FC236}">
                 <a16:creationId xmlns:a16="http://schemas.microsoft.com/office/drawing/2014/main" id="{62B8DA5F-8D8E-4082-8CDD-30506B88D6AB}"/>
               </a:ext>
             </a:extLst>
@@ -11148,7 +11545,7 @@
             <a:fld id="{1C3486A8-E8FB-4965-B61C-9B9FA7DC7BEE}" type="slidenum">
               <a:rPr lang="en-US" smtClean="0"/>
               <a:pPr/>
-              <a:t>20</a:t>
+              <a:t>21</a:t>
             </a:fld>
             <a:endParaRPr lang="en-US"/>
           </a:p>
@@ -11167,7 +11564,7 @@
 </p:sld>
 </file>
 
-<file path=ppt/slides/slide21.xml><?xml version="1.0" encoding="utf-8"?>
+<file path=ppt/slides/slide22.xml><?xml version="1.0" encoding="utf-8"?>
 <p:sld xmlns:a="http://schemas.openxmlformats.org/drawingml/2006/main" xmlns:r="http://schemas.openxmlformats.org/officeDocument/2006/relationships" xmlns:p="http://schemas.openxmlformats.org/presentationml/2006/main">
   <p:cSld>
     <p:spTree>
@@ -11296,7 +11693,7 @@
             <a:fld id="{1C3486A8-E8FB-4965-B61C-9B9FA7DC7BEE}" type="slidenum">
               <a:rPr lang="en-US" smtClean="0"/>
               <a:pPr/>
-              <a:t>21</a:t>
+              <a:t>22</a:t>
             </a:fld>
             <a:endParaRPr lang="en-US"/>
           </a:p>
@@ -11315,7 +11712,7 @@
 </p:sld>
 </file>
 
-<file path=ppt/slides/slide22.xml><?xml version="1.0" encoding="utf-8"?>
+<file path=ppt/slides/slide23.xml><?xml version="1.0" encoding="utf-8"?>
 <p:sld xmlns:a="http://schemas.openxmlformats.org/drawingml/2006/main" xmlns:r="http://schemas.openxmlformats.org/officeDocument/2006/relationships" xmlns:p="http://schemas.openxmlformats.org/presentationml/2006/main">
   <p:cSld>
     <p:spTree>
@@ -11449,7 +11846,7 @@
             <a:fld id="{1C3486A8-E8FB-4965-B61C-9B9FA7DC7BEE}" type="slidenum">
               <a:rPr lang="en-US" smtClean="0"/>
               <a:pPr/>
-              <a:t>22</a:t>
+              <a:t>23</a:t>
             </a:fld>
             <a:endParaRPr lang="en-US"/>
           </a:p>
@@ -11468,7 +11865,7 @@
 </p:sld>
 </file>
 
-<file path=ppt/slides/slide23.xml><?xml version="1.0" encoding="utf-8"?>
+<file path=ppt/slides/slide24.xml><?xml version="1.0" encoding="utf-8"?>
 <p:sld xmlns:a="http://schemas.openxmlformats.org/drawingml/2006/main" xmlns:r="http://schemas.openxmlformats.org/officeDocument/2006/relationships" xmlns:p="http://schemas.openxmlformats.org/presentationml/2006/main">
   <p:cSld>
     <p:spTree>
@@ -11638,7 +12035,7 @@
             <a:fld id="{1C3486A8-E8FB-4965-B61C-9B9FA7DC7BEE}" type="slidenum">
               <a:rPr lang="en-US" smtClean="0"/>
               <a:pPr/>
-              <a:t>23</a:t>
+              <a:t>24</a:t>
             </a:fld>
             <a:endParaRPr lang="en-US"/>
           </a:p>
@@ -11657,7 +12054,7 @@
 </p:sld>
 </file>
 
-<file path=ppt/slides/slide24.xml><?xml version="1.0" encoding="utf-8"?>
+<file path=ppt/slides/slide25.xml><?xml version="1.0" encoding="utf-8"?>
 <p:sld xmlns:a="http://schemas.openxmlformats.org/drawingml/2006/main" xmlns:r="http://schemas.openxmlformats.org/officeDocument/2006/relationships" xmlns:p="http://schemas.openxmlformats.org/presentationml/2006/main">
   <p:cSld>
     <p:spTree>
@@ -11761,7 +12158,7 @@
             <a:fld id="{1C3486A8-E8FB-4965-B61C-9B9FA7DC7BEE}" type="slidenum">
               <a:rPr lang="en-US" smtClean="0"/>
               <a:pPr/>
-              <a:t>24</a:t>
+              <a:t>25</a:t>
             </a:fld>
             <a:endParaRPr lang="en-US"/>
           </a:p>
@@ -11780,7 +12177,7 @@
 </p:sld>
 </file>
 
-<file path=ppt/slides/slide25.xml><?xml version="1.0" encoding="utf-8"?>
+<file path=ppt/slides/slide26.xml><?xml version="1.0" encoding="utf-8"?>
 <p:sld xmlns:a="http://schemas.openxmlformats.org/drawingml/2006/main" xmlns:r="http://schemas.openxmlformats.org/officeDocument/2006/relationships" xmlns:p="http://schemas.openxmlformats.org/presentationml/2006/main">
   <p:cSld>
     <p:spTree>
@@ -11908,7 +12305,7 @@
             <a:fld id="{1C3486A8-E8FB-4965-B61C-9B9FA7DC7BEE}" type="slidenum">
               <a:rPr lang="en-US" smtClean="0"/>
               <a:pPr/>
-              <a:t>25</a:t>
+              <a:t>26</a:t>
             </a:fld>
             <a:endParaRPr lang="en-US"/>
           </a:p>
@@ -11927,7 +12324,7 @@
 </p:sld>
 </file>
 
-<file path=ppt/slides/slide26.xml><?xml version="1.0" encoding="utf-8"?>
+<file path=ppt/slides/slide27.xml><?xml version="1.0" encoding="utf-8"?>
 <p:sld xmlns:a="http://schemas.openxmlformats.org/drawingml/2006/main" xmlns:r="http://schemas.openxmlformats.org/officeDocument/2006/relationships" xmlns:p="http://schemas.openxmlformats.org/presentationml/2006/main">
   <p:cSld>
     <p:spTree>
@@ -12413,7 +12810,7 @@
             <a:fld id="{1C3486A8-E8FB-4965-B61C-9B9FA7DC7BEE}" type="slidenum">
               <a:rPr lang="en-US" smtClean="0"/>
               <a:pPr/>
-              <a:t>26</a:t>
+              <a:t>27</a:t>
             </a:fld>
             <a:endParaRPr lang="en-US"/>
           </a:p>
@@ -12432,7 +12829,7 @@
 </p:sld>
 </file>
 
-<file path=ppt/slides/slide27.xml><?xml version="1.0" encoding="utf-8"?>
+<file path=ppt/slides/slide28.xml><?xml version="1.0" encoding="utf-8"?>
 <p:sld xmlns:a="http://schemas.openxmlformats.org/drawingml/2006/main" xmlns:r="http://schemas.openxmlformats.org/officeDocument/2006/relationships" xmlns:p="http://schemas.openxmlformats.org/presentationml/2006/main">
   <p:cSld>
     <p:spTree>
@@ -12541,36 +12938,6 @@
           </a:p>
         </p:txBody>
       </p:sp>
-      <p:pic>
-        <p:nvPicPr>
-          <p:cNvPr id="6" name="Picture 5">
-            <a:extLst>
-              <a:ext uri="{FF2B5EF4-FFF2-40B4-BE49-F238E27FC236}">
-                <a16:creationId xmlns:a16="http://schemas.microsoft.com/office/drawing/2014/main" id="{09E5C800-8678-416A-984C-240EF950D5E6}"/>
-              </a:ext>
-            </a:extLst>
-          </p:cNvPr>
-          <p:cNvPicPr>
-            <a:picLocks noChangeAspect="1"/>
-          </p:cNvPicPr>
-          <p:nvPr/>
-        </p:nvPicPr>
-        <p:blipFill>
-          <a:blip r:embed="rId2"/>
-          <a:stretch>
-            <a:fillRect/>
-          </a:stretch>
-        </p:blipFill>
-        <p:spPr>
-          <a:xfrm>
-            <a:off x="0" y="2217451"/>
-            <a:ext cx="9144000" cy="3821592"/>
-          </a:xfrm>
-          <a:prstGeom prst="rect">
-            <a:avLst/>
-          </a:prstGeom>
-        </p:spPr>
-      </p:pic>
       <p:sp>
         <p:nvSpPr>
           <p:cNvPr id="5" name="Slide Number Placeholder 4">
@@ -12595,12 +12962,42 @@
             <a:fld id="{1C3486A8-E8FB-4965-B61C-9B9FA7DC7BEE}" type="slidenum">
               <a:rPr lang="en-US" smtClean="0"/>
               <a:pPr/>
-              <a:t>27</a:t>
+              <a:t>28</a:t>
             </a:fld>
             <a:endParaRPr lang="en-US"/>
           </a:p>
         </p:txBody>
       </p:sp>
+      <p:pic>
+        <p:nvPicPr>
+          <p:cNvPr id="4" name="Picture 3">
+            <a:extLst>
+              <a:ext uri="{FF2B5EF4-FFF2-40B4-BE49-F238E27FC236}">
+                <a16:creationId xmlns:a16="http://schemas.microsoft.com/office/drawing/2014/main" id="{5239F43E-C41E-4FBB-B19F-D11595494C72}"/>
+              </a:ext>
+            </a:extLst>
+          </p:cNvPr>
+          <p:cNvPicPr>
+            <a:picLocks noChangeAspect="1"/>
+          </p:cNvPicPr>
+          <p:nvPr/>
+        </p:nvPicPr>
+        <p:blipFill>
+          <a:blip r:embed="rId2"/>
+          <a:stretch>
+            <a:fillRect/>
+          </a:stretch>
+        </p:blipFill>
+        <p:spPr>
+          <a:xfrm>
+            <a:off x="0" y="2313761"/>
+            <a:ext cx="9144000" cy="3611806"/>
+          </a:xfrm>
+          <a:prstGeom prst="rect">
+            <a:avLst/>
+          </a:prstGeom>
+        </p:spPr>
+      </p:pic>
     </p:spTree>
     <p:extLst>
       <p:ext uri="{BB962C8B-B14F-4D97-AF65-F5344CB8AC3E}">
@@ -12614,7 +13011,7 @@
 </p:sld>
 </file>
 
-<file path=ppt/slides/slide28.xml><?xml version="1.0" encoding="utf-8"?>
+<file path=ppt/slides/slide29.xml><?xml version="1.0" encoding="utf-8"?>
 <p:sld xmlns:a="http://schemas.openxmlformats.org/drawingml/2006/main" xmlns:r="http://schemas.openxmlformats.org/officeDocument/2006/relationships" xmlns:p="http://schemas.openxmlformats.org/presentationml/2006/main">
   <p:cSld>
     <p:spTree>
@@ -12654,7 +13051,7 @@
           <a:p>
             <a:r>
               <a:rPr lang="en-US" dirty="0"/>
-              <a:t>Gantt chart</a:t>
+              <a:t>Gantt chart: Data wrangling</a:t>
             </a:r>
           </a:p>
         </p:txBody>
@@ -12684,12 +13081,8 @@
               <a:buNone/>
             </a:pPr>
             <a:r>
-              <a:rPr lang="en-US" sz="2400" b="1" dirty="0"/>
-              <a:t>Data wrangling:</a:t>
-            </a:r>
-            <a:r>
               <a:rPr lang="en-US" sz="2400" dirty="0"/>
-              <a:t> Summarize hourly data into project phase start / stop times</a:t>
+              <a:t>Summarize hourly data into project phase start / stop times</a:t>
             </a:r>
           </a:p>
         </p:txBody>
@@ -12928,7 +13321,7 @@
             <a:fld id="{1C3486A8-E8FB-4965-B61C-9B9FA7DC7BEE}" type="slidenum">
               <a:rPr lang="en-US" smtClean="0"/>
               <a:pPr/>
-              <a:t>28</a:t>
+              <a:t>29</a:t>
             </a:fld>
             <a:endParaRPr lang="en-US"/>
           </a:p>
@@ -12938,924 +13331,6 @@
     <p:extLst>
       <p:ext uri="{BB962C8B-B14F-4D97-AF65-F5344CB8AC3E}">
         <p14:creationId xmlns:p14="http://schemas.microsoft.com/office/powerpoint/2010/main" val="1849953722"/>
-      </p:ext>
-    </p:extLst>
-  </p:cSld>
-  <p:clrMapOvr>
-    <a:masterClrMapping/>
-  </p:clrMapOvr>
-</p:sld>
-</file>
-
-<file path=ppt/slides/slide29.xml><?xml version="1.0" encoding="utf-8"?>
-<p:sld xmlns:a="http://schemas.openxmlformats.org/drawingml/2006/main" xmlns:r="http://schemas.openxmlformats.org/officeDocument/2006/relationships" xmlns:p="http://schemas.openxmlformats.org/presentationml/2006/main">
-  <p:cSld>
-    <p:spTree>
-      <p:nvGrpSpPr>
-        <p:cNvPr id="1" name=""/>
-        <p:cNvGrpSpPr/>
-        <p:nvPr/>
-      </p:nvGrpSpPr>
-      <p:grpSpPr>
-        <a:xfrm>
-          <a:off x="0" y="0"/>
-          <a:ext cx="0" cy="0"/>
-          <a:chOff x="0" y="0"/>
-          <a:chExt cx="0" cy="0"/>
-        </a:xfrm>
-      </p:grpSpPr>
-      <p:sp>
-        <p:nvSpPr>
-          <p:cNvPr id="2" name="Title 1">
-            <a:extLst>
-              <a:ext uri="{FF2B5EF4-FFF2-40B4-BE49-F238E27FC236}">
-                <a16:creationId xmlns:a16="http://schemas.microsoft.com/office/drawing/2014/main" id="{213736E0-77B2-4109-9DA0-AC5C744247E8}"/>
-              </a:ext>
-            </a:extLst>
-          </p:cNvPr>
-          <p:cNvSpPr>
-            <a:spLocks noGrp="1"/>
-          </p:cNvSpPr>
-          <p:nvPr>
-            <p:ph type="title"/>
-          </p:nvPr>
-        </p:nvSpPr>
-        <p:spPr/>
-        <p:txBody>
-          <a:bodyPr/>
-          <a:lstStyle/>
-          <a:p>
-            <a:r>
-              <a:rPr lang="en-US" dirty="0"/>
-              <a:t>Gantt chart</a:t>
-            </a:r>
-          </a:p>
-        </p:txBody>
-      </p:sp>
-      <p:sp>
-        <p:nvSpPr>
-          <p:cNvPr id="4" name="Rectangle 3">
-            <a:extLst>
-              <a:ext uri="{FF2B5EF4-FFF2-40B4-BE49-F238E27FC236}">
-                <a16:creationId xmlns:a16="http://schemas.microsoft.com/office/drawing/2014/main" id="{FAA39DE1-00CB-442F-807E-ABC638B25941}"/>
-              </a:ext>
-            </a:extLst>
-          </p:cNvPr>
-          <p:cNvSpPr/>
-          <p:nvPr/>
-        </p:nvSpPr>
-        <p:spPr>
-          <a:xfrm>
-            <a:off x="457199" y="1010107"/>
-            <a:ext cx="8686801" cy="2831544"/>
-          </a:xfrm>
-          <a:prstGeom prst="rect">
-            <a:avLst/>
-          </a:prstGeom>
-        </p:spPr>
-        <p:txBody>
-          <a:bodyPr wrap="square">
-            <a:spAutoFit/>
-          </a:bodyPr>
-          <a:lstStyle/>
-          <a:p>
-            <a:r>
-              <a:rPr lang="en-US" sz="2000" b="1" dirty="0">
-                <a:latin typeface="Arial"/>
-                <a:cs typeface="Arial"/>
-              </a:rPr>
-              <a:t>Data viz:</a:t>
-            </a:r>
-            <a:br>
-              <a:rPr lang="en-US" sz="1400" dirty="0"/>
-            </a:br>
-            <a:r>
-              <a:rPr lang="en-US" sz="1400" dirty="0">
-                <a:latin typeface="Courier"/>
-              </a:rPr>
-              <a:t>    </a:t>
-            </a:r>
-            <a:r>
-              <a:rPr lang="en-US" sz="1400" b="1" dirty="0" err="1">
-                <a:solidFill>
-                  <a:srgbClr val="007020"/>
-                </a:solidFill>
-                <a:latin typeface="Courier"/>
-              </a:rPr>
-              <a:t>ggplot</a:t>
-            </a:r>
-            <a:r>
-              <a:rPr lang="en-US" sz="1400" dirty="0">
-                <a:latin typeface="Courier"/>
-              </a:rPr>
-              <a:t>(</a:t>
-            </a:r>
-            <a:r>
-              <a:rPr lang="en-US" sz="1400" dirty="0" err="1">
-                <a:latin typeface="Courier"/>
-              </a:rPr>
-              <a:t>phase_filtered</a:t>
-            </a:r>
-            <a:r>
-              <a:rPr lang="en-US" sz="1400" dirty="0">
-                <a:latin typeface="Courier"/>
-              </a:rPr>
-              <a:t>) </a:t>
-            </a:r>
-            <a:r>
-              <a:rPr lang="en-US" sz="1400" dirty="0">
-                <a:solidFill>
-                  <a:srgbClr val="666666"/>
-                </a:solidFill>
-                <a:latin typeface="Courier"/>
-              </a:rPr>
-              <a:t>+</a:t>
-            </a:r>
-            <a:br>
-              <a:rPr lang="en-US" sz="1400" dirty="0"/>
-            </a:br>
-            <a:r>
-              <a:rPr lang="en-US" sz="1400" dirty="0">
-                <a:solidFill>
-                  <a:srgbClr val="4070A0"/>
-                </a:solidFill>
-                <a:latin typeface="Courier"/>
-              </a:rPr>
-              <a:t>      </a:t>
-            </a:r>
-            <a:r>
-              <a:rPr lang="en-US" sz="1400" b="1" dirty="0" err="1">
-                <a:solidFill>
-                  <a:srgbClr val="007020"/>
-                </a:solidFill>
-                <a:latin typeface="Courier"/>
-              </a:rPr>
-              <a:t>geom_segment</a:t>
-            </a:r>
-            <a:r>
-              <a:rPr lang="en-US" sz="1400" dirty="0">
-                <a:latin typeface="Courier"/>
-              </a:rPr>
-              <a:t>(</a:t>
-            </a:r>
-            <a:r>
-              <a:rPr lang="en-US" sz="1400" b="1" dirty="0" err="1">
-                <a:solidFill>
-                  <a:srgbClr val="007020"/>
-                </a:solidFill>
-                <a:latin typeface="Courier"/>
-              </a:rPr>
-              <a:t>aes</a:t>
-            </a:r>
-            <a:r>
-              <a:rPr lang="en-US" sz="1400" dirty="0">
-                <a:latin typeface="Courier"/>
-              </a:rPr>
-              <a:t>(</a:t>
-            </a:r>
-            <a:r>
-              <a:rPr lang="en-US" sz="1400" dirty="0">
-                <a:solidFill>
-                  <a:srgbClr val="902000"/>
-                </a:solidFill>
-                <a:latin typeface="Courier"/>
-              </a:rPr>
-              <a:t>x =</a:t>
-            </a:r>
-            <a:r>
-              <a:rPr lang="en-US" sz="1400" dirty="0">
-                <a:latin typeface="Courier"/>
-              </a:rPr>
-              <a:t> </a:t>
-            </a:r>
-            <a:r>
-              <a:rPr lang="en-US" sz="1400" dirty="0" err="1">
-                <a:latin typeface="Courier"/>
-              </a:rPr>
-              <a:t>start_dt</a:t>
-            </a:r>
-            <a:r>
-              <a:rPr lang="en-US" sz="1400" dirty="0">
-                <a:latin typeface="Courier"/>
-              </a:rPr>
-              <a:t>, </a:t>
-            </a:r>
-            <a:r>
-              <a:rPr lang="en-US" sz="1400" dirty="0" err="1">
-                <a:solidFill>
-                  <a:srgbClr val="902000"/>
-                </a:solidFill>
-                <a:latin typeface="Courier"/>
-              </a:rPr>
-              <a:t>xend</a:t>
-            </a:r>
-            <a:r>
-              <a:rPr lang="en-US" sz="1400" dirty="0">
-                <a:solidFill>
-                  <a:srgbClr val="902000"/>
-                </a:solidFill>
-                <a:latin typeface="Courier"/>
-              </a:rPr>
-              <a:t> =</a:t>
-            </a:r>
-            <a:r>
-              <a:rPr lang="en-US" sz="1400" dirty="0">
-                <a:latin typeface="Courier"/>
-              </a:rPr>
-              <a:t> </a:t>
-            </a:r>
-            <a:r>
-              <a:rPr lang="en-US" sz="1400" dirty="0" err="1">
-                <a:latin typeface="Courier"/>
-              </a:rPr>
-              <a:t>end_dt</a:t>
-            </a:r>
-            <a:r>
-              <a:rPr lang="en-US" sz="1400" dirty="0">
-                <a:latin typeface="Courier"/>
-              </a:rPr>
-              <a:t>, </a:t>
-            </a:r>
-            <a:br>
-              <a:rPr lang="en-US" sz="1400" dirty="0"/>
-            </a:br>
-            <a:r>
-              <a:rPr lang="en-US" sz="1400" dirty="0">
-                <a:latin typeface="Courier"/>
-              </a:rPr>
-              <a:t>                       </a:t>
-            </a:r>
-            <a:r>
-              <a:rPr lang="en-US" sz="1400" dirty="0">
-                <a:solidFill>
-                  <a:srgbClr val="902000"/>
-                </a:solidFill>
-                <a:latin typeface="Courier"/>
-              </a:rPr>
-              <a:t>y =</a:t>
-            </a:r>
-            <a:r>
-              <a:rPr lang="en-US" sz="1400" dirty="0">
-                <a:latin typeface="Courier"/>
-              </a:rPr>
-              <a:t> </a:t>
-            </a:r>
-            <a:r>
-              <a:rPr lang="en-US" sz="1400" dirty="0" err="1">
-                <a:latin typeface="Courier"/>
-              </a:rPr>
-              <a:t>study_title</a:t>
-            </a:r>
-            <a:r>
-              <a:rPr lang="en-US" sz="1400" dirty="0">
-                <a:latin typeface="Courier"/>
-              </a:rPr>
-              <a:t>, </a:t>
-            </a:r>
-            <a:r>
-              <a:rPr lang="en-US" sz="1400" dirty="0" err="1">
-                <a:solidFill>
-                  <a:srgbClr val="902000"/>
-                </a:solidFill>
-                <a:latin typeface="Courier"/>
-              </a:rPr>
-              <a:t>yend</a:t>
-            </a:r>
-            <a:r>
-              <a:rPr lang="en-US" sz="1400" dirty="0">
-                <a:solidFill>
-                  <a:srgbClr val="902000"/>
-                </a:solidFill>
-                <a:latin typeface="Courier"/>
-              </a:rPr>
-              <a:t> =</a:t>
-            </a:r>
-            <a:r>
-              <a:rPr lang="en-US" sz="1400" dirty="0">
-                <a:latin typeface="Courier"/>
-              </a:rPr>
-              <a:t> </a:t>
-            </a:r>
-            <a:r>
-              <a:rPr lang="en-US" sz="1400" dirty="0" err="1">
-                <a:latin typeface="Courier"/>
-              </a:rPr>
-              <a:t>study_title</a:t>
-            </a:r>
-            <a:r>
-              <a:rPr lang="en-US" sz="1400" dirty="0">
-                <a:latin typeface="Courier"/>
-              </a:rPr>
-              <a:t>, </a:t>
-            </a:r>
-            <a:br>
-              <a:rPr lang="en-US" sz="1400" dirty="0"/>
-            </a:br>
-            <a:r>
-              <a:rPr lang="en-US" sz="1400" dirty="0">
-                <a:latin typeface="Courier"/>
-              </a:rPr>
-              <a:t>                       </a:t>
-            </a:r>
-            <a:r>
-              <a:rPr lang="en-US" sz="1400" dirty="0" err="1">
-                <a:solidFill>
-                  <a:srgbClr val="902000"/>
-                </a:solidFill>
-                <a:latin typeface="Courier"/>
-              </a:rPr>
-              <a:t>colour</a:t>
-            </a:r>
-            <a:r>
-              <a:rPr lang="en-US" sz="1400" dirty="0">
-                <a:solidFill>
-                  <a:srgbClr val="902000"/>
-                </a:solidFill>
-                <a:latin typeface="Courier"/>
-              </a:rPr>
-              <a:t> =</a:t>
-            </a:r>
-            <a:r>
-              <a:rPr lang="en-US" sz="1400" dirty="0">
-                <a:latin typeface="Courier"/>
-              </a:rPr>
-              <a:t> </a:t>
-            </a:r>
-            <a:r>
-              <a:rPr lang="en-US" sz="1400" dirty="0" err="1">
-                <a:latin typeface="Courier"/>
-              </a:rPr>
-              <a:t>project_phase</a:t>
-            </a:r>
-            <a:r>
-              <a:rPr lang="en-US" sz="1400" dirty="0">
-                <a:latin typeface="Courier"/>
-              </a:rPr>
-              <a:t>), </a:t>
-            </a:r>
-            <a:r>
-              <a:rPr lang="en-US" sz="1400" dirty="0">
-                <a:solidFill>
-                  <a:srgbClr val="902000"/>
-                </a:solidFill>
-                <a:latin typeface="Courier"/>
-              </a:rPr>
-              <a:t>size =</a:t>
-            </a:r>
-            <a:r>
-              <a:rPr lang="en-US" sz="1400" dirty="0">
-                <a:latin typeface="Courier"/>
-              </a:rPr>
-              <a:t> </a:t>
-            </a:r>
-            <a:r>
-              <a:rPr lang="en-US" sz="1400" dirty="0">
-                <a:solidFill>
-                  <a:srgbClr val="40A070"/>
-                </a:solidFill>
-                <a:latin typeface="Courier"/>
-              </a:rPr>
-              <a:t>4</a:t>
-            </a:r>
-            <a:r>
-              <a:rPr lang="en-US" sz="1400" dirty="0">
-                <a:latin typeface="Courier"/>
-              </a:rPr>
-              <a:t>) </a:t>
-            </a:r>
-            <a:r>
-              <a:rPr lang="en-US" sz="1400" dirty="0">
-                <a:solidFill>
-                  <a:srgbClr val="666666"/>
-                </a:solidFill>
-                <a:latin typeface="Courier"/>
-              </a:rPr>
-              <a:t>+</a:t>
-            </a:r>
-            <a:br>
-              <a:rPr lang="en-US" sz="1400" dirty="0"/>
-            </a:br>
-            <a:r>
-              <a:rPr lang="en-US" sz="1400" dirty="0">
-                <a:solidFill>
-                  <a:srgbClr val="4070A0"/>
-                </a:solidFill>
-                <a:latin typeface="Courier"/>
-              </a:rPr>
-              <a:t>      </a:t>
-            </a:r>
-            <a:r>
-              <a:rPr lang="en-US" sz="1400" b="1" dirty="0" err="1">
-                <a:solidFill>
-                  <a:srgbClr val="007020"/>
-                </a:solidFill>
-                <a:latin typeface="Courier"/>
-              </a:rPr>
-              <a:t>theme_bw</a:t>
-            </a:r>
-            <a:r>
-              <a:rPr lang="en-US" sz="1400" dirty="0">
-                <a:latin typeface="Courier"/>
-              </a:rPr>
-              <a:t>() </a:t>
-            </a:r>
-            <a:r>
-              <a:rPr lang="en-US" sz="1400" dirty="0">
-                <a:solidFill>
-                  <a:srgbClr val="666666"/>
-                </a:solidFill>
-                <a:latin typeface="Courier"/>
-              </a:rPr>
-              <a:t>+</a:t>
-            </a:r>
-            <a:br>
-              <a:rPr lang="en-US" sz="1400" dirty="0"/>
-            </a:br>
-            <a:r>
-              <a:rPr lang="en-US" sz="1400" dirty="0">
-                <a:solidFill>
-                  <a:srgbClr val="4070A0"/>
-                </a:solidFill>
-                <a:latin typeface="Courier"/>
-              </a:rPr>
-              <a:t>      </a:t>
-            </a:r>
-            <a:r>
-              <a:rPr lang="en-US" sz="1400" b="1" dirty="0" err="1">
-                <a:solidFill>
-                  <a:srgbClr val="007020"/>
-                </a:solidFill>
-                <a:latin typeface="Courier"/>
-              </a:rPr>
-              <a:t>scale_color_manual</a:t>
-            </a:r>
-            <a:r>
-              <a:rPr lang="en-US" sz="1400" dirty="0">
-                <a:latin typeface="Courier"/>
-              </a:rPr>
-              <a:t>(</a:t>
-            </a:r>
-            <a:r>
-              <a:rPr lang="en-US" sz="1400" dirty="0">
-                <a:solidFill>
-                  <a:srgbClr val="902000"/>
-                </a:solidFill>
-                <a:latin typeface="Courier"/>
-              </a:rPr>
-              <a:t>values =</a:t>
-            </a:r>
-            <a:r>
-              <a:rPr lang="en-US" sz="1400" dirty="0">
-                <a:latin typeface="Courier"/>
-              </a:rPr>
-              <a:t> </a:t>
-            </a:r>
-            <a:r>
-              <a:rPr lang="en-US" sz="1400" dirty="0" err="1">
-                <a:latin typeface="Courier"/>
-              </a:rPr>
-              <a:t>mskRvis</a:t>
-            </a:r>
-            <a:r>
-              <a:rPr lang="en-US" sz="1400" dirty="0">
-                <a:solidFill>
-                  <a:srgbClr val="666666"/>
-                </a:solidFill>
-                <a:latin typeface="Courier"/>
-              </a:rPr>
-              <a:t>::</a:t>
-            </a:r>
-            <a:r>
-              <a:rPr lang="en-US" sz="1400" b="1" dirty="0" err="1">
-                <a:solidFill>
-                  <a:srgbClr val="007020"/>
-                </a:solidFill>
-                <a:latin typeface="Courier"/>
-              </a:rPr>
-              <a:t>msk_palette</a:t>
-            </a:r>
-            <a:r>
-              <a:rPr lang="en-US" sz="1400" dirty="0">
-                <a:latin typeface="Courier"/>
-              </a:rPr>
-              <a:t>(</a:t>
-            </a:r>
-            <a:r>
-              <a:rPr lang="en-US" sz="1400" dirty="0">
-                <a:solidFill>
-                  <a:srgbClr val="4070A0"/>
-                </a:solidFill>
-                <a:latin typeface="Courier"/>
-              </a:rPr>
-              <a:t>"contrast"</a:t>
-            </a:r>
-            <a:r>
-              <a:rPr lang="en-US" sz="1400" dirty="0">
-                <a:latin typeface="Courier"/>
-              </a:rPr>
-              <a:t>)) </a:t>
-            </a:r>
-            <a:r>
-              <a:rPr lang="en-US" sz="1400" dirty="0">
-                <a:solidFill>
-                  <a:srgbClr val="666666"/>
-                </a:solidFill>
-                <a:latin typeface="Courier"/>
-              </a:rPr>
-              <a:t>+</a:t>
-            </a:r>
-            <a:r>
-              <a:rPr lang="en-US" sz="1400" dirty="0">
-                <a:solidFill>
-                  <a:srgbClr val="4070A0"/>
-                </a:solidFill>
-                <a:latin typeface="Courier"/>
-              </a:rPr>
-              <a:t> </a:t>
-            </a:r>
-            <a:br>
-              <a:rPr lang="en-US" sz="1400" dirty="0"/>
-            </a:br>
-            <a:r>
-              <a:rPr lang="en-US" sz="1400" dirty="0">
-                <a:solidFill>
-                  <a:srgbClr val="4070A0"/>
-                </a:solidFill>
-                <a:latin typeface="Courier"/>
-              </a:rPr>
-              <a:t>      </a:t>
-            </a:r>
-            <a:r>
-              <a:rPr lang="en-US" sz="1400" b="1" dirty="0">
-                <a:solidFill>
-                  <a:srgbClr val="007020"/>
-                </a:solidFill>
-                <a:latin typeface="Courier"/>
-              </a:rPr>
-              <a:t>theme</a:t>
-            </a:r>
-            <a:r>
-              <a:rPr lang="en-US" sz="1400" dirty="0">
-                <a:latin typeface="Courier"/>
-              </a:rPr>
-              <a:t>(</a:t>
-            </a:r>
-            <a:r>
-              <a:rPr lang="en-US" sz="1400" dirty="0" err="1">
-                <a:solidFill>
-                  <a:srgbClr val="902000"/>
-                </a:solidFill>
-                <a:latin typeface="Courier"/>
-              </a:rPr>
-              <a:t>legend.position</a:t>
-            </a:r>
-            <a:r>
-              <a:rPr lang="en-US" sz="1400" dirty="0">
-                <a:solidFill>
-                  <a:srgbClr val="902000"/>
-                </a:solidFill>
-                <a:latin typeface="Courier"/>
-              </a:rPr>
-              <a:t> =</a:t>
-            </a:r>
-            <a:r>
-              <a:rPr lang="en-US" sz="1400" dirty="0">
-                <a:latin typeface="Courier"/>
-              </a:rPr>
-              <a:t> </a:t>
-            </a:r>
-            <a:r>
-              <a:rPr lang="en-US" sz="1400" dirty="0">
-                <a:solidFill>
-                  <a:srgbClr val="4070A0"/>
-                </a:solidFill>
-                <a:latin typeface="Courier"/>
-              </a:rPr>
-              <a:t>"bottom"</a:t>
-            </a:r>
-            <a:r>
-              <a:rPr lang="en-US" sz="1400" dirty="0">
-                <a:latin typeface="Courier"/>
-              </a:rPr>
-              <a:t>,</a:t>
-            </a:r>
-            <a:br>
-              <a:rPr lang="en-US" sz="1400" dirty="0"/>
-            </a:br>
-            <a:r>
-              <a:rPr lang="en-US" sz="1400" dirty="0">
-                <a:latin typeface="Courier"/>
-              </a:rPr>
-              <a:t>            </a:t>
-            </a:r>
-            <a:r>
-              <a:rPr lang="en-US" sz="1400" dirty="0" err="1">
-                <a:solidFill>
-                  <a:srgbClr val="902000"/>
-                </a:solidFill>
-                <a:latin typeface="Courier"/>
-              </a:rPr>
-              <a:t>legend.title</a:t>
-            </a:r>
-            <a:r>
-              <a:rPr lang="en-US" sz="1400" dirty="0">
-                <a:solidFill>
-                  <a:srgbClr val="902000"/>
-                </a:solidFill>
-                <a:latin typeface="Courier"/>
-              </a:rPr>
-              <a:t> =</a:t>
-            </a:r>
-            <a:r>
-              <a:rPr lang="en-US" sz="1400" dirty="0">
-                <a:latin typeface="Courier"/>
-              </a:rPr>
-              <a:t> </a:t>
-            </a:r>
-            <a:r>
-              <a:rPr lang="en-US" sz="1400" b="1" dirty="0" err="1">
-                <a:solidFill>
-                  <a:srgbClr val="007020"/>
-                </a:solidFill>
-                <a:latin typeface="Courier"/>
-              </a:rPr>
-              <a:t>element_blank</a:t>
-            </a:r>
-            <a:r>
-              <a:rPr lang="en-US" sz="1400" dirty="0">
-                <a:latin typeface="Courier"/>
-              </a:rPr>
-              <a:t>(),</a:t>
-            </a:r>
-            <a:br>
-              <a:rPr lang="en-US" sz="1400" dirty="0"/>
-            </a:br>
-            <a:r>
-              <a:rPr lang="en-US" sz="1400" dirty="0">
-                <a:latin typeface="Courier"/>
-              </a:rPr>
-              <a:t>            </a:t>
-            </a:r>
-            <a:r>
-              <a:rPr lang="en-US" sz="1400" dirty="0" err="1">
-                <a:solidFill>
-                  <a:srgbClr val="902000"/>
-                </a:solidFill>
-                <a:latin typeface="Courier"/>
-              </a:rPr>
-              <a:t>axis.title</a:t>
-            </a:r>
-            <a:r>
-              <a:rPr lang="en-US" sz="1400" dirty="0">
-                <a:solidFill>
-                  <a:srgbClr val="902000"/>
-                </a:solidFill>
-                <a:latin typeface="Courier"/>
-              </a:rPr>
-              <a:t> =</a:t>
-            </a:r>
-            <a:r>
-              <a:rPr lang="en-US" sz="1400" dirty="0">
-                <a:latin typeface="Courier"/>
-              </a:rPr>
-              <a:t> </a:t>
-            </a:r>
-            <a:r>
-              <a:rPr lang="en-US" sz="1400" b="1" dirty="0" err="1">
-                <a:solidFill>
-                  <a:srgbClr val="007020"/>
-                </a:solidFill>
-                <a:latin typeface="Courier"/>
-              </a:rPr>
-              <a:t>element_blank</a:t>
-            </a:r>
-            <a:r>
-              <a:rPr lang="en-US" sz="1400" dirty="0">
-                <a:latin typeface="Courier"/>
-              </a:rPr>
-              <a:t>(), </a:t>
-            </a:r>
-            <a:br>
-              <a:rPr lang="en-US" sz="1400" dirty="0"/>
-            </a:br>
-            <a:r>
-              <a:rPr lang="en-US" sz="1400" dirty="0">
-                <a:latin typeface="Courier"/>
-              </a:rPr>
-              <a:t>            </a:t>
-            </a:r>
-            <a:r>
-              <a:rPr lang="en-US" sz="1400" dirty="0" err="1">
-                <a:solidFill>
-                  <a:srgbClr val="902000"/>
-                </a:solidFill>
-                <a:latin typeface="Courier"/>
-              </a:rPr>
-              <a:t>axis.ticks</a:t>
-            </a:r>
-            <a:r>
-              <a:rPr lang="en-US" sz="1400" dirty="0">
-                <a:solidFill>
-                  <a:srgbClr val="902000"/>
-                </a:solidFill>
-                <a:latin typeface="Courier"/>
-              </a:rPr>
-              <a:t> =</a:t>
-            </a:r>
-            <a:r>
-              <a:rPr lang="en-US" sz="1400" dirty="0">
-                <a:latin typeface="Courier"/>
-              </a:rPr>
-              <a:t> </a:t>
-            </a:r>
-            <a:r>
-              <a:rPr lang="en-US" sz="1400" b="1" dirty="0" err="1">
-                <a:solidFill>
-                  <a:srgbClr val="007020"/>
-                </a:solidFill>
-                <a:latin typeface="Courier"/>
-              </a:rPr>
-              <a:t>element_blank</a:t>
-            </a:r>
-            <a:r>
-              <a:rPr lang="en-US" sz="1400" dirty="0">
-                <a:latin typeface="Courier"/>
-              </a:rPr>
-              <a:t>()) </a:t>
-            </a:r>
-            <a:r>
-              <a:rPr lang="en-US" sz="1400" dirty="0">
-                <a:solidFill>
-                  <a:srgbClr val="666666"/>
-                </a:solidFill>
-                <a:latin typeface="Courier"/>
-              </a:rPr>
-              <a:t>+</a:t>
-            </a:r>
-            <a:br>
-              <a:rPr lang="en-US" sz="1400" dirty="0"/>
-            </a:br>
-            <a:r>
-              <a:rPr lang="en-US" sz="1400" dirty="0">
-                <a:solidFill>
-                  <a:srgbClr val="4070A0"/>
-                </a:solidFill>
-                <a:latin typeface="Courier"/>
-              </a:rPr>
-              <a:t>      </a:t>
-            </a:r>
-            <a:r>
-              <a:rPr lang="en-US" sz="1400" b="1" dirty="0" err="1">
-                <a:solidFill>
-                  <a:srgbClr val="007020"/>
-                </a:solidFill>
-                <a:latin typeface="Courier"/>
-              </a:rPr>
-              <a:t>scale_x_date</a:t>
-            </a:r>
-            <a:r>
-              <a:rPr lang="en-US" sz="1400" dirty="0">
-                <a:latin typeface="Courier"/>
-              </a:rPr>
-              <a:t>(</a:t>
-            </a:r>
-            <a:r>
-              <a:rPr lang="en-US" sz="1400" dirty="0">
-                <a:solidFill>
-                  <a:srgbClr val="902000"/>
-                </a:solidFill>
-                <a:latin typeface="Courier"/>
-              </a:rPr>
-              <a:t>breaks =</a:t>
-            </a:r>
-            <a:r>
-              <a:rPr lang="en-US" sz="1400" dirty="0">
-                <a:latin typeface="Courier"/>
-              </a:rPr>
-              <a:t> </a:t>
-            </a:r>
-            <a:r>
-              <a:rPr lang="en-US" sz="1400" dirty="0">
-                <a:solidFill>
-                  <a:srgbClr val="4070A0"/>
-                </a:solidFill>
-                <a:latin typeface="Courier"/>
-              </a:rPr>
-              <a:t>"3 months"</a:t>
-            </a:r>
-            <a:r>
-              <a:rPr lang="en-US" sz="1400" dirty="0">
-                <a:latin typeface="Courier"/>
-              </a:rPr>
-              <a:t>, </a:t>
-            </a:r>
-            <a:r>
-              <a:rPr lang="en-US" sz="1400" dirty="0" err="1">
-                <a:solidFill>
-                  <a:srgbClr val="902000"/>
-                </a:solidFill>
-                <a:latin typeface="Courier"/>
-              </a:rPr>
-              <a:t>date_labels</a:t>
-            </a:r>
-            <a:r>
-              <a:rPr lang="en-US" sz="1400" dirty="0">
-                <a:solidFill>
-                  <a:srgbClr val="902000"/>
-                </a:solidFill>
-                <a:latin typeface="Courier"/>
-              </a:rPr>
-              <a:t> =</a:t>
-            </a:r>
-            <a:r>
-              <a:rPr lang="en-US" sz="1400" dirty="0">
-                <a:latin typeface="Courier"/>
-              </a:rPr>
-              <a:t> </a:t>
-            </a:r>
-            <a:r>
-              <a:rPr lang="en-US" sz="1400" dirty="0">
-                <a:solidFill>
-                  <a:srgbClr val="4070A0"/>
-                </a:solidFill>
-                <a:latin typeface="Courier"/>
-              </a:rPr>
-              <a:t>"%b %Y"</a:t>
-            </a:r>
-            <a:r>
-              <a:rPr lang="en-US" sz="1400" dirty="0">
-                <a:latin typeface="Courier"/>
-              </a:rPr>
-              <a:t>) </a:t>
-            </a:r>
-            <a:endParaRPr lang="en-US" sz="1400" dirty="0"/>
-          </a:p>
-        </p:txBody>
-      </p:sp>
-      <p:pic>
-        <p:nvPicPr>
-          <p:cNvPr id="5" name="Picture 4">
-            <a:extLst>
-              <a:ext uri="{FF2B5EF4-FFF2-40B4-BE49-F238E27FC236}">
-                <a16:creationId xmlns:a16="http://schemas.microsoft.com/office/drawing/2014/main" id="{36F56087-CEFB-4826-AFA8-77D4A910A7C9}"/>
-              </a:ext>
-            </a:extLst>
-          </p:cNvPr>
-          <p:cNvPicPr>
-            <a:picLocks noChangeAspect="1"/>
-          </p:cNvPicPr>
-          <p:nvPr/>
-        </p:nvPicPr>
-        <p:blipFill>
-          <a:blip r:embed="rId2"/>
-          <a:stretch>
-            <a:fillRect/>
-          </a:stretch>
-        </p:blipFill>
-        <p:spPr>
-          <a:xfrm>
-            <a:off x="1253511" y="3771438"/>
-            <a:ext cx="7191989" cy="3005779"/>
-          </a:xfrm>
-          <a:prstGeom prst="rect">
-            <a:avLst/>
-          </a:prstGeom>
-        </p:spPr>
-      </p:pic>
-      <p:sp>
-        <p:nvSpPr>
-          <p:cNvPr id="6" name="Slide Number Placeholder 5">
-            <a:extLst>
-              <a:ext uri="{FF2B5EF4-FFF2-40B4-BE49-F238E27FC236}">
-                <a16:creationId xmlns:a16="http://schemas.microsoft.com/office/drawing/2014/main" id="{F5D45294-648C-4B35-8CC3-57A2EC7AE344}"/>
-              </a:ext>
-            </a:extLst>
-          </p:cNvPr>
-          <p:cNvSpPr>
-            <a:spLocks noGrp="1"/>
-          </p:cNvSpPr>
-          <p:nvPr>
-            <p:ph type="sldNum" sz="quarter" idx="4"/>
-          </p:nvPr>
-        </p:nvSpPr>
-        <p:spPr/>
-        <p:txBody>
-          <a:bodyPr/>
-          <a:lstStyle/>
-          <a:p>
-            <a:fld id="{1C3486A8-E8FB-4965-B61C-9B9FA7DC7BEE}" type="slidenum">
-              <a:rPr lang="en-US" smtClean="0"/>
-              <a:pPr/>
-              <a:t>29</a:t>
-            </a:fld>
-            <a:endParaRPr lang="en-US"/>
-          </a:p>
-        </p:txBody>
-      </p:sp>
-    </p:spTree>
-    <p:extLst>
-      <p:ext uri="{BB962C8B-B14F-4D97-AF65-F5344CB8AC3E}">
-        <p14:creationId xmlns:p14="http://schemas.microsoft.com/office/powerpoint/2010/main" val="2632600419"/>
       </p:ext>
     </p:extLst>
   </p:cSld>
@@ -14017,7 +13492,7 @@
           <p:cNvPr id="2" name="Title 1">
             <a:extLst>
               <a:ext uri="{FF2B5EF4-FFF2-40B4-BE49-F238E27FC236}">
-                <a16:creationId xmlns:a16="http://schemas.microsoft.com/office/drawing/2014/main" id="{633F03C8-ABD3-4A00-AD80-087F21332873}"/>
+                <a16:creationId xmlns:a16="http://schemas.microsoft.com/office/drawing/2014/main" id="{213736E0-77B2-4109-9DA0-AC5C744247E8}"/>
               </a:ext>
             </a:extLst>
           </p:cNvPr>
@@ -14035,83 +13510,711 @@
           <a:p>
             <a:r>
               <a:rPr lang="en-US" dirty="0"/>
-              <a:t>Caveats</a:t>
+              <a:t>Gantt chart: Data Viz</a:t>
             </a:r>
           </a:p>
         </p:txBody>
       </p:sp>
       <p:sp>
         <p:nvSpPr>
-          <p:cNvPr id="3" name="Content Placeholder 2">
+          <p:cNvPr id="4" name="Rectangle 3">
             <a:extLst>
               <a:ext uri="{FF2B5EF4-FFF2-40B4-BE49-F238E27FC236}">
-                <a16:creationId xmlns:a16="http://schemas.microsoft.com/office/drawing/2014/main" id="{D263E9DF-7C0F-4369-8FD3-EEA6C90D66F0}"/>
+                <a16:creationId xmlns:a16="http://schemas.microsoft.com/office/drawing/2014/main" id="{FAA39DE1-00CB-442F-807E-ABC638B25941}"/>
               </a:ext>
             </a:extLst>
           </p:cNvPr>
-          <p:cNvSpPr>
-            <a:spLocks noGrp="1"/>
-          </p:cNvSpPr>
-          <p:nvPr>
-            <p:ph idx="1"/>
-          </p:nvPr>
+          <p:cNvSpPr/>
+          <p:nvPr/>
         </p:nvSpPr>
-        <p:spPr/>
+        <p:spPr>
+          <a:xfrm>
+            <a:off x="457199" y="1010107"/>
+            <a:ext cx="8686801" cy="2246769"/>
+          </a:xfrm>
+          <a:prstGeom prst="rect">
+            <a:avLst/>
+          </a:prstGeom>
+        </p:spPr>
         <p:txBody>
-          <a:bodyPr/>
+          <a:bodyPr wrap="square">
+            <a:spAutoFit/>
+          </a:bodyPr>
           <a:lstStyle/>
           <a:p>
             <a:r>
-              <a:rPr lang="en-US" sz="2400" dirty="0"/>
-              <a:t>Be careful about your denominators! This is a count of </a:t>
-            </a:r>
-            <a:r>
-              <a:rPr lang="en-US" sz="2400" i="1" dirty="0"/>
-              <a:t>what you recorded</a:t>
-            </a:r>
-          </a:p>
-          <a:p>
-            <a:pPr lvl="1"/>
-            <a:r>
-              <a:rPr lang="en-US" sz="2000" dirty="0"/>
-              <a:t>Won’t tell you if you spent 2 hours on Twitter or 45 minutes replying to an email (unless you write that down yourself!)</a:t>
-            </a:r>
-            <a:endParaRPr lang="en-US" sz="2000" i="1" dirty="0"/>
-          </a:p>
-          <a:p>
-            <a:r>
-              <a:rPr lang="en-US" sz="2400" dirty="0"/>
-              <a:t>Corollary: this is only useful if you track your time relatively accurately</a:t>
-            </a:r>
-          </a:p>
-          <a:p>
-            <a:pPr lvl="1"/>
-            <a:r>
-              <a:rPr lang="en-US" sz="2000" dirty="0"/>
-              <a:t>15 minute increments at a minimum, sometimes record a single project or activity for an entire day</a:t>
-            </a:r>
-          </a:p>
-          <a:p>
-            <a:pPr lvl="1"/>
-            <a:r>
-              <a:rPr lang="en-US" sz="2000" dirty="0"/>
-              <a:t>Do what works best for you</a:t>
-            </a:r>
-          </a:p>
-          <a:p>
-            <a:r>
-              <a:rPr lang="en-US" sz="2400" dirty="0"/>
-              <a:t>Entirely retrospective: it’s a summary of what you’ve done, doesn’t include projected time allocations</a:t>
-            </a:r>
+              <a:rPr lang="en-US" sz="1400" dirty="0">
+                <a:latin typeface="Courier"/>
+              </a:rPr>
+              <a:t>    </a:t>
+            </a:r>
+            <a:r>
+              <a:rPr lang="en-US" sz="1400" b="1" dirty="0" err="1">
+                <a:solidFill>
+                  <a:srgbClr val="007020"/>
+                </a:solidFill>
+                <a:latin typeface="Courier"/>
+              </a:rPr>
+              <a:t>ggplot</a:t>
+            </a:r>
+            <a:r>
+              <a:rPr lang="en-US" sz="1400" dirty="0">
+                <a:latin typeface="Courier"/>
+              </a:rPr>
+              <a:t>(</a:t>
+            </a:r>
+            <a:r>
+              <a:rPr lang="en-US" sz="1400" dirty="0" err="1">
+                <a:latin typeface="Courier"/>
+              </a:rPr>
+              <a:t>phase_filtered</a:t>
+            </a:r>
+            <a:r>
+              <a:rPr lang="en-US" sz="1400" dirty="0">
+                <a:latin typeface="Courier"/>
+              </a:rPr>
+              <a:t>) </a:t>
+            </a:r>
+            <a:r>
+              <a:rPr lang="en-US" sz="1400" dirty="0">
+                <a:solidFill>
+                  <a:srgbClr val="666666"/>
+                </a:solidFill>
+                <a:latin typeface="Courier"/>
+              </a:rPr>
+              <a:t>+</a:t>
+            </a:r>
+            <a:br>
+              <a:rPr lang="en-US" sz="1400" dirty="0"/>
+            </a:br>
+            <a:r>
+              <a:rPr lang="en-US" sz="1400" dirty="0">
+                <a:solidFill>
+                  <a:srgbClr val="4070A0"/>
+                </a:solidFill>
+                <a:latin typeface="Courier"/>
+              </a:rPr>
+              <a:t>      </a:t>
+            </a:r>
+            <a:r>
+              <a:rPr lang="en-US" sz="1400" b="1" dirty="0" err="1">
+                <a:solidFill>
+                  <a:srgbClr val="007020"/>
+                </a:solidFill>
+                <a:latin typeface="Courier"/>
+              </a:rPr>
+              <a:t>geom_segment</a:t>
+            </a:r>
+            <a:r>
+              <a:rPr lang="en-US" sz="1400" dirty="0">
+                <a:latin typeface="Courier"/>
+              </a:rPr>
+              <a:t>(</a:t>
+            </a:r>
+            <a:r>
+              <a:rPr lang="en-US" sz="1400" b="1" dirty="0" err="1">
+                <a:solidFill>
+                  <a:srgbClr val="007020"/>
+                </a:solidFill>
+                <a:latin typeface="Courier"/>
+              </a:rPr>
+              <a:t>aes</a:t>
+            </a:r>
+            <a:r>
+              <a:rPr lang="en-US" sz="1400" dirty="0">
+                <a:latin typeface="Courier"/>
+              </a:rPr>
+              <a:t>(</a:t>
+            </a:r>
+            <a:r>
+              <a:rPr lang="en-US" sz="1400" dirty="0">
+                <a:solidFill>
+                  <a:srgbClr val="902000"/>
+                </a:solidFill>
+                <a:latin typeface="Courier"/>
+              </a:rPr>
+              <a:t>x =</a:t>
+            </a:r>
+            <a:r>
+              <a:rPr lang="en-US" sz="1400" dirty="0">
+                <a:latin typeface="Courier"/>
+              </a:rPr>
+              <a:t> </a:t>
+            </a:r>
+            <a:r>
+              <a:rPr lang="en-US" sz="1400" dirty="0" err="1">
+                <a:latin typeface="Courier"/>
+              </a:rPr>
+              <a:t>start_dt</a:t>
+            </a:r>
+            <a:r>
+              <a:rPr lang="en-US" sz="1400" dirty="0">
+                <a:latin typeface="Courier"/>
+              </a:rPr>
+              <a:t>, </a:t>
+            </a:r>
+            <a:r>
+              <a:rPr lang="en-US" sz="1400" dirty="0" err="1">
+                <a:solidFill>
+                  <a:srgbClr val="902000"/>
+                </a:solidFill>
+                <a:latin typeface="Courier"/>
+              </a:rPr>
+              <a:t>xend</a:t>
+            </a:r>
+            <a:r>
+              <a:rPr lang="en-US" sz="1400" dirty="0">
+                <a:solidFill>
+                  <a:srgbClr val="902000"/>
+                </a:solidFill>
+                <a:latin typeface="Courier"/>
+              </a:rPr>
+              <a:t> =</a:t>
+            </a:r>
+            <a:r>
+              <a:rPr lang="en-US" sz="1400" dirty="0">
+                <a:latin typeface="Courier"/>
+              </a:rPr>
+              <a:t> </a:t>
+            </a:r>
+            <a:r>
+              <a:rPr lang="en-US" sz="1400" dirty="0" err="1">
+                <a:latin typeface="Courier"/>
+              </a:rPr>
+              <a:t>end_dt</a:t>
+            </a:r>
+            <a:r>
+              <a:rPr lang="en-US" sz="1400" dirty="0">
+                <a:latin typeface="Courier"/>
+              </a:rPr>
+              <a:t>, </a:t>
+            </a:r>
+            <a:br>
+              <a:rPr lang="en-US" sz="1400" dirty="0"/>
+            </a:br>
+            <a:r>
+              <a:rPr lang="en-US" sz="1400" dirty="0">
+                <a:latin typeface="Courier"/>
+              </a:rPr>
+              <a:t>                       </a:t>
+            </a:r>
+            <a:r>
+              <a:rPr lang="en-US" sz="1400" dirty="0">
+                <a:solidFill>
+                  <a:srgbClr val="902000"/>
+                </a:solidFill>
+                <a:latin typeface="Courier"/>
+              </a:rPr>
+              <a:t>y =</a:t>
+            </a:r>
+            <a:r>
+              <a:rPr lang="en-US" sz="1400" dirty="0">
+                <a:latin typeface="Courier"/>
+              </a:rPr>
+              <a:t> </a:t>
+            </a:r>
+            <a:r>
+              <a:rPr lang="en-US" sz="1400" dirty="0" err="1">
+                <a:latin typeface="Courier"/>
+              </a:rPr>
+              <a:t>study_title</a:t>
+            </a:r>
+            <a:r>
+              <a:rPr lang="en-US" sz="1400" dirty="0">
+                <a:latin typeface="Courier"/>
+              </a:rPr>
+              <a:t>, </a:t>
+            </a:r>
+            <a:r>
+              <a:rPr lang="en-US" sz="1400" dirty="0" err="1">
+                <a:solidFill>
+                  <a:srgbClr val="902000"/>
+                </a:solidFill>
+                <a:latin typeface="Courier"/>
+              </a:rPr>
+              <a:t>yend</a:t>
+            </a:r>
+            <a:r>
+              <a:rPr lang="en-US" sz="1400" dirty="0">
+                <a:solidFill>
+                  <a:srgbClr val="902000"/>
+                </a:solidFill>
+                <a:latin typeface="Courier"/>
+              </a:rPr>
+              <a:t> =</a:t>
+            </a:r>
+            <a:r>
+              <a:rPr lang="en-US" sz="1400" dirty="0">
+                <a:latin typeface="Courier"/>
+              </a:rPr>
+              <a:t> </a:t>
+            </a:r>
+            <a:r>
+              <a:rPr lang="en-US" sz="1400" dirty="0" err="1">
+                <a:latin typeface="Courier"/>
+              </a:rPr>
+              <a:t>study_title</a:t>
+            </a:r>
+            <a:r>
+              <a:rPr lang="en-US" sz="1400" dirty="0">
+                <a:latin typeface="Courier"/>
+              </a:rPr>
+              <a:t>, </a:t>
+            </a:r>
+            <a:br>
+              <a:rPr lang="en-US" sz="1400" dirty="0"/>
+            </a:br>
+            <a:r>
+              <a:rPr lang="en-US" sz="1400" dirty="0">
+                <a:latin typeface="Courier"/>
+              </a:rPr>
+              <a:t>                       </a:t>
+            </a:r>
+            <a:r>
+              <a:rPr lang="en-US" sz="1400" dirty="0" err="1">
+                <a:solidFill>
+                  <a:srgbClr val="902000"/>
+                </a:solidFill>
+                <a:latin typeface="Courier"/>
+              </a:rPr>
+              <a:t>colour</a:t>
+            </a:r>
+            <a:r>
+              <a:rPr lang="en-US" sz="1400" dirty="0">
+                <a:solidFill>
+                  <a:srgbClr val="902000"/>
+                </a:solidFill>
+                <a:latin typeface="Courier"/>
+              </a:rPr>
+              <a:t> =</a:t>
+            </a:r>
+            <a:r>
+              <a:rPr lang="en-US" sz="1400" dirty="0">
+                <a:latin typeface="Courier"/>
+              </a:rPr>
+              <a:t> </a:t>
+            </a:r>
+            <a:r>
+              <a:rPr lang="en-US" sz="1400" dirty="0" err="1">
+                <a:latin typeface="Courier"/>
+              </a:rPr>
+              <a:t>project_phase</a:t>
+            </a:r>
+            <a:r>
+              <a:rPr lang="en-US" sz="1400" dirty="0">
+                <a:latin typeface="Courier"/>
+              </a:rPr>
+              <a:t>), </a:t>
+            </a:r>
+            <a:r>
+              <a:rPr lang="en-US" sz="1400" dirty="0">
+                <a:solidFill>
+                  <a:srgbClr val="902000"/>
+                </a:solidFill>
+                <a:latin typeface="Courier"/>
+              </a:rPr>
+              <a:t>size =</a:t>
+            </a:r>
+            <a:r>
+              <a:rPr lang="en-US" sz="1400" dirty="0">
+                <a:latin typeface="Courier"/>
+              </a:rPr>
+              <a:t> </a:t>
+            </a:r>
+            <a:r>
+              <a:rPr lang="en-US" sz="1400" dirty="0">
+                <a:solidFill>
+                  <a:srgbClr val="40A070"/>
+                </a:solidFill>
+                <a:latin typeface="Courier"/>
+              </a:rPr>
+              <a:t>4</a:t>
+            </a:r>
+            <a:r>
+              <a:rPr lang="en-US" sz="1400" dirty="0">
+                <a:latin typeface="Courier"/>
+              </a:rPr>
+              <a:t>) </a:t>
+            </a:r>
+            <a:r>
+              <a:rPr lang="en-US" sz="1400" dirty="0">
+                <a:solidFill>
+                  <a:srgbClr val="666666"/>
+                </a:solidFill>
+                <a:latin typeface="Courier"/>
+              </a:rPr>
+              <a:t>+</a:t>
+            </a:r>
+            <a:br>
+              <a:rPr lang="en-US" sz="1400" dirty="0"/>
+            </a:br>
+            <a:r>
+              <a:rPr lang="en-US" sz="1400" dirty="0">
+                <a:solidFill>
+                  <a:srgbClr val="4070A0"/>
+                </a:solidFill>
+                <a:latin typeface="Courier"/>
+              </a:rPr>
+              <a:t>      </a:t>
+            </a:r>
+            <a:r>
+              <a:rPr lang="en-US" sz="1400" b="1" dirty="0" err="1">
+                <a:solidFill>
+                  <a:srgbClr val="007020"/>
+                </a:solidFill>
+                <a:latin typeface="Courier"/>
+              </a:rPr>
+              <a:t>theme_bw</a:t>
+            </a:r>
+            <a:r>
+              <a:rPr lang="en-US" sz="1400" dirty="0">
+                <a:latin typeface="Courier"/>
+              </a:rPr>
+              <a:t>() </a:t>
+            </a:r>
+            <a:r>
+              <a:rPr lang="en-US" sz="1400" dirty="0">
+                <a:solidFill>
+                  <a:srgbClr val="666666"/>
+                </a:solidFill>
+                <a:latin typeface="Courier"/>
+              </a:rPr>
+              <a:t>+</a:t>
+            </a:r>
+            <a:r>
+              <a:rPr lang="en-US" sz="1400" dirty="0">
+                <a:solidFill>
+                  <a:srgbClr val="4070A0"/>
+                </a:solidFill>
+                <a:latin typeface="Courier"/>
+              </a:rPr>
+              <a:t> </a:t>
+            </a:r>
+            <a:br>
+              <a:rPr lang="en-US" sz="1400" dirty="0"/>
+            </a:br>
+            <a:r>
+              <a:rPr lang="en-US" sz="1400" dirty="0">
+                <a:solidFill>
+                  <a:srgbClr val="4070A0"/>
+                </a:solidFill>
+                <a:latin typeface="Courier"/>
+              </a:rPr>
+              <a:t>      </a:t>
+            </a:r>
+            <a:r>
+              <a:rPr lang="en-US" sz="1400" b="1" dirty="0">
+                <a:solidFill>
+                  <a:srgbClr val="007020"/>
+                </a:solidFill>
+                <a:latin typeface="Courier"/>
+              </a:rPr>
+              <a:t>theme</a:t>
+            </a:r>
+            <a:r>
+              <a:rPr lang="en-US" sz="1400" dirty="0">
+                <a:latin typeface="Courier"/>
+              </a:rPr>
+              <a:t>(</a:t>
+            </a:r>
+            <a:r>
+              <a:rPr lang="en-US" sz="1400" dirty="0" err="1">
+                <a:solidFill>
+                  <a:srgbClr val="902000"/>
+                </a:solidFill>
+                <a:latin typeface="Courier"/>
+              </a:rPr>
+              <a:t>legend.position</a:t>
+            </a:r>
+            <a:r>
+              <a:rPr lang="en-US" sz="1400" dirty="0">
+                <a:solidFill>
+                  <a:srgbClr val="902000"/>
+                </a:solidFill>
+                <a:latin typeface="Courier"/>
+              </a:rPr>
+              <a:t> =</a:t>
+            </a:r>
+            <a:r>
+              <a:rPr lang="en-US" sz="1400" dirty="0">
+                <a:latin typeface="Courier"/>
+              </a:rPr>
+              <a:t> </a:t>
+            </a:r>
+            <a:r>
+              <a:rPr lang="en-US" sz="1400" dirty="0">
+                <a:solidFill>
+                  <a:srgbClr val="4070A0"/>
+                </a:solidFill>
+                <a:latin typeface="Courier"/>
+              </a:rPr>
+              <a:t>"bottom"</a:t>
+            </a:r>
+            <a:r>
+              <a:rPr lang="en-US" sz="1400" dirty="0">
+                <a:latin typeface="Courier"/>
+              </a:rPr>
+              <a:t>,</a:t>
+            </a:r>
+            <a:br>
+              <a:rPr lang="en-US" sz="1400" dirty="0"/>
+            </a:br>
+            <a:r>
+              <a:rPr lang="en-US" sz="1400" dirty="0">
+                <a:latin typeface="Courier"/>
+              </a:rPr>
+              <a:t>            </a:t>
+            </a:r>
+            <a:r>
+              <a:rPr lang="en-US" sz="1400" dirty="0" err="1">
+                <a:solidFill>
+                  <a:srgbClr val="902000"/>
+                </a:solidFill>
+                <a:latin typeface="Courier"/>
+              </a:rPr>
+              <a:t>legend.title</a:t>
+            </a:r>
+            <a:r>
+              <a:rPr lang="en-US" sz="1400" dirty="0">
+                <a:solidFill>
+                  <a:srgbClr val="902000"/>
+                </a:solidFill>
+                <a:latin typeface="Courier"/>
+              </a:rPr>
+              <a:t> =</a:t>
+            </a:r>
+            <a:r>
+              <a:rPr lang="en-US" sz="1400" dirty="0">
+                <a:latin typeface="Courier"/>
+              </a:rPr>
+              <a:t> </a:t>
+            </a:r>
+            <a:r>
+              <a:rPr lang="en-US" sz="1400" b="1" dirty="0" err="1">
+                <a:solidFill>
+                  <a:srgbClr val="007020"/>
+                </a:solidFill>
+                <a:latin typeface="Courier"/>
+              </a:rPr>
+              <a:t>element_blank</a:t>
+            </a:r>
+            <a:r>
+              <a:rPr lang="en-US" sz="1400" dirty="0">
+                <a:latin typeface="Courier"/>
+              </a:rPr>
+              <a:t>(),</a:t>
+            </a:r>
+            <a:br>
+              <a:rPr lang="en-US" sz="1400" dirty="0"/>
+            </a:br>
+            <a:r>
+              <a:rPr lang="en-US" sz="1400" dirty="0">
+                <a:latin typeface="Courier"/>
+              </a:rPr>
+              <a:t>            </a:t>
+            </a:r>
+            <a:r>
+              <a:rPr lang="en-US" sz="1400" dirty="0" err="1">
+                <a:solidFill>
+                  <a:srgbClr val="902000"/>
+                </a:solidFill>
+                <a:latin typeface="Courier"/>
+              </a:rPr>
+              <a:t>axis.title</a:t>
+            </a:r>
+            <a:r>
+              <a:rPr lang="en-US" sz="1400" dirty="0">
+                <a:solidFill>
+                  <a:srgbClr val="902000"/>
+                </a:solidFill>
+                <a:latin typeface="Courier"/>
+              </a:rPr>
+              <a:t> =</a:t>
+            </a:r>
+            <a:r>
+              <a:rPr lang="en-US" sz="1400" dirty="0">
+                <a:latin typeface="Courier"/>
+              </a:rPr>
+              <a:t> </a:t>
+            </a:r>
+            <a:r>
+              <a:rPr lang="en-US" sz="1400" b="1" dirty="0" err="1">
+                <a:solidFill>
+                  <a:srgbClr val="007020"/>
+                </a:solidFill>
+                <a:latin typeface="Courier"/>
+              </a:rPr>
+              <a:t>element_blank</a:t>
+            </a:r>
+            <a:r>
+              <a:rPr lang="en-US" sz="1400" dirty="0">
+                <a:latin typeface="Courier"/>
+              </a:rPr>
+              <a:t>(), </a:t>
+            </a:r>
+            <a:br>
+              <a:rPr lang="en-US" sz="1400" dirty="0"/>
+            </a:br>
+            <a:r>
+              <a:rPr lang="en-US" sz="1400" dirty="0">
+                <a:latin typeface="Courier"/>
+              </a:rPr>
+              <a:t>            </a:t>
+            </a:r>
+            <a:r>
+              <a:rPr lang="en-US" sz="1400" dirty="0" err="1">
+                <a:solidFill>
+                  <a:srgbClr val="902000"/>
+                </a:solidFill>
+                <a:latin typeface="Courier"/>
+              </a:rPr>
+              <a:t>axis.ticks</a:t>
+            </a:r>
+            <a:r>
+              <a:rPr lang="en-US" sz="1400" dirty="0">
+                <a:solidFill>
+                  <a:srgbClr val="902000"/>
+                </a:solidFill>
+                <a:latin typeface="Courier"/>
+              </a:rPr>
+              <a:t> =</a:t>
+            </a:r>
+            <a:r>
+              <a:rPr lang="en-US" sz="1400" dirty="0">
+                <a:latin typeface="Courier"/>
+              </a:rPr>
+              <a:t> </a:t>
+            </a:r>
+            <a:r>
+              <a:rPr lang="en-US" sz="1400" b="1" dirty="0" err="1">
+                <a:solidFill>
+                  <a:srgbClr val="007020"/>
+                </a:solidFill>
+                <a:latin typeface="Courier"/>
+              </a:rPr>
+              <a:t>element_blank</a:t>
+            </a:r>
+            <a:r>
+              <a:rPr lang="en-US" sz="1400" dirty="0">
+                <a:latin typeface="Courier"/>
+              </a:rPr>
+              <a:t>()) </a:t>
+            </a:r>
+            <a:r>
+              <a:rPr lang="en-US" sz="1400" dirty="0">
+                <a:solidFill>
+                  <a:srgbClr val="666666"/>
+                </a:solidFill>
+                <a:latin typeface="Courier"/>
+              </a:rPr>
+              <a:t>+</a:t>
+            </a:r>
+            <a:br>
+              <a:rPr lang="en-US" sz="1400" dirty="0"/>
+            </a:br>
+            <a:r>
+              <a:rPr lang="en-US" sz="1400" dirty="0">
+                <a:solidFill>
+                  <a:srgbClr val="4070A0"/>
+                </a:solidFill>
+                <a:latin typeface="Courier"/>
+              </a:rPr>
+              <a:t>      </a:t>
+            </a:r>
+            <a:r>
+              <a:rPr lang="en-US" sz="1400" b="1" dirty="0" err="1">
+                <a:solidFill>
+                  <a:srgbClr val="007020"/>
+                </a:solidFill>
+                <a:latin typeface="Courier"/>
+              </a:rPr>
+              <a:t>scale_x_date</a:t>
+            </a:r>
+            <a:r>
+              <a:rPr lang="en-US" sz="1400" dirty="0">
+                <a:latin typeface="Courier"/>
+              </a:rPr>
+              <a:t>(</a:t>
+            </a:r>
+            <a:r>
+              <a:rPr lang="en-US" sz="1400" dirty="0">
+                <a:solidFill>
+                  <a:srgbClr val="902000"/>
+                </a:solidFill>
+                <a:latin typeface="Courier"/>
+              </a:rPr>
+              <a:t>breaks =</a:t>
+            </a:r>
+            <a:r>
+              <a:rPr lang="en-US" sz="1400" dirty="0">
+                <a:latin typeface="Courier"/>
+              </a:rPr>
+              <a:t> </a:t>
+            </a:r>
+            <a:r>
+              <a:rPr lang="en-US" sz="1400" dirty="0">
+                <a:solidFill>
+                  <a:srgbClr val="4070A0"/>
+                </a:solidFill>
+                <a:latin typeface="Courier"/>
+              </a:rPr>
+              <a:t>"3 months"</a:t>
+            </a:r>
+            <a:r>
+              <a:rPr lang="en-US" sz="1400" dirty="0">
+                <a:latin typeface="Courier"/>
+              </a:rPr>
+              <a:t>, </a:t>
+            </a:r>
+            <a:r>
+              <a:rPr lang="en-US" sz="1400" dirty="0" err="1">
+                <a:solidFill>
+                  <a:srgbClr val="902000"/>
+                </a:solidFill>
+                <a:latin typeface="Courier"/>
+              </a:rPr>
+              <a:t>date_labels</a:t>
+            </a:r>
+            <a:r>
+              <a:rPr lang="en-US" sz="1400" dirty="0">
+                <a:solidFill>
+                  <a:srgbClr val="902000"/>
+                </a:solidFill>
+                <a:latin typeface="Courier"/>
+              </a:rPr>
+              <a:t> =</a:t>
+            </a:r>
+            <a:r>
+              <a:rPr lang="en-US" sz="1400" dirty="0">
+                <a:latin typeface="Courier"/>
+              </a:rPr>
+              <a:t> </a:t>
+            </a:r>
+            <a:r>
+              <a:rPr lang="en-US" sz="1400" dirty="0">
+                <a:solidFill>
+                  <a:srgbClr val="4070A0"/>
+                </a:solidFill>
+                <a:latin typeface="Courier"/>
+              </a:rPr>
+              <a:t>"%b %Y"</a:t>
+            </a:r>
+            <a:r>
+              <a:rPr lang="en-US" sz="1400" dirty="0">
+                <a:latin typeface="Courier"/>
+              </a:rPr>
+              <a:t>) </a:t>
+            </a:r>
+            <a:endParaRPr lang="en-US" sz="1400" dirty="0"/>
           </a:p>
         </p:txBody>
       </p:sp>
       <p:sp>
         <p:nvSpPr>
-          <p:cNvPr id="5" name="Slide Number Placeholder 4">
+          <p:cNvPr id="6" name="Slide Number Placeholder 5">
             <a:extLst>
               <a:ext uri="{FF2B5EF4-FFF2-40B4-BE49-F238E27FC236}">
-                <a16:creationId xmlns:a16="http://schemas.microsoft.com/office/drawing/2014/main" id="{5A453F05-4D37-4551-A440-48E8ED1FE85E}"/>
+                <a16:creationId xmlns:a16="http://schemas.microsoft.com/office/drawing/2014/main" id="{F5D45294-648C-4B35-8CC3-57A2EC7AE344}"/>
               </a:ext>
             </a:extLst>
           </p:cNvPr>
@@ -14136,10 +14239,40 @@
           </a:p>
         </p:txBody>
       </p:sp>
+      <p:pic>
+        <p:nvPicPr>
+          <p:cNvPr id="3" name="Picture 2">
+            <a:extLst>
+              <a:ext uri="{FF2B5EF4-FFF2-40B4-BE49-F238E27FC236}">
+                <a16:creationId xmlns:a16="http://schemas.microsoft.com/office/drawing/2014/main" id="{A3097BAD-DB6B-47DD-A49E-F8D544D0D3DC}"/>
+              </a:ext>
+            </a:extLst>
+          </p:cNvPr>
+          <p:cNvPicPr>
+            <a:picLocks noChangeAspect="1"/>
+          </p:cNvPicPr>
+          <p:nvPr/>
+        </p:nvPicPr>
+        <p:blipFill>
+          <a:blip r:embed="rId2"/>
+          <a:stretch>
+            <a:fillRect/>
+          </a:stretch>
+        </p:blipFill>
+        <p:spPr>
+          <a:xfrm>
+            <a:off x="457199" y="3494024"/>
+            <a:ext cx="8445500" cy="3335904"/>
+          </a:xfrm>
+          <a:prstGeom prst="rect">
+            <a:avLst/>
+          </a:prstGeom>
+        </p:spPr>
+      </p:pic>
     </p:spTree>
     <p:extLst>
       <p:ext uri="{BB962C8B-B14F-4D97-AF65-F5344CB8AC3E}">
-        <p14:creationId xmlns:p14="http://schemas.microsoft.com/office/powerpoint/2010/main" val="2875116697"/>
+        <p14:creationId xmlns:p14="http://schemas.microsoft.com/office/powerpoint/2010/main" val="2632600419"/>
       </p:ext>
     </p:extLst>
   </p:cSld>
@@ -14171,7 +14304,7 @@
           <p:cNvPr id="2" name="Title 1">
             <a:extLst>
               <a:ext uri="{FF2B5EF4-FFF2-40B4-BE49-F238E27FC236}">
-                <a16:creationId xmlns:a16="http://schemas.microsoft.com/office/drawing/2014/main" id="{8B4B5790-0EA7-4012-93A7-22425D41E1E3}"/>
+                <a16:creationId xmlns:a16="http://schemas.microsoft.com/office/drawing/2014/main" id="{633F03C8-ABD3-4A00-AD80-087F21332873}"/>
               </a:ext>
             </a:extLst>
           </p:cNvPr>
@@ -14189,7 +14322,7 @@
           <a:p>
             <a:r>
               <a:rPr lang="en-US" dirty="0"/>
-              <a:t>Future Plans</a:t>
+              <a:t>Caveats</a:t>
             </a:r>
           </a:p>
         </p:txBody>
@@ -14199,7 +14332,7 @@
           <p:cNvPr id="3" name="Content Placeholder 2">
             <a:extLst>
               <a:ext uri="{FF2B5EF4-FFF2-40B4-BE49-F238E27FC236}">
-                <a16:creationId xmlns:a16="http://schemas.microsoft.com/office/drawing/2014/main" id="{4851F475-9DB2-4FC0-B370-DDE4324E134A}"/>
+                <a16:creationId xmlns:a16="http://schemas.microsoft.com/office/drawing/2014/main" id="{D263E9DF-7C0F-4369-8FD3-EEA6C90D66F0}"/>
               </a:ext>
             </a:extLst>
           </p:cNvPr>
@@ -14216,35 +14349,46 @@
           <a:lstStyle/>
           <a:p>
             <a:r>
-              <a:rPr lang="en-US" sz="2800" dirty="0"/>
-              <a:t>Incorporate with Toggl app (or other) to automate a portion of the tracking</a:t>
+              <a:rPr lang="en-US" sz="2400" dirty="0"/>
+              <a:t>Be careful about your denominators! This is a count of </a:t>
+            </a:r>
+            <a:r>
+              <a:rPr lang="en-US" sz="2400" i="1" dirty="0"/>
+              <a:t>what you recorded</a:t>
             </a:r>
           </a:p>
           <a:p>
             <a:pPr lvl="1"/>
             <a:r>
+              <a:rPr lang="en-US" sz="2000" dirty="0"/>
+              <a:t>Won’t tell you if you spent 2 hours on Twitter or 45 minutes replying to an email (unless you write that down yourself!)</a:t>
+            </a:r>
+            <a:endParaRPr lang="en-US" sz="2000" i="1" dirty="0"/>
+          </a:p>
+          <a:p>
+            <a:r>
               <a:rPr lang="en-US" sz="2400" dirty="0"/>
-              <a:t>Automated time tracking + customizable reporting = best of both worlds?</a:t>
-            </a:r>
-          </a:p>
-          <a:p>
-            <a:r>
-              <a:rPr lang="en-US" sz="2800" dirty="0"/>
-              <a:t>Incorporate additional visualizations and/or summary measures</a:t>
+              <a:t>Corollary: this is only useful if you track your time relatively accurately</a:t>
             </a:r>
           </a:p>
           <a:p>
             <a:pPr lvl="1"/>
             <a:r>
+              <a:rPr lang="en-US" sz="2000" dirty="0"/>
+              <a:t>15 minute increments at a minimum, sometimes record a single project or activity for an entire day</a:t>
+            </a:r>
+          </a:p>
+          <a:p>
+            <a:pPr lvl="1"/>
+            <a:r>
+              <a:rPr lang="en-US" sz="2000" dirty="0"/>
+              <a:t>Do what works best for you</a:t>
+            </a:r>
+          </a:p>
+          <a:p>
+            <a:r>
               <a:rPr lang="en-US" sz="2400" dirty="0"/>
-              <a:t>Changes over time?</a:t>
-            </a:r>
-          </a:p>
-          <a:p>
-            <a:pPr lvl="1"/>
-            <a:r>
-              <a:rPr lang="en-US" sz="2400" dirty="0"/>
-              <a:t>Suggestions?</a:t>
+              <a:t>Entirely retrospective: it’s a summary of what you’ve done, doesn’t include projected time allocations</a:t>
             </a:r>
           </a:p>
         </p:txBody>
@@ -14254,7 +14398,7 @@
           <p:cNvPr id="5" name="Slide Number Placeholder 4">
             <a:extLst>
               <a:ext uri="{FF2B5EF4-FFF2-40B4-BE49-F238E27FC236}">
-                <a16:creationId xmlns:a16="http://schemas.microsoft.com/office/drawing/2014/main" id="{8ECB3582-11B2-4221-9A20-0F2E986B1969}"/>
+                <a16:creationId xmlns:a16="http://schemas.microsoft.com/office/drawing/2014/main" id="{5A453F05-4D37-4551-A440-48E8ED1FE85E}"/>
               </a:ext>
             </a:extLst>
           </p:cNvPr>
@@ -14282,7 +14426,7 @@
     </p:spTree>
     <p:extLst>
       <p:ext uri="{BB962C8B-B14F-4D97-AF65-F5344CB8AC3E}">
-        <p14:creationId xmlns:p14="http://schemas.microsoft.com/office/powerpoint/2010/main" val="1472678012"/>
+        <p14:creationId xmlns:p14="http://schemas.microsoft.com/office/powerpoint/2010/main" val="2875116697"/>
       </p:ext>
     </p:extLst>
   </p:cSld>
@@ -14332,7 +14476,7 @@
           <a:p>
             <a:r>
               <a:rPr lang="en-US" dirty="0"/>
-              <a:t>Summary</a:t>
+              <a:t>Future Plans</a:t>
             </a:r>
           </a:p>
         </p:txBody>
@@ -14359,6 +14503,149 @@
           <a:lstStyle/>
           <a:p>
             <a:r>
+              <a:rPr lang="en-US" sz="2800" dirty="0"/>
+              <a:t>Incorporate with Toggl app (or other) to automate a portion of the tracking</a:t>
+            </a:r>
+          </a:p>
+          <a:p>
+            <a:pPr lvl="1"/>
+            <a:r>
+              <a:rPr lang="en-US" sz="2400" dirty="0"/>
+              <a:t>Automated time tracking + customizable reporting = best of both worlds?</a:t>
+            </a:r>
+          </a:p>
+          <a:p>
+            <a:r>
+              <a:rPr lang="en-US" sz="2800" dirty="0"/>
+              <a:t>Incorporate additional visualizations and/or summary measures</a:t>
+            </a:r>
+          </a:p>
+          <a:p>
+            <a:pPr lvl="1"/>
+            <a:r>
+              <a:rPr lang="en-US" sz="2400" dirty="0"/>
+              <a:t>Changes over time?</a:t>
+            </a:r>
+          </a:p>
+          <a:p>
+            <a:pPr lvl="1"/>
+            <a:r>
+              <a:rPr lang="en-US" sz="2400" dirty="0"/>
+              <a:t>Suggestions?</a:t>
+            </a:r>
+          </a:p>
+        </p:txBody>
+      </p:sp>
+      <p:sp>
+        <p:nvSpPr>
+          <p:cNvPr id="5" name="Slide Number Placeholder 4">
+            <a:extLst>
+              <a:ext uri="{FF2B5EF4-FFF2-40B4-BE49-F238E27FC236}">
+                <a16:creationId xmlns:a16="http://schemas.microsoft.com/office/drawing/2014/main" id="{8ECB3582-11B2-4221-9A20-0F2E986B1969}"/>
+              </a:ext>
+            </a:extLst>
+          </p:cNvPr>
+          <p:cNvSpPr>
+            <a:spLocks noGrp="1"/>
+          </p:cNvSpPr>
+          <p:nvPr>
+            <p:ph type="sldNum" sz="quarter" idx="4"/>
+          </p:nvPr>
+        </p:nvSpPr>
+        <p:spPr/>
+        <p:txBody>
+          <a:bodyPr/>
+          <a:lstStyle/>
+          <a:p>
+            <a:fld id="{1C3486A8-E8FB-4965-B61C-9B9FA7DC7BEE}" type="slidenum">
+              <a:rPr lang="en-US" smtClean="0"/>
+              <a:pPr/>
+              <a:t>32</a:t>
+            </a:fld>
+            <a:endParaRPr lang="en-US"/>
+          </a:p>
+        </p:txBody>
+      </p:sp>
+    </p:spTree>
+    <p:extLst>
+      <p:ext uri="{BB962C8B-B14F-4D97-AF65-F5344CB8AC3E}">
+        <p14:creationId xmlns:p14="http://schemas.microsoft.com/office/powerpoint/2010/main" val="1472678012"/>
+      </p:ext>
+    </p:extLst>
+  </p:cSld>
+  <p:clrMapOvr>
+    <a:masterClrMapping/>
+  </p:clrMapOvr>
+</p:sld>
+</file>
+
+<file path=ppt/slides/slide33.xml><?xml version="1.0" encoding="utf-8"?>
+<p:sld xmlns:a="http://schemas.openxmlformats.org/drawingml/2006/main" xmlns:r="http://schemas.openxmlformats.org/officeDocument/2006/relationships" xmlns:p="http://schemas.openxmlformats.org/presentationml/2006/main">
+  <p:cSld>
+    <p:spTree>
+      <p:nvGrpSpPr>
+        <p:cNvPr id="1" name=""/>
+        <p:cNvGrpSpPr/>
+        <p:nvPr/>
+      </p:nvGrpSpPr>
+      <p:grpSpPr>
+        <a:xfrm>
+          <a:off x="0" y="0"/>
+          <a:ext cx="0" cy="0"/>
+          <a:chOff x="0" y="0"/>
+          <a:chExt cx="0" cy="0"/>
+        </a:xfrm>
+      </p:grpSpPr>
+      <p:sp>
+        <p:nvSpPr>
+          <p:cNvPr id="2" name="Title 1">
+            <a:extLst>
+              <a:ext uri="{FF2B5EF4-FFF2-40B4-BE49-F238E27FC236}">
+                <a16:creationId xmlns:a16="http://schemas.microsoft.com/office/drawing/2014/main" id="{8B4B5790-0EA7-4012-93A7-22425D41E1E3}"/>
+              </a:ext>
+            </a:extLst>
+          </p:cNvPr>
+          <p:cNvSpPr>
+            <a:spLocks noGrp="1"/>
+          </p:cNvSpPr>
+          <p:nvPr>
+            <p:ph type="title"/>
+          </p:nvPr>
+        </p:nvSpPr>
+        <p:spPr/>
+        <p:txBody>
+          <a:bodyPr/>
+          <a:lstStyle/>
+          <a:p>
+            <a:r>
+              <a:rPr lang="en-US" dirty="0"/>
+              <a:t>Summary</a:t>
+            </a:r>
+          </a:p>
+        </p:txBody>
+      </p:sp>
+      <p:sp>
+        <p:nvSpPr>
+          <p:cNvPr id="3" name="Content Placeholder 2">
+            <a:extLst>
+              <a:ext uri="{FF2B5EF4-FFF2-40B4-BE49-F238E27FC236}">
+                <a16:creationId xmlns:a16="http://schemas.microsoft.com/office/drawing/2014/main" id="{4851F475-9DB2-4FC0-B370-DDE4324E134A}"/>
+              </a:ext>
+            </a:extLst>
+          </p:cNvPr>
+          <p:cNvSpPr>
+            <a:spLocks noGrp="1"/>
+          </p:cNvSpPr>
+          <p:nvPr>
+            <p:ph idx="1"/>
+          </p:nvPr>
+        </p:nvSpPr>
+        <p:spPr/>
+        <p:txBody>
+          <a:bodyPr/>
+          <a:lstStyle/>
+          <a:p>
+            <a:r>
               <a:rPr lang="en-US" sz="2400" dirty="0"/>
               <a:t>Very few metrics are needed to gain a general understanding of how you’re spending your time</a:t>
             </a:r>
@@ -14400,7 +14687,7 @@
           <p:nvPr/>
         </p:nvPicPr>
         <p:blipFill>
-          <a:blip r:embed="rId2">
+          <a:blip r:embed="rId3">
             <a:extLst>
               <a:ext uri="{28A0092B-C50C-407E-A947-70E740481C1C}">
                 <a14:useLocalDpi xmlns:a14="http://schemas.microsoft.com/office/drawing/2010/main" val="0"/>
@@ -14456,7 +14743,7 @@
             <a:fld id="{1C3486A8-E8FB-4965-B61C-9B9FA7DC7BEE}" type="slidenum">
               <a:rPr lang="en-US" smtClean="0"/>
               <a:pPr/>
-              <a:t>32</a:t>
+              <a:t>33</a:t>
             </a:fld>
             <a:endParaRPr lang="en-US"/>
           </a:p>
@@ -14475,7 +14762,7 @@
 </p:sld>
 </file>
 
-<file path=ppt/slides/slide33.xml><?xml version="1.0" encoding="utf-8"?>
+<file path=ppt/slides/slide34.xml><?xml version="1.0" encoding="utf-8"?>
 <p:sld xmlns:a="http://schemas.openxmlformats.org/drawingml/2006/main" xmlns:r="http://schemas.openxmlformats.org/officeDocument/2006/relationships" xmlns:p="http://schemas.openxmlformats.org/presentationml/2006/main">
   <p:cSld>
     <p:spTree>
@@ -14514,14 +14801,14 @@
           </a:ln>
           <a:extLst>
             <a:ext uri="{909E8E84-426E-40dd-AFC4-6F175D3DCCD1}">
-              <a14:hiddenFill xmlns:a14="http://schemas.microsoft.com/office/drawing/2010/main" xmlns="">
+              <a14:hiddenFill xmlns="" xmlns:a14="http://schemas.microsoft.com/office/drawing/2010/main">
                 <a:solidFill>
                   <a:srgbClr val="FFFFFF"/>
                 </a:solidFill>
               </a14:hiddenFill>
             </a:ext>
             <a:ext uri="{91240B29-F687-4f45-9708-019B960494DF}">
-              <a14:hiddenLine xmlns:a14="http://schemas.microsoft.com/office/drawing/2010/main" xmlns="" w="9525">
+              <a14:hiddenLine xmlns="" xmlns:a14="http://schemas.microsoft.com/office/drawing/2010/main" w="9525">
                 <a:solidFill>
                   <a:srgbClr val="000000"/>
                 </a:solidFill>
@@ -15183,8 +15470,8 @@
         </p:blipFill>
         <p:spPr bwMode="auto">
           <a:xfrm>
-            <a:off x="3252078" y="3068997"/>
-            <a:ext cx="3028950" cy="1514475"/>
+            <a:off x="2833788" y="2916474"/>
+            <a:ext cx="4426244" cy="2213122"/>
           </a:xfrm>
           <a:prstGeom prst="rect">
             <a:avLst/>
@@ -15230,7 +15517,7 @@
         </p:blipFill>
         <p:spPr bwMode="auto">
           <a:xfrm>
-            <a:off x="2127418" y="3928655"/>
+            <a:off x="1971775" y="4023035"/>
             <a:ext cx="1724025" cy="2000250"/>
           </a:xfrm>
           <a:prstGeom prst="rect">
@@ -15384,7 +15671,7 @@
             </a:r>
             <a:r>
               <a:rPr lang="en-US" sz="2000" i="1" dirty="0">
-                <a:hlinkClick r:id="rId2"/>
+                <a:hlinkClick r:id="rId3"/>
               </a:rPr>
               <a:t>Learning Shiny with NBA data</a:t>
             </a:r>
@@ -15781,7 +16068,7 @@
               <a:buChar char="•"/>
             </a:pPr>
             <a:r>
-              <a:rPr lang="en-US" sz="2000" u="sng" dirty="0"/>
+              <a:rPr lang="en-US" sz="2000" dirty="0"/>
               <a:t>Entirely customizable</a:t>
             </a:r>
           </a:p>
@@ -15792,7 +16079,7 @@
             </a:pPr>
             <a:r>
               <a:rPr lang="en-US" sz="2000" dirty="0"/>
-              <a:t>Free! </a:t>
+              <a:t>Full ownership of your recorded data, can set up and analyze in a way that best suits your needs</a:t>
             </a:r>
           </a:p>
           <a:p>
@@ -15802,7 +16089,17 @@
             </a:pPr>
             <a:r>
               <a:rPr lang="en-US" sz="2000" dirty="0"/>
-              <a:t>Full ownership of your recorded data, can set up and analyze in a way that best suits your needs</a:t>
+              <a:t>Entirely self-reported</a:t>
+            </a:r>
+          </a:p>
+          <a:p>
+            <a:pPr marL="285750" indent="-285750">
+              <a:buFont typeface="Arial" panose="020B0604020202020204" pitchFamily="34" charset="0"/>
+              <a:buChar char="•"/>
+            </a:pPr>
+            <a:r>
+              <a:rPr lang="en-US" sz="2000" dirty="0"/>
+              <a:t>Free</a:t>
             </a:r>
           </a:p>
         </p:txBody>
@@ -15892,16 +16189,6 @@
             <a:r>
               <a:rPr lang="en-US" sz="2000" dirty="0"/>
               <a:t>Can monitor apps and URLs used and identify distracters (hello Slack!)</a:t>
-            </a:r>
-          </a:p>
-          <a:p>
-            <a:pPr marL="285750" indent="-285750">
-              <a:buFont typeface="Arial" panose="020B0604020202020204" pitchFamily="34" charset="0"/>
-              <a:buChar char="•"/>
-            </a:pPr>
-            <a:r>
-              <a:rPr lang="en-US" sz="2000" dirty="0"/>
-              <a:t>More precise: down to the minute (if this is desired)</a:t>
             </a:r>
           </a:p>
           <a:p>
@@ -15977,7 +16264,7 @@
           <p:cNvPr id="2" name="Title 1">
             <a:extLst>
               <a:ext uri="{FF2B5EF4-FFF2-40B4-BE49-F238E27FC236}">
-                <a16:creationId xmlns:a16="http://schemas.microsoft.com/office/drawing/2014/main" id="{C41C5319-249F-4F8B-AD76-A1ED4DBBA85D}"/>
+                <a16:creationId xmlns:a16="http://schemas.microsoft.com/office/drawing/2014/main" id="{0268D8D3-EAE6-48A3-A2EF-639DBE13B96C}"/>
               </a:ext>
             </a:extLst>
           </p:cNvPr>
@@ -15994,18 +16281,30 @@
           <a:lstStyle/>
           <a:p>
             <a:r>
-              <a:rPr lang="en-US" dirty="0"/>
-              <a:t>Time tracking metrics &amp; visualizations</a:t>
+              <a:rPr lang="en-US" i="1" dirty="0" err="1">
+                <a:solidFill>
+                  <a:schemeClr val="accent1"/>
+                </a:solidFill>
+              </a:rPr>
+              <a:t>timetrackR</a:t>
+            </a:r>
+            <a:r>
+              <a:rPr lang="en-US" dirty="0">
+                <a:solidFill>
+                  <a:schemeClr val="accent1"/>
+                </a:solidFill>
+              </a:rPr>
+              <a:t> Details &amp; Demo</a:t>
             </a:r>
           </a:p>
         </p:txBody>
       </p:sp>
       <p:sp>
         <p:nvSpPr>
-          <p:cNvPr id="3" name="Content Placeholder 2">
+          <p:cNvPr id="3" name="Slide Number Placeholder 2">
             <a:extLst>
               <a:ext uri="{FF2B5EF4-FFF2-40B4-BE49-F238E27FC236}">
-                <a16:creationId xmlns:a16="http://schemas.microsoft.com/office/drawing/2014/main" id="{5FD2F8A0-9F57-454B-8B7D-6DA13D8466A6}"/>
+                <a16:creationId xmlns:a16="http://schemas.microsoft.com/office/drawing/2014/main" id="{9A65F4BD-EB50-41DC-9845-A1986B62B14D}"/>
               </a:ext>
             </a:extLst>
           </p:cNvPr>
@@ -16013,7 +16312,7 @@
             <a:spLocks noGrp="1"/>
           </p:cNvSpPr>
           <p:nvPr>
-            <p:ph idx="1"/>
+            <p:ph type="sldNum" sz="quarter" idx="11"/>
           </p:nvPr>
         </p:nvSpPr>
         <p:spPr/>
@@ -16021,100 +16320,6 @@
           <a:bodyPr/>
           <a:lstStyle/>
           <a:p>
-            <a:pPr marL="0" indent="0">
-              <a:buNone/>
-            </a:pPr>
-            <a:r>
-              <a:rPr lang="en-US" sz="2800" b="1" dirty="0">
-                <a:solidFill>
-                  <a:schemeClr val="accent2"/>
-                </a:solidFill>
-              </a:rPr>
-              <a:t>Percent effort</a:t>
-            </a:r>
-            <a:r>
-              <a:rPr lang="en-US" sz="2800" dirty="0"/>
-              <a:t>: Time spent per project/investigator/task</a:t>
-            </a:r>
-          </a:p>
-          <a:p>
-            <a:pPr marL="0" indent="0">
-              <a:buNone/>
-            </a:pPr>
-            <a:endParaRPr lang="en-US" sz="2800" dirty="0"/>
-          </a:p>
-          <a:p>
-            <a:pPr marL="0" indent="0">
-              <a:buNone/>
-            </a:pPr>
-            <a:r>
-              <a:rPr lang="en-US" sz="2800" b="1" dirty="0">
-                <a:solidFill>
-                  <a:schemeClr val="accent2"/>
-                </a:solidFill>
-              </a:rPr>
-              <a:t>Total hours</a:t>
-            </a:r>
-            <a:r>
-              <a:rPr lang="en-US" sz="2800" dirty="0"/>
-              <a:t>: Cumulative total number of hours spent on a project</a:t>
-            </a:r>
-          </a:p>
-          <a:p>
-            <a:pPr marL="0" indent="0">
-              <a:buNone/>
-            </a:pPr>
-            <a:endParaRPr lang="en-US" sz="2800" dirty="0"/>
-          </a:p>
-          <a:p>
-            <a:pPr marL="0" indent="0">
-              <a:buNone/>
-            </a:pPr>
-            <a:r>
-              <a:rPr lang="en-US" sz="2800" b="1" dirty="0">
-                <a:solidFill>
-                  <a:schemeClr val="accent2"/>
-                </a:solidFill>
-              </a:rPr>
-              <a:t>Gantt Chart</a:t>
-            </a:r>
-            <a:r>
-              <a:rPr lang="en-US" sz="2800" dirty="0"/>
-              <a:t>: Project phase by calendar time </a:t>
-            </a:r>
-          </a:p>
-          <a:p>
-            <a:pPr marL="0" indent="0">
-              <a:buNone/>
-            </a:pPr>
-            <a:endParaRPr lang="en-US" sz="2800" dirty="0"/>
-          </a:p>
-          <a:p>
-            <a:endParaRPr lang="en-US" sz="2400" dirty="0"/>
-          </a:p>
-        </p:txBody>
-      </p:sp>
-      <p:sp>
-        <p:nvSpPr>
-          <p:cNvPr id="5" name="Slide Number Placeholder 4">
-            <a:extLst>
-              <a:ext uri="{FF2B5EF4-FFF2-40B4-BE49-F238E27FC236}">
-                <a16:creationId xmlns:a16="http://schemas.microsoft.com/office/drawing/2014/main" id="{8677563C-266D-41E7-A11E-7B104FAED66D}"/>
-              </a:ext>
-            </a:extLst>
-          </p:cNvPr>
-          <p:cNvSpPr>
-            <a:spLocks noGrp="1"/>
-          </p:cNvSpPr>
-          <p:nvPr>
-            <p:ph type="sldNum" sz="quarter" idx="4"/>
-          </p:nvPr>
-        </p:nvSpPr>
-        <p:spPr/>
-        <p:txBody>
-          <a:bodyPr/>
-          <a:lstStyle/>
-          <a:p>
             <a:fld id="{1C3486A8-E8FB-4965-B61C-9B9FA7DC7BEE}" type="slidenum">
               <a:rPr lang="en-US" smtClean="0"/>
               <a:pPr/>
@@ -16127,7 +16332,7 @@
     </p:spTree>
     <p:extLst>
       <p:ext uri="{BB962C8B-B14F-4D97-AF65-F5344CB8AC3E}">
-        <p14:creationId xmlns:p14="http://schemas.microsoft.com/office/powerpoint/2010/main" val="3110883680"/>
+        <p14:creationId xmlns:p14="http://schemas.microsoft.com/office/powerpoint/2010/main" val="664291846"/>
       </p:ext>
     </p:extLst>
   </p:cSld>
@@ -16159,7 +16364,7 @@
           <p:cNvPr id="2" name="Title 1">
             <a:extLst>
               <a:ext uri="{FF2B5EF4-FFF2-40B4-BE49-F238E27FC236}">
-                <a16:creationId xmlns:a16="http://schemas.microsoft.com/office/drawing/2014/main" id="{BA53C0A9-0EA2-4E78-9222-7A630E1B2D0E}"/>
+                <a16:creationId xmlns:a16="http://schemas.microsoft.com/office/drawing/2014/main" id="{C41C5319-249F-4F8B-AD76-A1ED4DBBA85D}"/>
               </a:ext>
             </a:extLst>
           </p:cNvPr>
@@ -16177,15 +16382,7 @@
           <a:p>
             <a:r>
               <a:rPr lang="en-US" dirty="0"/>
-              <a:t>Time tracking metrics: </a:t>
-            </a:r>
-            <a:r>
-              <a:rPr lang="en-US" dirty="0">
-                <a:solidFill>
-                  <a:schemeClr val="accent1"/>
-                </a:solidFill>
-              </a:rPr>
-              <a:t>Percent effort</a:t>
+              <a:t>Time tracking metrics &amp; visualizations</a:t>
             </a:r>
           </a:p>
         </p:txBody>
@@ -16195,7 +16392,7 @@
           <p:cNvPr id="3" name="Content Placeholder 2">
             <a:extLst>
               <a:ext uri="{FF2B5EF4-FFF2-40B4-BE49-F238E27FC236}">
-                <a16:creationId xmlns:a16="http://schemas.microsoft.com/office/drawing/2014/main" id="{04B5CE58-6E6A-4022-ABB6-093BE19552FA}"/>
+                <a16:creationId xmlns:a16="http://schemas.microsoft.com/office/drawing/2014/main" id="{5FD2F8A0-9F57-454B-8B7D-6DA13D8466A6}"/>
               </a:ext>
             </a:extLst>
           </p:cNvPr>
@@ -16211,93 +16408,75 @@
           <a:bodyPr/>
           <a:lstStyle/>
           <a:p>
-            <a:r>
-              <a:rPr lang="en-US" sz="2000" dirty="0">
+            <a:pPr marL="0" indent="0">
+              <a:buNone/>
+            </a:pPr>
+            <a:r>
+              <a:rPr lang="en-US" sz="2800" b="1" dirty="0">
                 <a:solidFill>
                   <a:schemeClr val="accent2"/>
                 </a:solidFill>
               </a:rPr>
-              <a:t>Allocated vs expended effort</a:t>
-            </a:r>
-          </a:p>
-          <a:p>
-            <a:pPr lvl="1"/>
-            <a:r>
-              <a:rPr lang="en-US" sz="1600" dirty="0"/>
-              <a:t>Did an investigator ask for “quick help” on a project that is now taking up 30 hours a week?</a:t>
-            </a:r>
-          </a:p>
-          <a:p>
-            <a:r>
-              <a:rPr lang="en-US" sz="2000" dirty="0">
+              <a:t>Percent effort</a:t>
+            </a:r>
+            <a:r>
+              <a:rPr lang="en-US" sz="2800" dirty="0"/>
+              <a:t>: Time spent per project/investigator/task</a:t>
+            </a:r>
+          </a:p>
+          <a:p>
+            <a:pPr marL="0" indent="0">
+              <a:buNone/>
+            </a:pPr>
+            <a:endParaRPr lang="en-US" sz="2800" dirty="0"/>
+          </a:p>
+          <a:p>
+            <a:pPr marL="0" indent="0">
+              <a:buNone/>
+            </a:pPr>
+            <a:r>
+              <a:rPr lang="en-US" sz="2800" b="1" dirty="0">
                 <a:solidFill>
                   <a:schemeClr val="accent2"/>
                 </a:solidFill>
               </a:rPr>
-              <a:t>Task management</a:t>
-            </a:r>
-          </a:p>
-          <a:p>
-            <a:pPr lvl="1"/>
-            <a:r>
-              <a:rPr lang="en-US" sz="1600" dirty="0"/>
-              <a:t>As a statistician, what percentage of time is spent in meetings vs doing analyses? Does this need to be rebalanced?</a:t>
-            </a:r>
-          </a:p>
-          <a:p>
-            <a:pPr lvl="1"/>
-            <a:r>
-              <a:rPr lang="en-US" sz="1600" dirty="0"/>
-              <a:t>Are the right projects/tasks being prioritized?</a:t>
-            </a:r>
-          </a:p>
-          <a:p>
-            <a:r>
-              <a:rPr lang="en-US" sz="2000" dirty="0">
+              <a:t>Total hours</a:t>
+            </a:r>
+            <a:r>
+              <a:rPr lang="en-US" sz="2800" dirty="0"/>
+              <a:t>: Cumulative total number of hours spent on a project</a:t>
+            </a:r>
+          </a:p>
+          <a:p>
+            <a:pPr marL="0" indent="0">
+              <a:buNone/>
+            </a:pPr>
+            <a:endParaRPr lang="en-US" sz="2800" dirty="0"/>
+          </a:p>
+          <a:p>
+            <a:pPr marL="0" indent="0">
+              <a:buNone/>
+            </a:pPr>
+            <a:r>
+              <a:rPr lang="en-US" sz="2800" b="1" dirty="0">
                 <a:solidFill>
                   <a:schemeClr val="accent2"/>
                 </a:solidFill>
               </a:rPr>
-              <a:t>Comparing time invested to products generated</a:t>
-            </a:r>
-          </a:p>
-          <a:p>
-            <a:pPr lvl="1"/>
-            <a:r>
-              <a:rPr lang="en-US" sz="1600" dirty="0"/>
-              <a:t>Did an abstract take as long as a full analysis for a manuscript?</a:t>
-            </a:r>
-          </a:p>
-          <a:p>
-            <a:pPr lvl="1"/>
-            <a:r>
-              <a:rPr lang="en-US" sz="1600" dirty="0"/>
-              <a:t>For a time-intensive project, was the result multiple manuscripts? </a:t>
-            </a:r>
-          </a:p>
-          <a:p>
-            <a:r>
-              <a:rPr lang="en-US" sz="2000" dirty="0">
-                <a:solidFill>
-                  <a:schemeClr val="accent2"/>
-                </a:solidFill>
-              </a:rPr>
-              <a:t>Protecting your time</a:t>
-            </a:r>
-          </a:p>
-          <a:p>
-            <a:pPr lvl="1"/>
-            <a:r>
-              <a:rPr lang="en-US" sz="1600" dirty="0"/>
-              <a:t>What percentage of my time am I spending on professional development? Is this more or less than I want it to be?</a:t>
-            </a:r>
-          </a:p>
-          <a:p>
-            <a:pPr lvl="1"/>
-            <a:r>
-              <a:rPr lang="en-US" sz="1600" dirty="0"/>
-              <a:t>What percentage of my time am I spending on departmental activities (seminars, interviews, etc.) or other non-project work? Am I appropriately accounting for that when estimating how long it will take me to complete a project?</a:t>
-            </a:r>
+              <a:t>Gantt Chart</a:t>
+            </a:r>
+            <a:r>
+              <a:rPr lang="en-US" sz="2800" dirty="0"/>
+              <a:t>: Project phase by calendar time </a:t>
+            </a:r>
+          </a:p>
+          <a:p>
+            <a:pPr marL="0" indent="0">
+              <a:buNone/>
+            </a:pPr>
+            <a:endParaRPr lang="en-US" sz="2800" dirty="0"/>
+          </a:p>
+          <a:p>
             <a:endParaRPr lang="en-US" sz="2400" dirty="0"/>
           </a:p>
         </p:txBody>
@@ -16307,7 +16486,7 @@
           <p:cNvPr id="5" name="Slide Number Placeholder 4">
             <a:extLst>
               <a:ext uri="{FF2B5EF4-FFF2-40B4-BE49-F238E27FC236}">
-                <a16:creationId xmlns:a16="http://schemas.microsoft.com/office/drawing/2014/main" id="{F724A194-CC38-4681-8833-1F894452ECE4}"/>
+                <a16:creationId xmlns:a16="http://schemas.microsoft.com/office/drawing/2014/main" id="{8677563C-266D-41E7-A11E-7B104FAED66D}"/>
               </a:ext>
             </a:extLst>
           </p:cNvPr>
@@ -16335,7 +16514,7 @@
     </p:spTree>
     <p:extLst>
       <p:ext uri="{BB962C8B-B14F-4D97-AF65-F5344CB8AC3E}">
-        <p14:creationId xmlns:p14="http://schemas.microsoft.com/office/powerpoint/2010/main" val="1977642660"/>
+        <p14:creationId xmlns:p14="http://schemas.microsoft.com/office/powerpoint/2010/main" val="3110883680"/>
       </p:ext>
     </p:extLst>
   </p:cSld>
@@ -17261,26 +17440,6 @@
 </file>
 
 <file path=customXml/item1.xml><?xml version="1.0" encoding="utf-8"?>
-<?mso-contentType ?>
-<FormTemplates xmlns="http://schemas.microsoft.com/sharepoint/v3/contenttype/forms">
-  <Display>DocumentLibraryForm</Display>
-  <Edit>DocumentLibraryForm</Edit>
-  <New>DocumentLibraryForm</New>
-</FormTemplates>
-</file>
-
-<file path=customXml/item2.xml><?xml version="1.0" encoding="utf-8"?>
-<p:properties xmlns:p="http://schemas.microsoft.com/office/2006/metadata/properties" xmlns:xsi="http://www.w3.org/2001/XMLSchema-instance" xmlns:pc="http://schemas.microsoft.com/office/infopath/2007/PartnerControls">
-  <documentManagement>
-    <ImageCreateDate xmlns="E64CF27C-2ECC-48E8-947E-CA63274FB2E8" xsi:nil="true"/>
-    <PublishingExpirationDate xmlns="http://schemas.microsoft.com/sharepoint/v3" xsi:nil="true"/>
-    <PublishingStartDate xmlns="http://schemas.microsoft.com/sharepoint/v3" xsi:nil="true"/>
-    <wic_System_Copyright xmlns="http://schemas.microsoft.com/sharepoint/v3/fields" xsi:nil="true"/>
-  </documentManagement>
-</p:properties>
-</file>
-
-<file path=customXml/item3.xml><?xml version="1.0" encoding="utf-8"?>
 <ct:contentTypeSchema xmlns:ct="http://schemas.microsoft.com/office/2006/metadata/contentType" xmlns:ma="http://schemas.microsoft.com/office/2006/metadata/properties/metaAttributes" ct:_="" ma:_="" ma:contentTypeName="Image" ma:contentTypeID="0x0101009148F5A04DDD49CBA7127AADA5FB792B00AADE34325A8B49CDA8BB4DB53328F214008DA1A4150FB2B848A3EB7B452BFA7AC5" ma:contentTypeVersion="1" ma:contentTypeDescription="Upload an image." ma:contentTypeScope="" ma:versionID="c5dd4a19140d82efd42bf2e2156fee3e">
   <xsd:schema xmlns:xsd="http://www.w3.org/2001/XMLSchema" xmlns:xs="http://www.w3.org/2001/XMLSchema" xmlns:p="http://schemas.microsoft.com/office/2006/metadata/properties" xmlns:ns1="http://schemas.microsoft.com/sharepoint/v3" xmlns:ns2="E64CF27C-2ECC-48E8-947E-CA63274FB2E8" xmlns:ns3="http://schemas.microsoft.com/sharepoint/v3/fields" targetNamespace="http://schemas.microsoft.com/office/2006/metadata/properties" ma:root="true" ma:fieldsID="8669bc30feb5185623fa09da941496e2" ns1:_="" ns2:_="" ns3:_="">
     <xsd:import namespace="http://schemas.microsoft.com/sharepoint/v3"/>
@@ -17482,10 +17641,42 @@
 </ct:contentTypeSchema>
 </file>
 
+<file path=customXml/item2.xml><?xml version="1.0" encoding="utf-8"?>
+<p:properties xmlns:p="http://schemas.microsoft.com/office/2006/metadata/properties" xmlns:xsi="http://www.w3.org/2001/XMLSchema-instance" xmlns:pc="http://schemas.microsoft.com/office/infopath/2007/PartnerControls">
+  <documentManagement>
+    <ImageCreateDate xmlns="E64CF27C-2ECC-48E8-947E-CA63274FB2E8" xsi:nil="true"/>
+    <PublishingExpirationDate xmlns="http://schemas.microsoft.com/sharepoint/v3" xsi:nil="true"/>
+    <PublishingStartDate xmlns="http://schemas.microsoft.com/sharepoint/v3" xsi:nil="true"/>
+    <wic_System_Copyright xmlns="http://schemas.microsoft.com/sharepoint/v3/fields" xsi:nil="true"/>
+  </documentManagement>
+</p:properties>
+</file>
+
+<file path=customXml/item3.xml><?xml version="1.0" encoding="utf-8"?>
+<?mso-contentType ?>
+<FormTemplates xmlns="http://schemas.microsoft.com/sharepoint/v3/contenttype/forms">
+  <Display>DocumentLibraryForm</Display>
+  <Edit>DocumentLibraryForm</Edit>
+  <New>DocumentLibraryForm</New>
+</FormTemplates>
+</file>
+
 <file path=customXml/itemProps1.xml><?xml version="1.0" encoding="utf-8"?>
-<ds:datastoreItem xmlns:ds="http://schemas.openxmlformats.org/officeDocument/2006/customXml" ds:itemID="{B01F69EB-AD96-4AD6-8A18-0C8728F5F031}">
+<ds:datastoreItem xmlns:ds="http://schemas.openxmlformats.org/officeDocument/2006/customXml" ds:itemID="{E57EBD8B-EA50-4231-9F03-F9188E4066E3}">
   <ds:schemaRefs>
-    <ds:schemaRef ds:uri="http://schemas.microsoft.com/sharepoint/v3/contenttype/forms"/>
+    <ds:schemaRef ds:uri="http://schemas.microsoft.com/office/2006/metadata/contentType"/>
+    <ds:schemaRef ds:uri="http://schemas.microsoft.com/office/2006/metadata/properties/metaAttributes"/>
+    <ds:schemaRef ds:uri="http://www.w3.org/2001/XMLSchema"/>
+    <ds:schemaRef ds:uri="http://schemas.microsoft.com/office/2006/metadata/properties"/>
+    <ds:schemaRef ds:uri="http://schemas.microsoft.com/sharepoint/v3"/>
+    <ds:schemaRef ds:uri="E64CF27C-2ECC-48E8-947E-CA63274FB2E8"/>
+    <ds:schemaRef ds:uri="http://schemas.microsoft.com/sharepoint/v3/fields"/>
+    <ds:schemaRef ds:uri="http://schemas.microsoft.com/office/2006/documentManagement/types"/>
+    <ds:schemaRef ds:uri="http://schemas.microsoft.com/office/infopath/2007/PartnerControls"/>
+    <ds:schemaRef ds:uri="http://schemas.openxmlformats.org/package/2006/metadata/core-properties"/>
+    <ds:schemaRef ds:uri="http://purl.org/dc/elements/1.1/"/>
+    <ds:schemaRef ds:uri="http://purl.org/dc/terms/"/>
+    <ds:schemaRef ds:uri="http://schemas.microsoft.com/internal/obd"/>
   </ds:schemaRefs>
 </ds:datastoreItem>
 </file>
@@ -17509,21 +17700,9 @@
 </file>
 
 <file path=customXml/itemProps3.xml><?xml version="1.0" encoding="utf-8"?>
-<ds:datastoreItem xmlns:ds="http://schemas.openxmlformats.org/officeDocument/2006/customXml" ds:itemID="{E57EBD8B-EA50-4231-9F03-F9188E4066E3}">
+<ds:datastoreItem xmlns:ds="http://schemas.openxmlformats.org/officeDocument/2006/customXml" ds:itemID="{B01F69EB-AD96-4AD6-8A18-0C8728F5F031}">
   <ds:schemaRefs>
-    <ds:schemaRef ds:uri="http://schemas.microsoft.com/office/2006/metadata/contentType"/>
-    <ds:schemaRef ds:uri="http://schemas.microsoft.com/office/2006/metadata/properties/metaAttributes"/>
-    <ds:schemaRef ds:uri="http://www.w3.org/2001/XMLSchema"/>
-    <ds:schemaRef ds:uri="http://schemas.microsoft.com/office/2006/metadata/properties"/>
-    <ds:schemaRef ds:uri="http://schemas.microsoft.com/sharepoint/v3"/>
-    <ds:schemaRef ds:uri="E64CF27C-2ECC-48E8-947E-CA63274FB2E8"/>
-    <ds:schemaRef ds:uri="http://schemas.microsoft.com/sharepoint/v3/fields"/>
-    <ds:schemaRef ds:uri="http://schemas.microsoft.com/office/2006/documentManagement/types"/>
-    <ds:schemaRef ds:uri="http://schemas.microsoft.com/office/infopath/2007/PartnerControls"/>
-    <ds:schemaRef ds:uri="http://schemas.openxmlformats.org/package/2006/metadata/core-properties"/>
-    <ds:schemaRef ds:uri="http://purl.org/dc/elements/1.1/"/>
-    <ds:schemaRef ds:uri="http://purl.org/dc/terms/"/>
-    <ds:schemaRef ds:uri="http://schemas.microsoft.com/internal/obd"/>
+    <ds:schemaRef ds:uri="http://schemas.microsoft.com/sharepoint/v3/contenttype/forms"/>
   </ds:schemaRefs>
 </ds:datastoreItem>
 </file>
</xml_diff>

<commit_message>
Add hex sticker, updates to ppt
</commit_message>
<xml_diff>
--- a/RLadies timetrackR Presentation v2.pptx
+++ b/RLadies timetrackR Presentation v2.pptx
@@ -5,20 +5,20 @@
     <p:sldMasterId id="2147483648" r:id="rId4"/>
   </p:sldMasterIdLst>
   <p:notesMasterIdLst>
-    <p:notesMasterId r:id="rId39"/>
+    <p:notesMasterId r:id="rId40"/>
   </p:notesMasterIdLst>
   <p:handoutMasterIdLst>
-    <p:handoutMasterId r:id="rId40"/>
+    <p:handoutMasterId r:id="rId41"/>
   </p:handoutMasterIdLst>
   <p:sldIdLst>
     <p:sldId id="256" r:id="rId5"/>
     <p:sldId id="265" r:id="rId6"/>
     <p:sldId id="304" r:id="rId7"/>
     <p:sldId id="305" r:id="rId8"/>
-    <p:sldId id="290" r:id="rId9"/>
-    <p:sldId id="303" r:id="rId10"/>
-    <p:sldId id="267" r:id="rId11"/>
-    <p:sldId id="306" r:id="rId12"/>
+    <p:sldId id="267" r:id="rId9"/>
+    <p:sldId id="290" r:id="rId10"/>
+    <p:sldId id="306" r:id="rId11"/>
+    <p:sldId id="303" r:id="rId12"/>
     <p:sldId id="260" r:id="rId13"/>
     <p:sldId id="287" r:id="rId14"/>
     <p:sldId id="278" r:id="rId15"/>
@@ -41,10 +41,11 @@
     <p:sldId id="288" r:id="rId32"/>
     <p:sldId id="295" r:id="rId33"/>
     <p:sldId id="301" r:id="rId34"/>
-    <p:sldId id="262" r:id="rId35"/>
-    <p:sldId id="280" r:id="rId36"/>
-    <p:sldId id="263" r:id="rId37"/>
-    <p:sldId id="273" r:id="rId38"/>
+    <p:sldId id="307" r:id="rId35"/>
+    <p:sldId id="262" r:id="rId36"/>
+    <p:sldId id="280" r:id="rId37"/>
+    <p:sldId id="263" r:id="rId38"/>
+    <p:sldId id="273" r:id="rId39"/>
   </p:sldIdLst>
   <p:sldSz cx="9144000" cy="6858000" type="screen4x3"/>
   <p:notesSz cx="6858000" cy="9144000"/>
@@ -5414,7 +5415,7 @@
           <a:p>
             <a:fld id="{DA61AB23-0316-4A6A-B29B-19F469FB1971}" type="datetimeFigureOut">
               <a:rPr lang="en-US" smtClean="0"/>
-              <a:t>2/23/2020</a:t>
+              <a:t>2/23/20</a:t>
             </a:fld>
             <a:endParaRPr lang="en-US"/>
           </a:p>
@@ -5592,7 +5593,7 @@
           <a:p>
             <a:fld id="{7F6DE0E8-87C7-4A14-9F3C-CD4E49706B18}" type="datetimeFigureOut">
               <a:rPr lang="en-US" smtClean="0"/>
-              <a:t>2/23/2020</a:t>
+              <a:t>2/23/20</a:t>
             </a:fld>
             <a:endParaRPr lang="en-US"/>
           </a:p>
@@ -6082,26 +6083,27 @@
           <a:bodyPr/>
           <a:lstStyle/>
           <a:p>
-            <a:pPr marL="0" marR="0" lvl="0" indent="0" algn="l" defTabSz="914400" rtl="0" eaLnBrk="1" fontAlgn="auto" latinLnBrk="0" hangingPunct="1">
-              <a:lnSpc>
-                <a:spcPct val="100000"/>
-              </a:lnSpc>
-              <a:spcBef>
-                <a:spcPts val="0"/>
-              </a:spcBef>
-              <a:spcAft>
-                <a:spcPts val="0"/>
-              </a:spcAft>
-              <a:buClrTx/>
-              <a:buSzTx/>
-              <a:buFontTx/>
-              <a:buNone/>
-              <a:tabLst/>
-              <a:defRPr/>
-            </a:pPr>
             <a:r>
               <a:rPr lang="en-US" dirty="0"/>
-              <a:t>Brief note that a lot of what I’m going to talk about has to do with the structure of my job, which is primarily project based across multiple investigators. While that specific scenario won’t hold for everyone here, the general concepts are applicable. </a:t>
+              <a:t>For me, having total control and ability to fully customize was important – also a few years ago a lot of these apps weren’t as well established/popularized</a:t>
+            </a:r>
+          </a:p>
+          <a:p>
+            <a:r>
+              <a:rPr lang="en-US" dirty="0"/>
+              <a:t>Some features like insights and saving reports are behind the paywall on Toggl</a:t>
+            </a:r>
+          </a:p>
+          <a:p>
+            <a:r>
+              <a:rPr lang="en-US" dirty="0"/>
+              <a:t>Wanted flexibility in terms of what was reported </a:t>
+            </a:r>
+          </a:p>
+          <a:p>
+            <a:r>
+              <a:rPr lang="en-US" dirty="0"/>
+              <a:t>Monitoring apps is geared more towards productivity – wasn’t concerned I wasn’t being productive, was more concerned about the long term flow of projects</a:t>
             </a:r>
           </a:p>
         </p:txBody>
@@ -6132,7 +6134,7 @@
     </p:spTree>
     <p:extLst>
       <p:ext uri="{BB962C8B-B14F-4D97-AF65-F5344CB8AC3E}">
-        <p14:creationId xmlns:p14="http://schemas.microsoft.com/office/powerpoint/2010/main" val="746084871"/>
+        <p14:creationId xmlns:p14="http://schemas.microsoft.com/office/powerpoint/2010/main" val="1081214721"/>
       </p:ext>
     </p:extLst>
   </p:cSld>
@@ -6186,9 +6188,26 @@
           <a:bodyPr/>
           <a:lstStyle/>
           <a:p>
+            <a:pPr marL="0" marR="0" lvl="0" indent="0" algn="l" defTabSz="914400" rtl="0" eaLnBrk="1" fontAlgn="auto" latinLnBrk="0" hangingPunct="1">
+              <a:lnSpc>
+                <a:spcPct val="100000"/>
+              </a:lnSpc>
+              <a:spcBef>
+                <a:spcPts val="0"/>
+              </a:spcBef>
+              <a:spcAft>
+                <a:spcPts val="0"/>
+              </a:spcAft>
+              <a:buClrTx/>
+              <a:buSzTx/>
+              <a:buFontTx/>
+              <a:buNone/>
+              <a:tabLst/>
+              <a:defRPr/>
+            </a:pPr>
             <a:r>
               <a:rPr lang="en-US" dirty="0"/>
-              <a:t>For discussion: Do others do this? If so, how? In conjunction with management or separately? </a:t>
+              <a:t>Brief note that a lot of what I’m going to talk about has to do with the structure of my job, which is primarily project based across multiple investigators. While that specific scenario won’t hold for everyone here, the general concepts are applicable. </a:t>
             </a:r>
           </a:p>
         </p:txBody>
@@ -6210,7 +6229,285 @@
           <a:p>
             <a:fld id="{9C5C8B17-D1C9-48DD-A1B1-EDA1E362804A}" type="slidenum">
               <a:rPr lang="en-US" smtClean="0"/>
-              <a:t>33</a:t>
+              <a:t>6</a:t>
+            </a:fld>
+            <a:endParaRPr lang="en-US"/>
+          </a:p>
+        </p:txBody>
+      </p:sp>
+    </p:spTree>
+    <p:extLst>
+      <p:ext uri="{BB962C8B-B14F-4D97-AF65-F5344CB8AC3E}">
+        <p14:creationId xmlns:p14="http://schemas.microsoft.com/office/powerpoint/2010/main" val="746084871"/>
+      </p:ext>
+    </p:extLst>
+  </p:cSld>
+  <p:clrMapOvr>
+    <a:masterClrMapping/>
+  </p:clrMapOvr>
+</p:notes>
+</file>
+
+<file path=ppt/notesSlides/notesSlide5.xml><?xml version="1.0" encoding="utf-8"?>
+<p:notes xmlns:a="http://schemas.openxmlformats.org/drawingml/2006/main" xmlns:r="http://schemas.openxmlformats.org/officeDocument/2006/relationships" xmlns:p="http://schemas.openxmlformats.org/presentationml/2006/main">
+  <p:cSld>
+    <p:spTree>
+      <p:nvGrpSpPr>
+        <p:cNvPr id="1" name=""/>
+        <p:cNvGrpSpPr/>
+        <p:nvPr/>
+      </p:nvGrpSpPr>
+      <p:grpSpPr>
+        <a:xfrm>
+          <a:off x="0" y="0"/>
+          <a:ext cx="0" cy="0"/>
+          <a:chOff x="0" y="0"/>
+          <a:chExt cx="0" cy="0"/>
+        </a:xfrm>
+      </p:grpSpPr>
+      <p:sp>
+        <p:nvSpPr>
+          <p:cNvPr id="2" name="Slide Image Placeholder 1"/>
+          <p:cNvSpPr>
+            <a:spLocks noGrp="1" noRot="1" noChangeAspect="1"/>
+          </p:cNvSpPr>
+          <p:nvPr>
+            <p:ph type="sldImg"/>
+          </p:nvPr>
+        </p:nvSpPr>
+        <p:spPr/>
+      </p:sp>
+      <p:sp>
+        <p:nvSpPr>
+          <p:cNvPr id="3" name="Notes Placeholder 2"/>
+          <p:cNvSpPr>
+            <a:spLocks noGrp="1"/>
+          </p:cNvSpPr>
+          <p:nvPr>
+            <p:ph type="body" idx="1"/>
+          </p:nvPr>
+        </p:nvSpPr>
+        <p:spPr/>
+        <p:txBody>
+          <a:bodyPr/>
+          <a:lstStyle/>
+          <a:p>
+            <a:r>
+              <a:rPr lang="en-US" dirty="0"/>
+              <a:t>Donut chart by project: change time from one year ago to six months ago, 3 months ago, this month</a:t>
+            </a:r>
+          </a:p>
+          <a:p>
+            <a:endParaRPr lang="en-US" dirty="0"/>
+          </a:p>
+          <a:p>
+            <a:r>
+              <a:rPr lang="en-US" dirty="0"/>
+              <a:t>Change time to beginning 2017, look at hours by project</a:t>
+            </a:r>
+          </a:p>
+        </p:txBody>
+      </p:sp>
+      <p:sp>
+        <p:nvSpPr>
+          <p:cNvPr id="4" name="Slide Number Placeholder 3"/>
+          <p:cNvSpPr>
+            <a:spLocks noGrp="1"/>
+          </p:cNvSpPr>
+          <p:nvPr>
+            <p:ph type="sldNum" sz="quarter" idx="5"/>
+          </p:nvPr>
+        </p:nvSpPr>
+        <p:spPr/>
+        <p:txBody>
+          <a:bodyPr/>
+          <a:lstStyle/>
+          <a:p>
+            <a:fld id="{9C5C8B17-D1C9-48DD-A1B1-EDA1E362804A}" type="slidenum">
+              <a:rPr lang="en-US" smtClean="0"/>
+              <a:t>15</a:t>
+            </a:fld>
+            <a:endParaRPr lang="en-US"/>
+          </a:p>
+        </p:txBody>
+      </p:sp>
+    </p:spTree>
+    <p:extLst>
+      <p:ext uri="{BB962C8B-B14F-4D97-AF65-F5344CB8AC3E}">
+        <p14:creationId xmlns:p14="http://schemas.microsoft.com/office/powerpoint/2010/main" val="761640427"/>
+      </p:ext>
+    </p:extLst>
+  </p:cSld>
+  <p:clrMapOvr>
+    <a:masterClrMapping/>
+  </p:clrMapOvr>
+</p:notes>
+</file>
+
+<file path=ppt/notesSlides/notesSlide6.xml><?xml version="1.0" encoding="utf-8"?>
+<p:notes xmlns:a="http://schemas.openxmlformats.org/drawingml/2006/main" xmlns:r="http://schemas.openxmlformats.org/officeDocument/2006/relationships" xmlns:p="http://schemas.openxmlformats.org/presentationml/2006/main">
+  <p:cSld>
+    <p:spTree>
+      <p:nvGrpSpPr>
+        <p:cNvPr id="1" name=""/>
+        <p:cNvGrpSpPr/>
+        <p:nvPr/>
+      </p:nvGrpSpPr>
+      <p:grpSpPr>
+        <a:xfrm>
+          <a:off x="0" y="0"/>
+          <a:ext cx="0" cy="0"/>
+          <a:chOff x="0" y="0"/>
+          <a:chExt cx="0" cy="0"/>
+        </a:xfrm>
+      </p:grpSpPr>
+      <p:sp>
+        <p:nvSpPr>
+          <p:cNvPr id="2" name="Slide Image Placeholder 1"/>
+          <p:cNvSpPr>
+            <a:spLocks noGrp="1" noRot="1" noChangeAspect="1"/>
+          </p:cNvSpPr>
+          <p:nvPr>
+            <p:ph type="sldImg"/>
+          </p:nvPr>
+        </p:nvSpPr>
+        <p:spPr/>
+      </p:sp>
+      <p:sp>
+        <p:nvSpPr>
+          <p:cNvPr id="3" name="Notes Placeholder 2"/>
+          <p:cNvSpPr>
+            <a:spLocks noGrp="1"/>
+          </p:cNvSpPr>
+          <p:nvPr>
+            <p:ph type="body" idx="1"/>
+          </p:nvPr>
+        </p:nvSpPr>
+        <p:spPr/>
+        <p:txBody>
+          <a:bodyPr/>
+          <a:lstStyle/>
+          <a:p>
+            <a:r>
+              <a:rPr lang="en-US" dirty="0"/>
+              <a:t>Highly recommend former </a:t>
+            </a:r>
+            <a:r>
+              <a:rPr lang="en-US" dirty="0" err="1"/>
+              <a:t>Rladies</a:t>
+            </a:r>
+            <a:r>
+              <a:rPr lang="en-US" dirty="0"/>
+              <a:t> talks on setting up Shiny apps, especially Julia Wrobel’s NBA Shiny App tutorial, which is available online and the link is on the earlier slide of this talk</a:t>
+            </a:r>
+          </a:p>
+        </p:txBody>
+      </p:sp>
+      <p:sp>
+        <p:nvSpPr>
+          <p:cNvPr id="4" name="Slide Number Placeholder 3"/>
+          <p:cNvSpPr>
+            <a:spLocks noGrp="1"/>
+          </p:cNvSpPr>
+          <p:nvPr>
+            <p:ph type="sldNum" sz="quarter" idx="5"/>
+          </p:nvPr>
+        </p:nvSpPr>
+        <p:spPr/>
+        <p:txBody>
+          <a:bodyPr/>
+          <a:lstStyle/>
+          <a:p>
+            <a:fld id="{9C5C8B17-D1C9-48DD-A1B1-EDA1E362804A}" type="slidenum">
+              <a:rPr lang="en-US" smtClean="0"/>
+              <a:t>24</a:t>
+            </a:fld>
+            <a:endParaRPr lang="en-US"/>
+          </a:p>
+        </p:txBody>
+      </p:sp>
+    </p:spTree>
+    <p:extLst>
+      <p:ext uri="{BB962C8B-B14F-4D97-AF65-F5344CB8AC3E}">
+        <p14:creationId xmlns:p14="http://schemas.microsoft.com/office/powerpoint/2010/main" val="2489663593"/>
+      </p:ext>
+    </p:extLst>
+  </p:cSld>
+  <p:clrMapOvr>
+    <a:masterClrMapping/>
+  </p:clrMapOvr>
+</p:notes>
+</file>
+
+<file path=ppt/notesSlides/notesSlide7.xml><?xml version="1.0" encoding="utf-8"?>
+<p:notes xmlns:a="http://schemas.openxmlformats.org/drawingml/2006/main" xmlns:r="http://schemas.openxmlformats.org/officeDocument/2006/relationships" xmlns:p="http://schemas.openxmlformats.org/presentationml/2006/main">
+  <p:cSld>
+    <p:spTree>
+      <p:nvGrpSpPr>
+        <p:cNvPr id="1" name=""/>
+        <p:cNvGrpSpPr/>
+        <p:nvPr/>
+      </p:nvGrpSpPr>
+      <p:grpSpPr>
+        <a:xfrm>
+          <a:off x="0" y="0"/>
+          <a:ext cx="0" cy="0"/>
+          <a:chOff x="0" y="0"/>
+          <a:chExt cx="0" cy="0"/>
+        </a:xfrm>
+      </p:grpSpPr>
+      <p:sp>
+        <p:nvSpPr>
+          <p:cNvPr id="2" name="Slide Image Placeholder 1"/>
+          <p:cNvSpPr>
+            <a:spLocks noGrp="1" noRot="1" noChangeAspect="1"/>
+          </p:cNvSpPr>
+          <p:nvPr>
+            <p:ph type="sldImg"/>
+          </p:nvPr>
+        </p:nvSpPr>
+        <p:spPr/>
+      </p:sp>
+      <p:sp>
+        <p:nvSpPr>
+          <p:cNvPr id="3" name="Notes Placeholder 2"/>
+          <p:cNvSpPr>
+            <a:spLocks noGrp="1"/>
+          </p:cNvSpPr>
+          <p:nvPr>
+            <p:ph type="body" idx="1"/>
+          </p:nvPr>
+        </p:nvSpPr>
+        <p:spPr/>
+        <p:txBody>
+          <a:bodyPr/>
+          <a:lstStyle/>
+          <a:p>
+            <a:r>
+              <a:rPr lang="en-US" dirty="0"/>
+              <a:t>For discussion: Do others do this? If so, how? In conjunction with management or separately? </a:t>
+            </a:r>
+          </a:p>
+        </p:txBody>
+      </p:sp>
+      <p:sp>
+        <p:nvSpPr>
+          <p:cNvPr id="4" name="Slide Number Placeholder 3"/>
+          <p:cNvSpPr>
+            <a:spLocks noGrp="1"/>
+          </p:cNvSpPr>
+          <p:nvPr>
+            <p:ph type="sldNum" sz="quarter" idx="5"/>
+          </p:nvPr>
+        </p:nvSpPr>
+        <p:spPr/>
+        <p:txBody>
+          <a:bodyPr/>
+          <a:lstStyle/>
+          <a:p>
+            <a:fld id="{9C5C8B17-D1C9-48DD-A1B1-EDA1E362804A}" type="slidenum">
+              <a:rPr lang="en-US" smtClean="0"/>
+              <a:t>34</a:t>
             </a:fld>
             <a:endParaRPr lang="en-US"/>
           </a:p>
@@ -8545,17 +8842,17 @@
           </a:ln>
           <a:extLst>
             <a:ext uri="{FAA26D3D-D897-4be2-8F04-BA451C77F1D7}">
-              <ma14:placeholderFlag xmlns:ma14="http://schemas.microsoft.com/office/mac/drawingml/2011/main" xmlns="" val="1"/>
+              <ma14:placeholderFlag xmlns="" xmlns:ma14="http://schemas.microsoft.com/office/mac/drawingml/2011/main" val="1"/>
             </a:ext>
             <a:ext uri="{909E8E84-426E-40dd-AFC4-6F175D3DCCD1}">
-              <a14:hiddenFill xmlns:a14="http://schemas.microsoft.com/office/drawing/2010/main" xmlns="">
+              <a14:hiddenFill xmlns="" xmlns:a14="http://schemas.microsoft.com/office/drawing/2010/main">
                 <a:solidFill>
                   <a:srgbClr val="FFFFFF"/>
                 </a:solidFill>
               </a14:hiddenFill>
             </a:ext>
             <a:ext uri="{91240B29-F687-4f45-9708-019B960494DF}">
-              <a14:hiddenLine xmlns:a14="http://schemas.microsoft.com/office/drawing/2010/main" xmlns="" w="9525">
+              <a14:hiddenLine xmlns="" xmlns:a14="http://schemas.microsoft.com/office/drawing/2010/main" w="9525">
                 <a:solidFill>
                   <a:srgbClr val="000000"/>
                 </a:solidFill>
@@ -8607,17 +8904,17 @@
           </a:ln>
           <a:extLst>
             <a:ext uri="{FAA26D3D-D897-4be2-8F04-BA451C77F1D7}">
-              <ma14:placeholderFlag xmlns:ma14="http://schemas.microsoft.com/office/mac/drawingml/2011/main" xmlns="" val="1"/>
+              <ma14:placeholderFlag xmlns="" xmlns:ma14="http://schemas.microsoft.com/office/mac/drawingml/2011/main" val="1"/>
             </a:ext>
             <a:ext uri="{909E8E84-426E-40dd-AFC4-6F175D3DCCD1}">
-              <a14:hiddenFill xmlns:a14="http://schemas.microsoft.com/office/drawing/2010/main" xmlns="">
+              <a14:hiddenFill xmlns="" xmlns:a14="http://schemas.microsoft.com/office/drawing/2010/main">
                 <a:solidFill>
                   <a:srgbClr val="FFFFFF"/>
                 </a:solidFill>
               </a14:hiddenFill>
             </a:ext>
             <a:ext uri="{91240B29-F687-4f45-9708-019B960494DF}">
-              <a14:hiddenLine xmlns:a14="http://schemas.microsoft.com/office/drawing/2010/main" xmlns="" w="9525">
+              <a14:hiddenLine xmlns="" xmlns:a14="http://schemas.microsoft.com/office/drawing/2010/main" w="9525">
                 <a:solidFill>
                   <a:srgbClr val="000000"/>
                 </a:solidFill>
@@ -9536,7 +9833,7 @@
         </p:blipFill>
         <p:spPr bwMode="auto">
           <a:xfrm>
-            <a:off x="5894039" y="3361328"/>
+            <a:off x="5637367" y="3361328"/>
             <a:ext cx="1719742" cy="1990165"/>
           </a:xfrm>
           <a:prstGeom prst="rect">
@@ -9583,7 +9880,7 @@
         </p:blipFill>
         <p:spPr bwMode="auto">
           <a:xfrm>
-            <a:off x="5029885" y="4786249"/>
+            <a:off x="4773213" y="4786249"/>
             <a:ext cx="1724025" cy="2000250"/>
           </a:xfrm>
           <a:prstGeom prst="rect">
@@ -9630,7 +9927,7 @@
         </p:blipFill>
         <p:spPr bwMode="auto">
           <a:xfrm>
-            <a:off x="6721578" y="4793684"/>
+            <a:off x="6464906" y="4793684"/>
             <a:ext cx="1719742" cy="1985379"/>
           </a:xfrm>
           <a:prstGeom prst="rect">
@@ -9646,6 +9943,36 @@
               </a14:hiddenFill>
             </a:ext>
           </a:extLst>
+        </p:spPr>
+      </p:pic>
+      <p:pic>
+        <p:nvPicPr>
+          <p:cNvPr id="6" name="Picture 5">
+            <a:extLst>
+              <a:ext uri="{FF2B5EF4-FFF2-40B4-BE49-F238E27FC236}">
+                <a16:creationId xmlns:a16="http://schemas.microsoft.com/office/drawing/2014/main" id="{B43D66B9-B2F3-E946-825F-AC177192914D}"/>
+              </a:ext>
+            </a:extLst>
+          </p:cNvPr>
+          <p:cNvPicPr>
+            <a:picLocks noChangeAspect="1"/>
+          </p:cNvPicPr>
+          <p:nvPr/>
+        </p:nvPicPr>
+        <p:blipFill>
+          <a:blip r:embed="rId5"/>
+          <a:stretch>
+            <a:fillRect/>
+          </a:stretch>
+        </p:blipFill>
+        <p:spPr>
+          <a:xfrm>
+            <a:off x="7327840" y="3353892"/>
+            <a:ext cx="1720962" cy="1993392"/>
+          </a:xfrm>
+          <a:prstGeom prst="rect">
+            <a:avLst/>
+          </a:prstGeom>
         </p:spPr>
       </p:pic>
     </p:spTree>
@@ -10483,7 +10810,7 @@
           <p:nvPr/>
         </p:nvPicPr>
         <p:blipFill>
-          <a:blip r:embed="rId2"/>
+          <a:blip r:embed="rId3"/>
           <a:stretch>
             <a:fillRect/>
           </a:stretch>
@@ -11958,14 +12285,21 @@
             <a:pPr lvl="1"/>
             <a:r>
               <a:rPr lang="en-US" sz="1800" dirty="0"/>
-              <a:t>Summarize number of hours across projects</a:t>
+              <a:t>Will need to edit this program the first time running the app</a:t>
             </a:r>
           </a:p>
           <a:p>
             <a:pPr lvl="1"/>
             <a:r>
               <a:rPr lang="en-US" sz="1800" dirty="0"/>
-              <a:t>Concatenate data from multiple statisticians</a:t>
+              <a:t>May need to update to reflect project phases that are relevant to your work</a:t>
+            </a:r>
+          </a:p>
+          <a:p>
+            <a:pPr lvl="1"/>
+            <a:r>
+              <a:rPr lang="en-US" sz="1800" dirty="0"/>
+              <a:t>Concatenate data from multiple team members</a:t>
             </a:r>
           </a:p>
           <a:p>
@@ -11973,13 +12307,6 @@
             <a:r>
               <a:rPr lang="en-US" sz="1800" dirty="0"/>
               <a:t>Identify active vs inactive projects</a:t>
-            </a:r>
-          </a:p>
-          <a:p>
-            <a:pPr lvl="1"/>
-            <a:r>
-              <a:rPr lang="en-US" sz="1800" dirty="0"/>
-              <a:t>Will need to edit this program the first time running the app</a:t>
             </a:r>
           </a:p>
           <a:p>
@@ -12093,7 +12420,7 @@
           <a:lstStyle/>
           <a:p>
             <a:r>
-              <a:rPr lang="en-US" dirty="0">
+              <a:rPr lang="en-US" b="0" dirty="0">
                 <a:solidFill>
                   <a:schemeClr val="accent2"/>
                 </a:solidFill>
@@ -12108,12 +12435,28 @@
               <a:t>	</a:t>
             </a:r>
             <a:r>
+              <a:rPr lang="en-US" b="0" dirty="0">
+                <a:solidFill>
+                  <a:schemeClr val="accent1"/>
+                </a:solidFill>
+              </a:rPr>
+              <a:t>The </a:t>
+            </a:r>
+            <a:r>
               <a:rPr lang="en-US" dirty="0">
                 <a:solidFill>
                   <a:schemeClr val="accent1"/>
                 </a:solidFill>
               </a:rPr>
-              <a:t>The switch function and </a:t>
+              <a:t>switch</a:t>
+            </a:r>
+            <a:r>
+              <a:rPr lang="en-US" b="0" dirty="0">
+                <a:solidFill>
+                  <a:schemeClr val="accent1"/>
+                </a:solidFill>
+              </a:rPr>
+              <a:t> function and </a:t>
             </a:r>
             <a:r>
               <a:rPr lang="en-US" dirty="0" err="1">
@@ -12217,7 +12560,7 @@
           <a:p>
             <a:r>
               <a:rPr lang="en-US" dirty="0"/>
-              <a:t>Code tidbits:</a:t>
+              <a:t>The </a:t>
             </a:r>
             <a:r>
               <a:rPr lang="en-US" dirty="0">
@@ -12225,7 +12568,11 @@
                   <a:schemeClr val="accent2"/>
                 </a:solidFill>
               </a:rPr>
-              <a:t> switch function</a:t>
+              <a:t>switch</a:t>
+            </a:r>
+            <a:r>
+              <a:rPr lang="en-US" dirty="0"/>
+              <a:t> function</a:t>
             </a:r>
           </a:p>
         </p:txBody>
@@ -12869,14 +13216,6 @@
           <a:p>
             <a:r>
               <a:rPr lang="en-US" dirty="0"/>
-              <a:t>Code tidbits: </a:t>
-            </a:r>
-            <a:r>
-              <a:rPr lang="en-US" dirty="0">
-                <a:solidFill>
-                  <a:schemeClr val="accent2"/>
-                </a:solidFill>
-              </a:rPr>
               <a:t>Gantt Chart</a:t>
             </a:r>
           </a:p>
@@ -14304,6 +14643,119 @@
           <p:cNvPr id="2" name="Title 1">
             <a:extLst>
               <a:ext uri="{FF2B5EF4-FFF2-40B4-BE49-F238E27FC236}">
+                <a16:creationId xmlns:a16="http://schemas.microsoft.com/office/drawing/2014/main" id="{84BF7905-7574-E348-9601-1DBE555CE1FE}"/>
+              </a:ext>
+            </a:extLst>
+          </p:cNvPr>
+          <p:cNvSpPr>
+            <a:spLocks noGrp="1"/>
+          </p:cNvSpPr>
+          <p:nvPr>
+            <p:ph type="title"/>
+          </p:nvPr>
+        </p:nvSpPr>
+        <p:spPr/>
+        <p:txBody>
+          <a:bodyPr/>
+          <a:lstStyle/>
+          <a:p>
+            <a:r>
+              <a:rPr lang="en-US" dirty="0"/>
+              <a:t>Hex Sticker</a:t>
+            </a:r>
+          </a:p>
+        </p:txBody>
+      </p:sp>
+      <p:sp>
+        <p:nvSpPr>
+          <p:cNvPr id="3" name="Content Placeholder 2">
+            <a:extLst>
+              <a:ext uri="{FF2B5EF4-FFF2-40B4-BE49-F238E27FC236}">
+                <a16:creationId xmlns:a16="http://schemas.microsoft.com/office/drawing/2014/main" id="{9BBFFCD4-E7E6-4F4E-A1F8-408212331322}"/>
+              </a:ext>
+            </a:extLst>
+          </p:cNvPr>
+          <p:cNvSpPr>
+            <a:spLocks noGrp="1"/>
+          </p:cNvSpPr>
+          <p:nvPr>
+            <p:ph idx="1"/>
+          </p:nvPr>
+        </p:nvSpPr>
+        <p:spPr/>
+        <p:txBody>
+          <a:bodyPr/>
+          <a:lstStyle/>
+          <a:p>
+            <a:endParaRPr lang="en-US"/>
+          </a:p>
+        </p:txBody>
+      </p:sp>
+      <p:sp>
+        <p:nvSpPr>
+          <p:cNvPr id="4" name="Slide Number Placeholder 3">
+            <a:extLst>
+              <a:ext uri="{FF2B5EF4-FFF2-40B4-BE49-F238E27FC236}">
+                <a16:creationId xmlns:a16="http://schemas.microsoft.com/office/drawing/2014/main" id="{6368F44B-8A0E-BA49-80AF-FD0340216C7F}"/>
+              </a:ext>
+            </a:extLst>
+          </p:cNvPr>
+          <p:cNvSpPr>
+            <a:spLocks noGrp="1"/>
+          </p:cNvSpPr>
+          <p:nvPr>
+            <p:ph type="sldNum" sz="quarter" idx="4"/>
+          </p:nvPr>
+        </p:nvSpPr>
+        <p:spPr/>
+        <p:txBody>
+          <a:bodyPr/>
+          <a:lstStyle/>
+          <a:p>
+            <a:fld id="{1C3486A8-E8FB-4965-B61C-9B9FA7DC7BEE}" type="slidenum">
+              <a:rPr lang="en-US" smtClean="0"/>
+              <a:pPr/>
+              <a:t>31</a:t>
+            </a:fld>
+            <a:endParaRPr lang="en-US"/>
+          </a:p>
+        </p:txBody>
+      </p:sp>
+    </p:spTree>
+    <p:extLst>
+      <p:ext uri="{BB962C8B-B14F-4D97-AF65-F5344CB8AC3E}">
+        <p14:creationId xmlns:p14="http://schemas.microsoft.com/office/powerpoint/2010/main" val="701887435"/>
+      </p:ext>
+    </p:extLst>
+  </p:cSld>
+  <p:clrMapOvr>
+    <a:masterClrMapping/>
+  </p:clrMapOvr>
+</p:sld>
+</file>
+
+<file path=ppt/slides/slide32.xml><?xml version="1.0" encoding="utf-8"?>
+<p:sld xmlns:a="http://schemas.openxmlformats.org/drawingml/2006/main" xmlns:r="http://schemas.openxmlformats.org/officeDocument/2006/relationships" xmlns:p="http://schemas.openxmlformats.org/presentationml/2006/main">
+  <p:cSld>
+    <p:spTree>
+      <p:nvGrpSpPr>
+        <p:cNvPr id="1" name=""/>
+        <p:cNvGrpSpPr/>
+        <p:nvPr/>
+      </p:nvGrpSpPr>
+      <p:grpSpPr>
+        <a:xfrm>
+          <a:off x="0" y="0"/>
+          <a:ext cx="0" cy="0"/>
+          <a:chOff x="0" y="0"/>
+          <a:chExt cx="0" cy="0"/>
+        </a:xfrm>
+      </p:grpSpPr>
+      <p:sp>
+        <p:nvSpPr>
+          <p:cNvPr id="2" name="Title 1">
+            <a:extLst>
+              <a:ext uri="{FF2B5EF4-FFF2-40B4-BE49-F238E27FC236}">
                 <a16:creationId xmlns:a16="http://schemas.microsoft.com/office/drawing/2014/main" id="{633F03C8-ABD3-4A00-AD80-087F21332873}"/>
               </a:ext>
             </a:extLst>
@@ -14417,7 +14869,7 @@
             <a:fld id="{1C3486A8-E8FB-4965-B61C-9B9FA7DC7BEE}" type="slidenum">
               <a:rPr lang="en-US" smtClean="0"/>
               <a:pPr/>
-              <a:t>31</a:t>
+              <a:t>32</a:t>
             </a:fld>
             <a:endParaRPr lang="en-US"/>
           </a:p>
@@ -14436,7 +14888,7 @@
 </p:sld>
 </file>
 
-<file path=ppt/slides/slide32.xml><?xml version="1.0" encoding="utf-8"?>
+<file path=ppt/slides/slide33.xml><?xml version="1.0" encoding="utf-8"?>
 <p:sld xmlns:a="http://schemas.openxmlformats.org/drawingml/2006/main" xmlns:r="http://schemas.openxmlformats.org/officeDocument/2006/relationships" xmlns:p="http://schemas.openxmlformats.org/presentationml/2006/main">
   <p:cSld>
     <p:spTree>
@@ -14560,7 +15012,7 @@
             <a:fld id="{1C3486A8-E8FB-4965-B61C-9B9FA7DC7BEE}" type="slidenum">
               <a:rPr lang="en-US" smtClean="0"/>
               <a:pPr/>
-              <a:t>32</a:t>
+              <a:t>33</a:t>
             </a:fld>
             <a:endParaRPr lang="en-US"/>
           </a:p>
@@ -14579,7 +15031,7 @@
 </p:sld>
 </file>
 
-<file path=ppt/slides/slide33.xml><?xml version="1.0" encoding="utf-8"?>
+<file path=ppt/slides/slide34.xml><?xml version="1.0" encoding="utf-8"?>
 <p:sld xmlns:a="http://schemas.openxmlformats.org/drawingml/2006/main" xmlns:r="http://schemas.openxmlformats.org/officeDocument/2006/relationships" xmlns:p="http://schemas.openxmlformats.org/presentationml/2006/main">
   <p:cSld>
     <p:spTree>
@@ -14743,7 +15195,7 @@
             <a:fld id="{1C3486A8-E8FB-4965-B61C-9B9FA7DC7BEE}" type="slidenum">
               <a:rPr lang="en-US" smtClean="0"/>
               <a:pPr/>
-              <a:t>33</a:t>
+              <a:t>34</a:t>
             </a:fld>
             <a:endParaRPr lang="en-US"/>
           </a:p>
@@ -14762,7 +15214,7 @@
 </p:sld>
 </file>
 
-<file path=ppt/slides/slide34.xml><?xml version="1.0" encoding="utf-8"?>
+<file path=ppt/slides/slide35.xml><?xml version="1.0" encoding="utf-8"?>
 <p:sld xmlns:a="http://schemas.openxmlformats.org/drawingml/2006/main" xmlns:r="http://schemas.openxmlformats.org/officeDocument/2006/relationships" xmlns:p="http://schemas.openxmlformats.org/presentationml/2006/main">
   <p:cSld>
     <p:spTree>
@@ -14801,14 +15253,14 @@
           </a:ln>
           <a:extLst>
             <a:ext uri="{909E8E84-426E-40dd-AFC4-6F175D3DCCD1}">
-              <a14:hiddenFill xmlns="" xmlns:a14="http://schemas.microsoft.com/office/drawing/2010/main">
+              <a14:hiddenFill xmlns:a14="http://schemas.microsoft.com/office/drawing/2010/main" xmlns="">
                 <a:solidFill>
                   <a:srgbClr val="FFFFFF"/>
                 </a:solidFill>
               </a14:hiddenFill>
             </a:ext>
             <a:ext uri="{91240B29-F687-4f45-9708-019B960494DF}">
-              <a14:hiddenLine xmlns="" xmlns:a14="http://schemas.microsoft.com/office/drawing/2010/main" w="9525">
+              <a14:hiddenLine xmlns:a14="http://schemas.microsoft.com/office/drawing/2010/main" xmlns="" w="9525">
                 <a:solidFill>
                   <a:srgbClr val="000000"/>
                 </a:solidFill>
@@ -15470,55 +15922,8 @@
         </p:blipFill>
         <p:spPr bwMode="auto">
           <a:xfrm>
-            <a:off x="2833788" y="2916474"/>
+            <a:off x="2372485" y="3068997"/>
             <a:ext cx="4426244" cy="2213122"/>
-          </a:xfrm>
-          <a:prstGeom prst="rect">
-            <a:avLst/>
-          </a:prstGeom>
-          <a:noFill/>
-          <a:extLst>
-            <a:ext uri="{909E8E84-426E-40DD-AFC4-6F175D3DCCD1}">
-              <a14:hiddenFill xmlns:a14="http://schemas.microsoft.com/office/drawing/2010/main">
-                <a:solidFill>
-                  <a:srgbClr val="FFFFFF"/>
-                </a:solidFill>
-              </a14:hiddenFill>
-            </a:ext>
-          </a:extLst>
-        </p:spPr>
-      </p:pic>
-      <p:pic>
-        <p:nvPicPr>
-          <p:cNvPr id="7" name="Picture 2" descr="Image result for shiny hex sticker">
-            <a:extLst>
-              <a:ext uri="{FF2B5EF4-FFF2-40B4-BE49-F238E27FC236}">
-                <a16:creationId xmlns:a16="http://schemas.microsoft.com/office/drawing/2014/main" id="{9721F992-6E51-4BDF-A26A-B5580494393E}"/>
-              </a:ext>
-            </a:extLst>
-          </p:cNvPr>
-          <p:cNvPicPr>
-            <a:picLocks noChangeAspect="1" noChangeArrowheads="1"/>
-          </p:cNvPicPr>
-          <p:nvPr/>
-        </p:nvPicPr>
-        <p:blipFill>
-          <a:blip r:embed="rId3">
-            <a:extLst>
-              <a:ext uri="{28A0092B-C50C-407E-A947-70E740481C1C}">
-                <a14:useLocalDpi xmlns:a14="http://schemas.microsoft.com/office/drawing/2010/main" val="0"/>
-              </a:ext>
-            </a:extLst>
-          </a:blip>
-          <a:srcRect/>
-          <a:stretch>
-            <a:fillRect/>
-          </a:stretch>
-        </p:blipFill>
-        <p:spPr bwMode="auto">
-          <a:xfrm>
-            <a:off x="1971775" y="4023035"/>
-            <a:ext cx="1724025" cy="2000250"/>
           </a:xfrm>
           <a:prstGeom prst="rect">
             <a:avLst/>
@@ -15570,6 +15975,378 @@
           <p:cNvPr id="2" name="Title 1">
             <a:extLst>
               <a:ext uri="{FF2B5EF4-FFF2-40B4-BE49-F238E27FC236}">
+                <a16:creationId xmlns:a16="http://schemas.microsoft.com/office/drawing/2014/main" id="{3735F51F-7E07-4A40-BC26-034C4B71F632}"/>
+              </a:ext>
+            </a:extLst>
+          </p:cNvPr>
+          <p:cNvSpPr>
+            <a:spLocks noGrp="1"/>
+          </p:cNvSpPr>
+          <p:nvPr>
+            <p:ph type="title"/>
+          </p:nvPr>
+        </p:nvSpPr>
+        <p:spPr/>
+        <p:txBody>
+          <a:bodyPr/>
+          <a:lstStyle/>
+          <a:p>
+            <a:r>
+              <a:rPr lang="en-US"/>
+              <a:t>Potential tools for tracking &amp; analyzing your time</a:t>
+            </a:r>
+            <a:endParaRPr lang="en-US" dirty="0"/>
+          </a:p>
+        </p:txBody>
+      </p:sp>
+      <p:graphicFrame>
+        <p:nvGraphicFramePr>
+          <p:cNvPr id="21" name="Content Placeholder 20">
+            <a:extLst>
+              <a:ext uri="{FF2B5EF4-FFF2-40B4-BE49-F238E27FC236}">
+                <a16:creationId xmlns:a16="http://schemas.microsoft.com/office/drawing/2014/main" id="{0B5ECE22-564E-C94D-BA1A-EDE96ECE3B79}"/>
+              </a:ext>
+            </a:extLst>
+          </p:cNvPr>
+          <p:cNvGraphicFramePr>
+            <a:graphicFrameLocks noGrp="1"/>
+          </p:cNvGraphicFramePr>
+          <p:nvPr>
+            <p:ph idx="1"/>
+            <p:extLst>
+              <p:ext uri="{D42A27DB-BD31-4B8C-83A1-F6EECF244321}">
+                <p14:modId xmlns:p14="http://schemas.microsoft.com/office/powerpoint/2010/main" val="2599275028"/>
+              </p:ext>
+            </p:extLst>
+          </p:nvPr>
+        </p:nvGraphicFramePr>
+        <p:xfrm>
+          <a:off x="765174" y="1515087"/>
+          <a:ext cx="7680326" cy="3810000"/>
+        </p:xfrm>
+        <a:graphic>
+          <a:graphicData uri="http://schemas.openxmlformats.org/drawingml/2006/table">
+            <a:tbl>
+              <a:tblPr firstRow="1" bandRow="1">
+                <a:tableStyleId>{5C22544A-7EE6-4342-B048-85BDC9FD1C3A}</a:tableStyleId>
+              </a:tblPr>
+              <a:tblGrid>
+                <a:gridCol w="3840163">
+                  <a:extLst>
+                    <a:ext uri="{9D8B030D-6E8A-4147-A177-3AD203B41FA5}">
+                      <a16:colId xmlns:a16="http://schemas.microsoft.com/office/drawing/2014/main" val="3088414900"/>
+                    </a:ext>
+                  </a:extLst>
+                </a:gridCol>
+                <a:gridCol w="3840163">
+                  <a:extLst>
+                    <a:ext uri="{9D8B030D-6E8A-4147-A177-3AD203B41FA5}">
+                      <a16:colId xmlns:a16="http://schemas.microsoft.com/office/drawing/2014/main" val="2406306967"/>
+                    </a:ext>
+                  </a:extLst>
+                </a:gridCol>
+              </a:tblGrid>
+              <a:tr h="370840">
+                <a:tc>
+                  <a:txBody>
+                    <a:bodyPr/>
+                    <a:lstStyle/>
+                    <a:p>
+                      <a:r>
+                        <a:rPr lang="en-US" sz="2000" dirty="0"/>
+                        <a:t>DIY</a:t>
+                      </a:r>
+                    </a:p>
+                  </a:txBody>
+                  <a:tcPr/>
+                </a:tc>
+                <a:tc>
+                  <a:txBody>
+                    <a:bodyPr/>
+                    <a:lstStyle/>
+                    <a:p>
+                      <a:pPr marL="0" marR="0" lvl="0" indent="0" algn="l" defTabSz="457200" rtl="0" eaLnBrk="1" fontAlgn="auto" latinLnBrk="0" hangingPunct="1">
+                        <a:lnSpc>
+                          <a:spcPct val="100000"/>
+                        </a:lnSpc>
+                        <a:spcBef>
+                          <a:spcPts val="0"/>
+                        </a:spcBef>
+                        <a:spcAft>
+                          <a:spcPts val="0"/>
+                        </a:spcAft>
+                        <a:buClrTx/>
+                        <a:buSzTx/>
+                        <a:buFontTx/>
+                        <a:buNone/>
+                        <a:tabLst/>
+                        <a:defRPr/>
+                      </a:pPr>
+                      <a:r>
+                        <a:rPr lang="en-US" sz="2000" dirty="0"/>
+                        <a:t>Other software (e.g. Toggl, </a:t>
+                      </a:r>
+                      <a:r>
+                        <a:rPr lang="en-US" sz="2000" dirty="0" err="1"/>
+                        <a:t>RescueTime</a:t>
+                      </a:r>
+                      <a:r>
+                        <a:rPr lang="en-US" sz="2000" dirty="0"/>
+                        <a:t>, </a:t>
+                      </a:r>
+                      <a:r>
+                        <a:rPr lang="en-US" sz="2000" dirty="0" err="1"/>
+                        <a:t>Everhour</a:t>
+                      </a:r>
+                      <a:r>
+                        <a:rPr lang="en-US" sz="2000" dirty="0"/>
+                        <a:t>)</a:t>
+                      </a:r>
+                    </a:p>
+                  </a:txBody>
+                  <a:tcPr/>
+                </a:tc>
+                <a:extLst>
+                  <a:ext uri="{0D108BD9-81ED-4DB2-BD59-A6C34878D82A}">
+                    <a16:rowId xmlns:a16="http://schemas.microsoft.com/office/drawing/2014/main" val="3270522597"/>
+                  </a:ext>
+                </a:extLst>
+              </a:tr>
+              <a:tr h="370840">
+                <a:tc>
+                  <a:txBody>
+                    <a:bodyPr/>
+                    <a:lstStyle/>
+                    <a:p>
+                      <a:r>
+                        <a:rPr lang="en-US" sz="2000" b="0" dirty="0"/>
+                        <a:t>Free</a:t>
+                      </a:r>
+                    </a:p>
+                  </a:txBody>
+                  <a:tcPr/>
+                </a:tc>
+                <a:tc>
+                  <a:txBody>
+                    <a:bodyPr/>
+                    <a:lstStyle/>
+                    <a:p>
+                      <a:r>
+                        <a:rPr lang="en-US" sz="2000" dirty="0"/>
+                        <a:t>Free versions and paid versions with different capabilities</a:t>
+                      </a:r>
+                    </a:p>
+                  </a:txBody>
+                  <a:tcPr/>
+                </a:tc>
+                <a:extLst>
+                  <a:ext uri="{0D108BD9-81ED-4DB2-BD59-A6C34878D82A}">
+                    <a16:rowId xmlns:a16="http://schemas.microsoft.com/office/drawing/2014/main" val="85090996"/>
+                  </a:ext>
+                </a:extLst>
+              </a:tr>
+              <a:tr h="370840">
+                <a:tc>
+                  <a:txBody>
+                    <a:bodyPr/>
+                    <a:lstStyle/>
+                    <a:p>
+                      <a:pPr marL="0" marR="0" lvl="0" indent="0" algn="l" defTabSz="457200" rtl="0" eaLnBrk="1" fontAlgn="auto" latinLnBrk="0" hangingPunct="1">
+                        <a:lnSpc>
+                          <a:spcPct val="100000"/>
+                        </a:lnSpc>
+                        <a:spcBef>
+                          <a:spcPts val="0"/>
+                        </a:spcBef>
+                        <a:spcAft>
+                          <a:spcPts val="0"/>
+                        </a:spcAft>
+                        <a:buClrTx/>
+                        <a:buSzTx/>
+                        <a:buFontTx/>
+                        <a:buNone/>
+                        <a:tabLst/>
+                        <a:defRPr/>
+                      </a:pPr>
+                      <a:r>
+                        <a:rPr lang="en-US" sz="2000" b="1" dirty="0"/>
+                        <a:t>Full ownership of your recorded data, can set up and analyze in a way that best suits your needs</a:t>
+                      </a:r>
+                    </a:p>
+                  </a:txBody>
+                  <a:tcPr/>
+                </a:tc>
+                <a:tc>
+                  <a:txBody>
+                    <a:bodyPr/>
+                    <a:lstStyle/>
+                    <a:p>
+                      <a:r>
+                        <a:rPr lang="en-US" sz="2000" dirty="0"/>
+                        <a:t>Preset metrics; can export your data and modify as needed for analysis</a:t>
+                      </a:r>
+                    </a:p>
+                  </a:txBody>
+                  <a:tcPr/>
+                </a:tc>
+                <a:extLst>
+                  <a:ext uri="{0D108BD9-81ED-4DB2-BD59-A6C34878D82A}">
+                    <a16:rowId xmlns:a16="http://schemas.microsoft.com/office/drawing/2014/main" val="1461580731"/>
+                  </a:ext>
+                </a:extLst>
+              </a:tr>
+              <a:tr h="370840">
+                <a:tc>
+                  <a:txBody>
+                    <a:bodyPr/>
+                    <a:lstStyle/>
+                    <a:p>
+                      <a:r>
+                        <a:rPr lang="en-US" sz="2000" dirty="0"/>
+                        <a:t>Self-report time spent per task</a:t>
+                      </a:r>
+                    </a:p>
+                  </a:txBody>
+                  <a:tcPr/>
+                </a:tc>
+                <a:tc>
+                  <a:txBody>
+                    <a:bodyPr/>
+                    <a:lstStyle/>
+                    <a:p>
+                      <a:r>
+                        <a:rPr lang="en-US" sz="2000" dirty="0"/>
+                        <a:t>Turn on timer to start/stop tracking</a:t>
+                      </a:r>
+                    </a:p>
+                  </a:txBody>
+                  <a:tcPr/>
+                </a:tc>
+                <a:extLst>
+                  <a:ext uri="{0D108BD9-81ED-4DB2-BD59-A6C34878D82A}">
+                    <a16:rowId xmlns:a16="http://schemas.microsoft.com/office/drawing/2014/main" val="2915045308"/>
+                  </a:ext>
+                </a:extLst>
+              </a:tr>
+              <a:tr h="370840">
+                <a:tc>
+                  <a:txBody>
+                    <a:bodyPr/>
+                    <a:lstStyle/>
+                    <a:p>
+                      <a:r>
+                        <a:rPr lang="en-US" sz="2000" dirty="0"/>
+                        <a:t>Only knows what you tell it</a:t>
+                      </a:r>
+                    </a:p>
+                  </a:txBody>
+                  <a:tcPr/>
+                </a:tc>
+                <a:tc>
+                  <a:txBody>
+                    <a:bodyPr/>
+                    <a:lstStyle/>
+                    <a:p>
+                      <a:pPr marL="0" marR="0" lvl="0" indent="0" algn="l" defTabSz="457200" rtl="0" eaLnBrk="1" fontAlgn="auto" latinLnBrk="0" hangingPunct="1">
+                        <a:lnSpc>
+                          <a:spcPct val="100000"/>
+                        </a:lnSpc>
+                        <a:spcBef>
+                          <a:spcPts val="0"/>
+                        </a:spcBef>
+                        <a:spcAft>
+                          <a:spcPts val="0"/>
+                        </a:spcAft>
+                        <a:buClrTx/>
+                        <a:buSzTx/>
+                        <a:buFontTx/>
+                        <a:buNone/>
+                        <a:tabLst/>
+                        <a:defRPr/>
+                      </a:pPr>
+                      <a:r>
+                        <a:rPr lang="en-US" sz="2000" dirty="0"/>
+                        <a:t>Some can monitor apps and URLs used and identify distracters (hello Slack!)</a:t>
+                      </a:r>
+                    </a:p>
+                  </a:txBody>
+                  <a:tcPr/>
+                </a:tc>
+                <a:extLst>
+                  <a:ext uri="{0D108BD9-81ED-4DB2-BD59-A6C34878D82A}">
+                    <a16:rowId xmlns:a16="http://schemas.microsoft.com/office/drawing/2014/main" val="1403723725"/>
+                  </a:ext>
+                </a:extLst>
+              </a:tr>
+            </a:tbl>
+          </a:graphicData>
+        </a:graphic>
+      </p:graphicFrame>
+      <p:sp>
+        <p:nvSpPr>
+          <p:cNvPr id="4" name="Slide Number Placeholder 3">
+            <a:extLst>
+              <a:ext uri="{FF2B5EF4-FFF2-40B4-BE49-F238E27FC236}">
+                <a16:creationId xmlns:a16="http://schemas.microsoft.com/office/drawing/2014/main" id="{6C867645-EF69-43F0-BD42-9E23B31FE145}"/>
+              </a:ext>
+            </a:extLst>
+          </p:cNvPr>
+          <p:cNvSpPr>
+            <a:spLocks noGrp="1"/>
+          </p:cNvSpPr>
+          <p:nvPr>
+            <p:ph type="sldNum" sz="quarter" idx="4"/>
+          </p:nvPr>
+        </p:nvSpPr>
+        <p:spPr/>
+        <p:txBody>
+          <a:bodyPr/>
+          <a:lstStyle/>
+          <a:p>
+            <a:fld id="{1C3486A8-E8FB-4965-B61C-9B9FA7DC7BEE}" type="slidenum">
+              <a:rPr lang="en-US" smtClean="0"/>
+              <a:pPr/>
+              <a:t>5</a:t>
+            </a:fld>
+            <a:endParaRPr lang="en-US"/>
+          </a:p>
+        </p:txBody>
+      </p:sp>
+    </p:spTree>
+    <p:extLst>
+      <p:ext uri="{BB962C8B-B14F-4D97-AF65-F5344CB8AC3E}">
+        <p14:creationId xmlns:p14="http://schemas.microsoft.com/office/powerpoint/2010/main" val="3083300731"/>
+      </p:ext>
+    </p:extLst>
+  </p:cSld>
+  <p:clrMapOvr>
+    <a:masterClrMapping/>
+  </p:clrMapOvr>
+</p:sld>
+</file>
+
+<file path=ppt/slides/slide6.xml><?xml version="1.0" encoding="utf-8"?>
+<p:sld xmlns:a="http://schemas.openxmlformats.org/drawingml/2006/main" xmlns:r="http://schemas.openxmlformats.org/officeDocument/2006/relationships" xmlns:p="http://schemas.openxmlformats.org/presentationml/2006/main">
+  <p:cSld>
+    <p:spTree>
+      <p:nvGrpSpPr>
+        <p:cNvPr id="1" name=""/>
+        <p:cNvGrpSpPr/>
+        <p:nvPr/>
+      </p:nvGrpSpPr>
+      <p:grpSpPr>
+        <a:xfrm>
+          <a:off x="0" y="0"/>
+          <a:ext cx="0" cy="0"/>
+          <a:chOff x="0" y="0"/>
+          <a:chExt cx="0" cy="0"/>
+        </a:xfrm>
+      </p:grpSpPr>
+      <p:sp>
+        <p:nvSpPr>
+          <p:cNvPr id="2" name="Title 1">
+            <a:extLst>
+              <a:ext uri="{FF2B5EF4-FFF2-40B4-BE49-F238E27FC236}">
                 <a16:creationId xmlns:a16="http://schemas.microsoft.com/office/drawing/2014/main" id="{7026DA84-64A6-4D51-AE5A-782C2EF42B49}"/>
               </a:ext>
             </a:extLst>
@@ -15588,7 +16365,7 @@
           <a:p>
             <a:r>
               <a:rPr lang="en-US" dirty="0"/>
-              <a:t>Motivation</a:t>
+              <a:t>Motivation for the DIY approach</a:t>
             </a:r>
           </a:p>
         </p:txBody>
@@ -15620,25 +16397,25 @@
                   <a:schemeClr val="accent1"/>
                 </a:solidFill>
               </a:rPr>
-              <a:t>Setting</a:t>
+              <a:t>Usability</a:t>
             </a:r>
             <a:r>
               <a:rPr lang="en-US" sz="2400" dirty="0"/>
-              <a:t>: On a team of 3 statisticians at the time</a:t>
+              <a:t>: Wanted simple, easily interpretable metrics/visualization – didn’t want to spend all of my time analyzing my time</a:t>
             </a:r>
           </a:p>
           <a:p>
             <a:pPr lvl="1"/>
             <a:r>
               <a:rPr lang="en-US" sz="2000" dirty="0"/>
-              <a:t>Project-based work with overlap in projects and investigators</a:t>
+              <a:t>Use for goal-setting and evaluating overall project flow</a:t>
             </a:r>
           </a:p>
           <a:p>
             <a:pPr lvl="1"/>
             <a:r>
               <a:rPr lang="en-US" sz="2000" dirty="0"/>
-              <a:t>Track individually or in aggregate</a:t>
+              <a:t>Aid in forecasting/resource allocation decisions</a:t>
             </a:r>
           </a:p>
           <a:p>
@@ -15659,15 +16436,7 @@
             <a:pPr lvl="1"/>
             <a:r>
               <a:rPr lang="en-US" sz="2000" dirty="0"/>
-              <a:t>Used previous </a:t>
-            </a:r>
-            <a:r>
-              <a:rPr lang="en-US" sz="2000" dirty="0" err="1"/>
-              <a:t>RLadies</a:t>
-            </a:r>
-            <a:r>
-              <a:rPr lang="en-US" sz="2000" dirty="0"/>
-              <a:t> presentation to get started: </a:t>
+              <a:t>Used previous RLadies presentation to get started: </a:t>
             </a:r>
             <a:r>
               <a:rPr lang="en-US" sz="2000" i="1" dirty="0">
@@ -15684,26 +16453,30 @@
                   <a:schemeClr val="accent1"/>
                 </a:solidFill>
               </a:rPr>
-              <a:t>Usability</a:t>
+              <a:t>Setting</a:t>
             </a:r>
             <a:r>
               <a:rPr lang="en-US" sz="2400" dirty="0"/>
-              <a:t>: Wanted simple, easily interpretable metrics/visualization – didn’t want to spend all of my time analyzing my time</a:t>
+              <a:t>: On a team of 3 statisticians at the time</a:t>
             </a:r>
           </a:p>
           <a:p>
             <a:pPr lvl="1"/>
             <a:r>
               <a:rPr lang="en-US" sz="2000" dirty="0"/>
-              <a:t>Use for goal-setting and evaluating</a:t>
+              <a:t>Project-based work with overlap in projects and investigators</a:t>
             </a:r>
           </a:p>
           <a:p>
             <a:pPr lvl="1"/>
             <a:r>
               <a:rPr lang="en-US" sz="2000" dirty="0"/>
-              <a:t>Aid in forecasting/resource allocation decisions</a:t>
-            </a:r>
+              <a:t>Track individually or in aggregate</a:t>
+            </a:r>
+          </a:p>
+          <a:p>
+            <a:pPr lvl="1"/>
+            <a:endParaRPr lang="en-US" sz="2000" dirty="0"/>
           </a:p>
           <a:p>
             <a:endParaRPr lang="en-US" sz="2200" dirty="0"/>
@@ -15738,7 +16511,7 @@
             <a:fld id="{1C3486A8-E8FB-4965-B61C-9B9FA7DC7BEE}" type="slidenum">
               <a:rPr lang="en-US" smtClean="0"/>
               <a:pPr/>
-              <a:t>5</a:t>
+              <a:t>6</a:t>
             </a:fld>
             <a:endParaRPr lang="en-US"/>
           </a:p>
@@ -15757,7 +16530,186 @@
 </p:sld>
 </file>
 
-<file path=ppt/slides/slide6.xml><?xml version="1.0" encoding="utf-8"?>
+<file path=ppt/slides/slide7.xml><?xml version="1.0" encoding="utf-8"?>
+<p:sld xmlns:a="http://schemas.openxmlformats.org/drawingml/2006/main" xmlns:r="http://schemas.openxmlformats.org/officeDocument/2006/relationships" xmlns:p="http://schemas.openxmlformats.org/presentationml/2006/main">
+  <p:cSld>
+    <p:spTree>
+      <p:nvGrpSpPr>
+        <p:cNvPr id="1" name=""/>
+        <p:cNvGrpSpPr/>
+        <p:nvPr/>
+      </p:nvGrpSpPr>
+      <p:grpSpPr>
+        <a:xfrm>
+          <a:off x="0" y="0"/>
+          <a:ext cx="0" cy="0"/>
+          <a:chOff x="0" y="0"/>
+          <a:chExt cx="0" cy="0"/>
+        </a:xfrm>
+      </p:grpSpPr>
+      <p:sp>
+        <p:nvSpPr>
+          <p:cNvPr id="2" name="Title 1">
+            <a:extLst>
+              <a:ext uri="{FF2B5EF4-FFF2-40B4-BE49-F238E27FC236}">
+                <a16:creationId xmlns:a16="http://schemas.microsoft.com/office/drawing/2014/main" id="{4D4A30B0-D468-7049-844F-3E19AE20A019}"/>
+              </a:ext>
+            </a:extLst>
+          </p:cNvPr>
+          <p:cNvSpPr>
+            <a:spLocks noGrp="1"/>
+          </p:cNvSpPr>
+          <p:nvPr>
+            <p:ph type="title"/>
+          </p:nvPr>
+        </p:nvSpPr>
+        <p:spPr/>
+        <p:txBody>
+          <a:bodyPr/>
+          <a:lstStyle/>
+          <a:p>
+            <a:r>
+              <a:rPr lang="en-US" dirty="0"/>
+              <a:t>Thus, a (Shiny) star was born</a:t>
+            </a:r>
+            <a:endParaRPr lang="en-US" i="1" dirty="0"/>
+          </a:p>
+        </p:txBody>
+      </p:sp>
+      <p:sp>
+        <p:nvSpPr>
+          <p:cNvPr id="4" name="Slide Number Placeholder 3">
+            <a:extLst>
+              <a:ext uri="{FF2B5EF4-FFF2-40B4-BE49-F238E27FC236}">
+                <a16:creationId xmlns:a16="http://schemas.microsoft.com/office/drawing/2014/main" id="{721BEABF-ABB5-5447-BC76-5255EFF435D1}"/>
+              </a:ext>
+            </a:extLst>
+          </p:cNvPr>
+          <p:cNvSpPr>
+            <a:spLocks noGrp="1"/>
+          </p:cNvSpPr>
+          <p:nvPr>
+            <p:ph type="sldNum" sz="quarter" idx="11"/>
+          </p:nvPr>
+        </p:nvSpPr>
+        <p:spPr/>
+        <p:txBody>
+          <a:bodyPr/>
+          <a:lstStyle/>
+          <a:p>
+            <a:fld id="{1C3486A8-E8FB-4965-B61C-9B9FA7DC7BEE}" type="slidenum">
+              <a:rPr lang="en-US" smtClean="0"/>
+              <a:pPr/>
+              <a:t>7</a:t>
+            </a:fld>
+            <a:endParaRPr lang="en-US"/>
+          </a:p>
+        </p:txBody>
+      </p:sp>
+      <p:pic>
+        <p:nvPicPr>
+          <p:cNvPr id="6" name="Picture 5">
+            <a:extLst>
+              <a:ext uri="{FF2B5EF4-FFF2-40B4-BE49-F238E27FC236}">
+                <a16:creationId xmlns:a16="http://schemas.microsoft.com/office/drawing/2014/main" id="{E1ED5538-6F3F-4A48-AF11-E9C628D71EA6}"/>
+              </a:ext>
+            </a:extLst>
+          </p:cNvPr>
+          <p:cNvPicPr>
+            <a:picLocks noChangeAspect="1"/>
+          </p:cNvPicPr>
+          <p:nvPr/>
+        </p:nvPicPr>
+        <p:blipFill>
+          <a:blip r:embed="rId2"/>
+          <a:stretch>
+            <a:fillRect/>
+          </a:stretch>
+        </p:blipFill>
+        <p:spPr>
+          <a:xfrm>
+            <a:off x="3352043" y="2725833"/>
+            <a:ext cx="2467127" cy="2857676"/>
+          </a:xfrm>
+          <a:prstGeom prst="rect">
+            <a:avLst/>
+          </a:prstGeom>
+        </p:spPr>
+      </p:pic>
+      <p:pic>
+        <p:nvPicPr>
+          <p:cNvPr id="8" name="Picture 7">
+            <a:extLst>
+              <a:ext uri="{FF2B5EF4-FFF2-40B4-BE49-F238E27FC236}">
+                <a16:creationId xmlns:a16="http://schemas.microsoft.com/office/drawing/2014/main" id="{B0880EB9-C73F-5A49-AEC0-F336947E5C86}"/>
+              </a:ext>
+            </a:extLst>
+          </p:cNvPr>
+          <p:cNvPicPr>
+            <a:picLocks noChangeAspect="1"/>
+          </p:cNvPicPr>
+          <p:nvPr/>
+        </p:nvPicPr>
+        <p:blipFill>
+          <a:blip r:embed="rId3"/>
+          <a:stretch>
+            <a:fillRect/>
+          </a:stretch>
+        </p:blipFill>
+        <p:spPr>
+          <a:xfrm>
+            <a:off x="726156" y="2459889"/>
+            <a:ext cx="1694782" cy="1694782"/>
+          </a:xfrm>
+          <a:prstGeom prst="rect">
+            <a:avLst/>
+          </a:prstGeom>
+        </p:spPr>
+      </p:pic>
+      <p:pic>
+        <p:nvPicPr>
+          <p:cNvPr id="9" name="Picture 8">
+            <a:extLst>
+              <a:ext uri="{FF2B5EF4-FFF2-40B4-BE49-F238E27FC236}">
+                <a16:creationId xmlns:a16="http://schemas.microsoft.com/office/drawing/2014/main" id="{3A39A1F0-67AB-0445-AA5D-01330C5358BE}"/>
+              </a:ext>
+            </a:extLst>
+          </p:cNvPr>
+          <p:cNvPicPr>
+            <a:picLocks noChangeAspect="1"/>
+          </p:cNvPicPr>
+          <p:nvPr/>
+        </p:nvPicPr>
+        <p:blipFill>
+          <a:blip r:embed="rId3"/>
+          <a:stretch>
+            <a:fillRect/>
+          </a:stretch>
+        </p:blipFill>
+        <p:spPr>
+          <a:xfrm>
+            <a:off x="6750276" y="2459889"/>
+            <a:ext cx="1694782" cy="1694782"/>
+          </a:xfrm>
+          <a:prstGeom prst="rect">
+            <a:avLst/>
+          </a:prstGeom>
+        </p:spPr>
+      </p:pic>
+    </p:spTree>
+    <p:extLst>
+      <p:ext uri="{BB962C8B-B14F-4D97-AF65-F5344CB8AC3E}">
+        <p14:creationId xmlns:p14="http://schemas.microsoft.com/office/powerpoint/2010/main" val="2269741883"/>
+      </p:ext>
+    </p:extLst>
+  </p:cSld>
+  <p:clrMapOvr>
+    <a:masterClrMapping/>
+  </p:clrMapOvr>
+</p:sld>
+</file>
+
+<file path=ppt/slides/slide8.xml><?xml version="1.0" encoding="utf-8"?>
 <p:sld xmlns:a="http://schemas.openxmlformats.org/drawingml/2006/main" xmlns:r="http://schemas.openxmlformats.org/officeDocument/2006/relationships" xmlns:p="http://schemas.openxmlformats.org/presentationml/2006/main">
   <p:cSld>
     <p:spTree>
@@ -15795,6 +16747,10 @@
           <a:bodyPr/>
           <a:lstStyle/>
           <a:p>
+            <a:r>
+              <a:rPr lang="en-US" dirty="0"/>
+              <a:t>DIY Solution: </a:t>
+            </a:r>
             <a:r>
               <a:rPr lang="en-US" i="1" dirty="0" err="1"/>
               <a:t>timetrackR</a:t>
@@ -15949,7 +16905,7 @@
             <a:fld id="{1C3486A8-E8FB-4965-B61C-9B9FA7DC7BEE}" type="slidenum">
               <a:rPr lang="en-US" smtClean="0"/>
               <a:pPr/>
-              <a:t>6</a:t>
+              <a:t>8</a:t>
             </a:fld>
             <a:endParaRPr lang="en-US"/>
           </a:p>
@@ -15959,380 +16915,6 @@
     <p:extLst>
       <p:ext uri="{BB962C8B-B14F-4D97-AF65-F5344CB8AC3E}">
         <p14:creationId xmlns:p14="http://schemas.microsoft.com/office/powerpoint/2010/main" val="3889043755"/>
-      </p:ext>
-    </p:extLst>
-  </p:cSld>
-  <p:clrMapOvr>
-    <a:masterClrMapping/>
-  </p:clrMapOvr>
-</p:sld>
-</file>
-
-<file path=ppt/slides/slide7.xml><?xml version="1.0" encoding="utf-8"?>
-<p:sld xmlns:a="http://schemas.openxmlformats.org/drawingml/2006/main" xmlns:r="http://schemas.openxmlformats.org/officeDocument/2006/relationships" xmlns:p="http://schemas.openxmlformats.org/presentationml/2006/main">
-  <p:cSld>
-    <p:spTree>
-      <p:nvGrpSpPr>
-        <p:cNvPr id="1" name=""/>
-        <p:cNvGrpSpPr/>
-        <p:nvPr/>
-      </p:nvGrpSpPr>
-      <p:grpSpPr>
-        <a:xfrm>
-          <a:off x="0" y="0"/>
-          <a:ext cx="0" cy="0"/>
-          <a:chOff x="0" y="0"/>
-          <a:chExt cx="0" cy="0"/>
-        </a:xfrm>
-      </p:grpSpPr>
-      <p:sp>
-        <p:nvSpPr>
-          <p:cNvPr id="2" name="Title 1">
-            <a:extLst>
-              <a:ext uri="{FF2B5EF4-FFF2-40B4-BE49-F238E27FC236}">
-                <a16:creationId xmlns:a16="http://schemas.microsoft.com/office/drawing/2014/main" id="{3735F51F-7E07-4A40-BC26-034C4B71F632}"/>
-              </a:ext>
-            </a:extLst>
-          </p:cNvPr>
-          <p:cNvSpPr>
-            <a:spLocks noGrp="1"/>
-          </p:cNvSpPr>
-          <p:nvPr>
-            <p:ph type="title"/>
-          </p:nvPr>
-        </p:nvSpPr>
-        <p:spPr/>
-        <p:txBody>
-          <a:bodyPr/>
-          <a:lstStyle/>
-          <a:p>
-            <a:r>
-              <a:rPr lang="en-US" dirty="0"/>
-              <a:t>Potential tools for tracking &amp; analyzing your time</a:t>
-            </a:r>
-          </a:p>
-        </p:txBody>
-      </p:sp>
-      <p:sp>
-        <p:nvSpPr>
-          <p:cNvPr id="6" name="Text Placeholder 5">
-            <a:extLst>
-              <a:ext uri="{FF2B5EF4-FFF2-40B4-BE49-F238E27FC236}">
-                <a16:creationId xmlns:a16="http://schemas.microsoft.com/office/drawing/2014/main" id="{3C5232E8-4DBD-43A7-BA1B-D7609F06C93B}"/>
-              </a:ext>
-            </a:extLst>
-          </p:cNvPr>
-          <p:cNvSpPr>
-            <a:spLocks noGrp="1"/>
-          </p:cNvSpPr>
-          <p:nvPr>
-            <p:ph type="body" idx="1"/>
-          </p:nvPr>
-        </p:nvSpPr>
-        <p:spPr/>
-        <p:txBody>
-          <a:bodyPr/>
-          <a:lstStyle/>
-          <a:p>
-            <a:r>
-              <a:rPr lang="en-US" i="1" dirty="0" err="1"/>
-              <a:t>timetrackR</a:t>
-            </a:r>
-            <a:endParaRPr lang="en-US" i="1" dirty="0"/>
-          </a:p>
-        </p:txBody>
-      </p:sp>
-      <p:sp>
-        <p:nvSpPr>
-          <p:cNvPr id="3" name="Content Placeholder 2">
-            <a:extLst>
-              <a:ext uri="{FF2B5EF4-FFF2-40B4-BE49-F238E27FC236}">
-                <a16:creationId xmlns:a16="http://schemas.microsoft.com/office/drawing/2014/main" id="{0FA13A17-1F28-419E-A2F0-EC80DFDFACF0}"/>
-              </a:ext>
-            </a:extLst>
-          </p:cNvPr>
-          <p:cNvSpPr>
-            <a:spLocks noGrp="1"/>
-          </p:cNvSpPr>
-          <p:nvPr>
-            <p:ph sz="half" idx="2"/>
-          </p:nvPr>
-        </p:nvSpPr>
-        <p:spPr/>
-        <p:txBody>
-          <a:bodyPr/>
-          <a:lstStyle/>
-          <a:p>
-            <a:pPr marL="285750" indent="-285750">
-              <a:buFont typeface="Arial" panose="020B0604020202020204" pitchFamily="34" charset="0"/>
-              <a:buChar char="•"/>
-            </a:pPr>
-            <a:r>
-              <a:rPr lang="en-US" sz="2000" dirty="0"/>
-              <a:t>Entirely customizable</a:t>
-            </a:r>
-          </a:p>
-          <a:p>
-            <a:pPr marL="285750" indent="-285750">
-              <a:buFont typeface="Arial" panose="020B0604020202020204" pitchFamily="34" charset="0"/>
-              <a:buChar char="•"/>
-            </a:pPr>
-            <a:r>
-              <a:rPr lang="en-US" sz="2000" dirty="0"/>
-              <a:t>Full ownership of your recorded data, can set up and analyze in a way that best suits your needs</a:t>
-            </a:r>
-          </a:p>
-          <a:p>
-            <a:pPr marL="285750" indent="-285750">
-              <a:buFont typeface="Arial" panose="020B0604020202020204" pitchFamily="34" charset="0"/>
-              <a:buChar char="•"/>
-            </a:pPr>
-            <a:r>
-              <a:rPr lang="en-US" sz="2000" dirty="0"/>
-              <a:t>Entirely self-reported</a:t>
-            </a:r>
-          </a:p>
-          <a:p>
-            <a:pPr marL="285750" indent="-285750">
-              <a:buFont typeface="Arial" panose="020B0604020202020204" pitchFamily="34" charset="0"/>
-              <a:buChar char="•"/>
-            </a:pPr>
-            <a:r>
-              <a:rPr lang="en-US" sz="2000" dirty="0"/>
-              <a:t>Free</a:t>
-            </a:r>
-          </a:p>
-        </p:txBody>
-      </p:sp>
-      <p:sp>
-        <p:nvSpPr>
-          <p:cNvPr id="7" name="Text Placeholder 6">
-            <a:extLst>
-              <a:ext uri="{FF2B5EF4-FFF2-40B4-BE49-F238E27FC236}">
-                <a16:creationId xmlns:a16="http://schemas.microsoft.com/office/drawing/2014/main" id="{94333515-95EC-4BCE-9DF2-27C43B38E3BE}"/>
-              </a:ext>
-            </a:extLst>
-          </p:cNvPr>
-          <p:cNvSpPr>
-            <a:spLocks noGrp="1"/>
-          </p:cNvSpPr>
-          <p:nvPr>
-            <p:ph type="body" sz="quarter" idx="3"/>
-          </p:nvPr>
-        </p:nvSpPr>
-        <p:spPr/>
-        <p:txBody>
-          <a:bodyPr/>
-          <a:lstStyle/>
-          <a:p>
-            <a:r>
-              <a:rPr lang="en-US" dirty="0"/>
-              <a:t>Other software</a:t>
-            </a:r>
-          </a:p>
-        </p:txBody>
-      </p:sp>
-      <p:sp>
-        <p:nvSpPr>
-          <p:cNvPr id="8" name="Content Placeholder 7">
-            <a:extLst>
-              <a:ext uri="{FF2B5EF4-FFF2-40B4-BE49-F238E27FC236}">
-                <a16:creationId xmlns:a16="http://schemas.microsoft.com/office/drawing/2014/main" id="{5E9E9E31-246C-465D-AF21-867A6F403C71}"/>
-              </a:ext>
-            </a:extLst>
-          </p:cNvPr>
-          <p:cNvSpPr>
-            <a:spLocks noGrp="1"/>
-          </p:cNvSpPr>
-          <p:nvPr>
-            <p:ph sz="quarter" idx="4"/>
-          </p:nvPr>
-        </p:nvSpPr>
-        <p:spPr/>
-        <p:txBody>
-          <a:bodyPr/>
-          <a:lstStyle/>
-          <a:p>
-            <a:r>
-              <a:rPr lang="en-US" sz="2000" dirty="0"/>
-              <a:t>e.g. Toggl (free and paid versions), </a:t>
-            </a:r>
-            <a:r>
-              <a:rPr lang="en-US" sz="2000" dirty="0" err="1"/>
-              <a:t>RescueTime</a:t>
-            </a:r>
-            <a:r>
-              <a:rPr lang="en-US" sz="2000" dirty="0"/>
-              <a:t>, </a:t>
-            </a:r>
-            <a:r>
-              <a:rPr lang="en-US" sz="2000" dirty="0" err="1"/>
-              <a:t>Everhour</a:t>
-            </a:r>
-            <a:endParaRPr lang="en-US" sz="2000" dirty="0"/>
-          </a:p>
-          <a:p>
-            <a:pPr marL="285750" indent="-285750">
-              <a:buFont typeface="Arial" panose="020B0604020202020204" pitchFamily="34" charset="0"/>
-              <a:buChar char="•"/>
-            </a:pPr>
-            <a:r>
-              <a:rPr lang="en-US" sz="2000" dirty="0"/>
-              <a:t>Less labor intensive/maintenance not required</a:t>
-            </a:r>
-          </a:p>
-          <a:p>
-            <a:pPr marL="285750" indent="-285750">
-              <a:buFont typeface="Arial" panose="020B0604020202020204" pitchFamily="34" charset="0"/>
-              <a:buChar char="•"/>
-            </a:pPr>
-            <a:r>
-              <a:rPr lang="en-US" sz="2000" dirty="0"/>
-              <a:t>Can monitor apps and URLs used and identify distracters (hello Slack!)</a:t>
-            </a:r>
-          </a:p>
-          <a:p>
-            <a:endParaRPr lang="en-US" sz="2000" dirty="0"/>
-          </a:p>
-          <a:p>
-            <a:endParaRPr lang="en-US" sz="2000" dirty="0"/>
-          </a:p>
-        </p:txBody>
-      </p:sp>
-      <p:sp>
-        <p:nvSpPr>
-          <p:cNvPr id="4" name="Slide Number Placeholder 3">
-            <a:extLst>
-              <a:ext uri="{FF2B5EF4-FFF2-40B4-BE49-F238E27FC236}">
-                <a16:creationId xmlns:a16="http://schemas.microsoft.com/office/drawing/2014/main" id="{6C867645-EF69-43F0-BD42-9E23B31FE145}"/>
-              </a:ext>
-            </a:extLst>
-          </p:cNvPr>
-          <p:cNvSpPr>
-            <a:spLocks noGrp="1"/>
-          </p:cNvSpPr>
-          <p:nvPr>
-            <p:ph type="sldNum" sz="quarter" idx="10"/>
-          </p:nvPr>
-        </p:nvSpPr>
-        <p:spPr/>
-        <p:txBody>
-          <a:bodyPr/>
-          <a:lstStyle/>
-          <a:p>
-            <a:fld id="{1C3486A8-E8FB-4965-B61C-9B9FA7DC7BEE}" type="slidenum">
-              <a:rPr lang="en-US" smtClean="0"/>
-              <a:pPr/>
-              <a:t>7</a:t>
-            </a:fld>
-            <a:endParaRPr lang="en-US"/>
-          </a:p>
-        </p:txBody>
-      </p:sp>
-    </p:spTree>
-    <p:extLst>
-      <p:ext uri="{BB962C8B-B14F-4D97-AF65-F5344CB8AC3E}">
-        <p14:creationId xmlns:p14="http://schemas.microsoft.com/office/powerpoint/2010/main" val="3083300731"/>
-      </p:ext>
-    </p:extLst>
-  </p:cSld>
-  <p:clrMapOvr>
-    <a:masterClrMapping/>
-  </p:clrMapOvr>
-</p:sld>
-</file>
-
-<file path=ppt/slides/slide8.xml><?xml version="1.0" encoding="utf-8"?>
-<p:sld xmlns:a="http://schemas.openxmlformats.org/drawingml/2006/main" xmlns:r="http://schemas.openxmlformats.org/officeDocument/2006/relationships" xmlns:p="http://schemas.openxmlformats.org/presentationml/2006/main">
-  <p:cSld>
-    <p:spTree>
-      <p:nvGrpSpPr>
-        <p:cNvPr id="1" name=""/>
-        <p:cNvGrpSpPr/>
-        <p:nvPr/>
-      </p:nvGrpSpPr>
-      <p:grpSpPr>
-        <a:xfrm>
-          <a:off x="0" y="0"/>
-          <a:ext cx="0" cy="0"/>
-          <a:chOff x="0" y="0"/>
-          <a:chExt cx="0" cy="0"/>
-        </a:xfrm>
-      </p:grpSpPr>
-      <p:sp>
-        <p:nvSpPr>
-          <p:cNvPr id="2" name="Title 1">
-            <a:extLst>
-              <a:ext uri="{FF2B5EF4-FFF2-40B4-BE49-F238E27FC236}">
-                <a16:creationId xmlns:a16="http://schemas.microsoft.com/office/drawing/2014/main" id="{0268D8D3-EAE6-48A3-A2EF-639DBE13B96C}"/>
-              </a:ext>
-            </a:extLst>
-          </p:cNvPr>
-          <p:cNvSpPr>
-            <a:spLocks noGrp="1"/>
-          </p:cNvSpPr>
-          <p:nvPr>
-            <p:ph type="title"/>
-          </p:nvPr>
-        </p:nvSpPr>
-        <p:spPr/>
-        <p:txBody>
-          <a:bodyPr/>
-          <a:lstStyle/>
-          <a:p>
-            <a:r>
-              <a:rPr lang="en-US" i="1" dirty="0" err="1">
-                <a:solidFill>
-                  <a:schemeClr val="accent1"/>
-                </a:solidFill>
-              </a:rPr>
-              <a:t>timetrackR</a:t>
-            </a:r>
-            <a:r>
-              <a:rPr lang="en-US" dirty="0">
-                <a:solidFill>
-                  <a:schemeClr val="accent1"/>
-                </a:solidFill>
-              </a:rPr>
-              <a:t> Details &amp; Demo</a:t>
-            </a:r>
-          </a:p>
-        </p:txBody>
-      </p:sp>
-      <p:sp>
-        <p:nvSpPr>
-          <p:cNvPr id="3" name="Slide Number Placeholder 2">
-            <a:extLst>
-              <a:ext uri="{FF2B5EF4-FFF2-40B4-BE49-F238E27FC236}">
-                <a16:creationId xmlns:a16="http://schemas.microsoft.com/office/drawing/2014/main" id="{9A65F4BD-EB50-41DC-9845-A1986B62B14D}"/>
-              </a:ext>
-            </a:extLst>
-          </p:cNvPr>
-          <p:cNvSpPr>
-            <a:spLocks noGrp="1"/>
-          </p:cNvSpPr>
-          <p:nvPr>
-            <p:ph type="sldNum" sz="quarter" idx="11"/>
-          </p:nvPr>
-        </p:nvSpPr>
-        <p:spPr/>
-        <p:txBody>
-          <a:bodyPr/>
-          <a:lstStyle/>
-          <a:p>
-            <a:fld id="{1C3486A8-E8FB-4965-B61C-9B9FA7DC7BEE}" type="slidenum">
-              <a:rPr lang="en-US" smtClean="0"/>
-              <a:pPr/>
-              <a:t>8</a:t>
-            </a:fld>
-            <a:endParaRPr lang="en-US"/>
-          </a:p>
-        </p:txBody>
-      </p:sp>
-    </p:spTree>
-    <p:extLst>
-      <p:ext uri="{BB962C8B-B14F-4D97-AF65-F5344CB8AC3E}">
-        <p14:creationId xmlns:p14="http://schemas.microsoft.com/office/powerpoint/2010/main" val="664291846"/>
       </p:ext>
     </p:extLst>
   </p:cSld>
@@ -17440,6 +18022,17 @@
 </file>
 
 <file path=customXml/item1.xml><?xml version="1.0" encoding="utf-8"?>
+<p:properties xmlns:p="http://schemas.microsoft.com/office/2006/metadata/properties" xmlns:xsi="http://www.w3.org/2001/XMLSchema-instance" xmlns:pc="http://schemas.microsoft.com/office/infopath/2007/PartnerControls">
+  <documentManagement>
+    <ImageCreateDate xmlns="E64CF27C-2ECC-48E8-947E-CA63274FB2E8" xsi:nil="true"/>
+    <PublishingExpirationDate xmlns="http://schemas.microsoft.com/sharepoint/v3" xsi:nil="true"/>
+    <PublishingStartDate xmlns="http://schemas.microsoft.com/sharepoint/v3" xsi:nil="true"/>
+    <wic_System_Copyright xmlns="http://schemas.microsoft.com/sharepoint/v3/fields" xsi:nil="true"/>
+  </documentManagement>
+</p:properties>
+</file>
+
+<file path=customXml/item2.xml><?xml version="1.0" encoding="utf-8"?>
 <ct:contentTypeSchema xmlns:ct="http://schemas.microsoft.com/office/2006/metadata/contentType" xmlns:ma="http://schemas.microsoft.com/office/2006/metadata/properties/metaAttributes" ct:_="" ma:_="" ma:contentTypeName="Image" ma:contentTypeID="0x0101009148F5A04DDD49CBA7127AADA5FB792B00AADE34325A8B49CDA8BB4DB53328F214008DA1A4150FB2B848A3EB7B452BFA7AC5" ma:contentTypeVersion="1" ma:contentTypeDescription="Upload an image." ma:contentTypeScope="" ma:versionID="c5dd4a19140d82efd42bf2e2156fee3e">
   <xsd:schema xmlns:xsd="http://www.w3.org/2001/XMLSchema" xmlns:xs="http://www.w3.org/2001/XMLSchema" xmlns:p="http://schemas.microsoft.com/office/2006/metadata/properties" xmlns:ns1="http://schemas.microsoft.com/sharepoint/v3" xmlns:ns2="E64CF27C-2ECC-48E8-947E-CA63274FB2E8" xmlns:ns3="http://schemas.microsoft.com/sharepoint/v3/fields" targetNamespace="http://schemas.microsoft.com/office/2006/metadata/properties" ma:root="true" ma:fieldsID="8669bc30feb5185623fa09da941496e2" ns1:_="" ns2:_="" ns3:_="">
     <xsd:import namespace="http://schemas.microsoft.com/sharepoint/v3"/>
@@ -17641,17 +18234,6 @@
 </ct:contentTypeSchema>
 </file>
 
-<file path=customXml/item2.xml><?xml version="1.0" encoding="utf-8"?>
-<p:properties xmlns:p="http://schemas.microsoft.com/office/2006/metadata/properties" xmlns:xsi="http://www.w3.org/2001/XMLSchema-instance" xmlns:pc="http://schemas.microsoft.com/office/infopath/2007/PartnerControls">
-  <documentManagement>
-    <ImageCreateDate xmlns="E64CF27C-2ECC-48E8-947E-CA63274FB2E8" xsi:nil="true"/>
-    <PublishingExpirationDate xmlns="http://schemas.microsoft.com/sharepoint/v3" xsi:nil="true"/>
-    <PublishingStartDate xmlns="http://schemas.microsoft.com/sharepoint/v3" xsi:nil="true"/>
-    <wic_System_Copyright xmlns="http://schemas.microsoft.com/sharepoint/v3/fields" xsi:nil="true"/>
-  </documentManagement>
-</p:properties>
-</file>
-
 <file path=customXml/item3.xml><?xml version="1.0" encoding="utf-8"?>
 <?mso-contentType ?>
 <FormTemplates xmlns="http://schemas.microsoft.com/sharepoint/v3/contenttype/forms">
@@ -17662,6 +18244,24 @@
 </file>
 
 <file path=customXml/itemProps1.xml><?xml version="1.0" encoding="utf-8"?>
+<ds:datastoreItem xmlns:ds="http://schemas.openxmlformats.org/officeDocument/2006/customXml" ds:itemID="{2B30647F-A921-45DD-9E91-010F7EF4FB48}">
+  <ds:schemaRefs>
+    <ds:schemaRef ds:uri="http://schemas.microsoft.com/office/infopath/2007/PartnerControls"/>
+    <ds:schemaRef ds:uri="http://purl.org/dc/elements/1.1/"/>
+    <ds:schemaRef ds:uri="http://schemas.microsoft.com/office/2006/metadata/properties"/>
+    <ds:schemaRef ds:uri="E64CF27C-2ECC-48E8-947E-CA63274FB2E8"/>
+    <ds:schemaRef ds:uri="http://schemas.microsoft.com/sharepoint/v3"/>
+    <ds:schemaRef ds:uri="http://purl.org/dc/terms/"/>
+    <ds:schemaRef ds:uri="http://schemas.openxmlformats.org/package/2006/metadata/core-properties"/>
+    <ds:schemaRef ds:uri="http://schemas.microsoft.com/office/2006/documentManagement/types"/>
+    <ds:schemaRef ds:uri="http://schemas.microsoft.com/sharepoint/v3/fields"/>
+    <ds:schemaRef ds:uri="http://www.w3.org/XML/1998/namespace"/>
+    <ds:schemaRef ds:uri="http://purl.org/dc/dcmitype/"/>
+  </ds:schemaRefs>
+</ds:datastoreItem>
+</file>
+
+<file path=customXml/itemProps2.xml><?xml version="1.0" encoding="utf-8"?>
 <ds:datastoreItem xmlns:ds="http://schemas.openxmlformats.org/officeDocument/2006/customXml" ds:itemID="{E57EBD8B-EA50-4231-9F03-F9188E4066E3}">
   <ds:schemaRefs>
     <ds:schemaRef ds:uri="http://schemas.microsoft.com/office/2006/metadata/contentType"/>
@@ -17681,24 +18281,6 @@
 </ds:datastoreItem>
 </file>
 
-<file path=customXml/itemProps2.xml><?xml version="1.0" encoding="utf-8"?>
-<ds:datastoreItem xmlns:ds="http://schemas.openxmlformats.org/officeDocument/2006/customXml" ds:itemID="{2B30647F-A921-45DD-9E91-010F7EF4FB48}">
-  <ds:schemaRefs>
-    <ds:schemaRef ds:uri="http://schemas.microsoft.com/office/infopath/2007/PartnerControls"/>
-    <ds:schemaRef ds:uri="http://purl.org/dc/elements/1.1/"/>
-    <ds:schemaRef ds:uri="http://schemas.microsoft.com/office/2006/metadata/properties"/>
-    <ds:schemaRef ds:uri="E64CF27C-2ECC-48E8-947E-CA63274FB2E8"/>
-    <ds:schemaRef ds:uri="http://schemas.microsoft.com/sharepoint/v3"/>
-    <ds:schemaRef ds:uri="http://purl.org/dc/terms/"/>
-    <ds:schemaRef ds:uri="http://schemas.openxmlformats.org/package/2006/metadata/core-properties"/>
-    <ds:schemaRef ds:uri="http://schemas.microsoft.com/office/2006/documentManagement/types"/>
-    <ds:schemaRef ds:uri="http://schemas.microsoft.com/sharepoint/v3/fields"/>
-    <ds:schemaRef ds:uri="http://www.w3.org/XML/1998/namespace"/>
-    <ds:schemaRef ds:uri="http://purl.org/dc/dcmitype/"/>
-  </ds:schemaRefs>
-</ds:datastoreItem>
-</file>
-
 <file path=customXml/itemProps3.xml><?xml version="1.0" encoding="utf-8"?>
 <ds:datastoreItem xmlns:ds="http://schemas.openxmlformats.org/officeDocument/2006/customXml" ds:itemID="{B01F69EB-AD96-4AD6-8A18-0C8728F5F031}">
   <ds:schemaRefs>

</xml_diff>